<commit_message>
SQL Change still unsure about final solution Autohotkey fixed Now outputs the barcode into the parameter for the c++ C++ handling of SerialNumber Handling shifted in order to allow for reprints
</commit_message>
<xml_diff>
--- a/LabelSerialNumberChangeProposal.pptx
+++ b/LabelSerialNumberChangeProposal.pptx
@@ -13,12 +13,16 @@
     <p:sldId id="270" r:id="rId7"/>
     <p:sldId id="257" r:id="rId8"/>
     <p:sldId id="265" r:id="rId9"/>
-    <p:sldId id="259" r:id="rId10"/>
-    <p:sldId id="260" r:id="rId11"/>
-    <p:sldId id="261" r:id="rId12"/>
-    <p:sldId id="264" r:id="rId13"/>
-    <p:sldId id="263" r:id="rId14"/>
-    <p:sldId id="262" r:id="rId15"/>
+    <p:sldId id="272" r:id="rId10"/>
+    <p:sldId id="273" r:id="rId11"/>
+    <p:sldId id="274" r:id="rId12"/>
+    <p:sldId id="271" r:id="rId13"/>
+    <p:sldId id="259" r:id="rId14"/>
+    <p:sldId id="260" r:id="rId15"/>
+    <p:sldId id="261" r:id="rId16"/>
+    <p:sldId id="264" r:id="rId17"/>
+    <p:sldId id="263" r:id="rId18"/>
+    <p:sldId id="262" r:id="rId19"/>
   </p:sldIdLst>
   <p:sldSz cx="12192000" cy="6858000"/>
   <p:notesSz cx="6858000" cy="9144000"/>
@@ -3959,6 +3963,17 @@
             <a:rPr lang="en-US" dirty="0"/>
             <a:t>printLabels.bat</a:t>
           </a:r>
+          <a:br>
+            <a:rPr lang="en-US" dirty="0"/>
+          </a:br>
+          <a:r>
+            <a:rPr lang="en-US" dirty="0"/>
+            <a:t>+2 .</a:t>
+          </a:r>
+          <a:r>
+            <a:rPr lang="en-US" dirty="0" err="1"/>
+            <a:t>rpt</a:t>
+          </a:r>
           <a:endParaRPr lang="fr-CA" dirty="0"/>
         </a:p>
       </dgm:t>
@@ -4033,6 +4048,21 @@
             <a:rPr lang="en-US" dirty="0"/>
             <a:t>printWIP.bat</a:t>
           </a:r>
+          <a:br>
+            <a:rPr lang="en-US" dirty="0"/>
+          </a:br>
+          <a:r>
+            <a:rPr lang="en-US" dirty="0"/>
+            <a:t>+2 .</a:t>
+          </a:r>
+          <a:r>
+            <a:rPr lang="en-US" dirty="0" err="1"/>
+            <a:t>rpt</a:t>
+          </a:r>
+          <a:r>
+            <a:rPr lang="en-US" dirty="0"/>
+            <a:t> +.docx</a:t>
+          </a:r>
           <a:endParaRPr lang="fr-CA" dirty="0"/>
         </a:p>
       </dgm:t>
@@ -4143,6 +4173,17 @@
           <a:r>
             <a:rPr lang="en-US" i="1" dirty="0"/>
             <a:t>printQA.bat</a:t>
+          </a:r>
+          <a:br>
+            <a:rPr lang="en-US" i="1" dirty="0"/>
+          </a:br>
+          <a:r>
+            <a:rPr lang="en-US" i="1" dirty="0"/>
+            <a:t>+1 .</a:t>
+          </a:r>
+          <a:r>
+            <a:rPr lang="en-US" i="1" dirty="0" err="1"/>
+            <a:t>rpt</a:t>
           </a:r>
           <a:endParaRPr lang="fr-CA" i="1" dirty="0"/>
         </a:p>
@@ -4590,7 +4631,7 @@
         <a:p>
           <a:r>
             <a:rPr lang="en-US" dirty="0" err="1"/>
-            <a:t>Autohotkey</a:t>
+            <a:t>AutoHotkey</a:t>
           </a:r>
           <a:endParaRPr lang="fr-CA" dirty="0"/>
         </a:p>
@@ -6948,6 +6989,17 @@
             <a:rPr lang="en-US" sz="1700" kern="1200" dirty="0"/>
             <a:t>printLabels.bat</a:t>
           </a:r>
+          <a:br>
+            <a:rPr lang="en-US" sz="1700" kern="1200" dirty="0"/>
+          </a:br>
+          <a:r>
+            <a:rPr lang="en-US" sz="1700" kern="1200" dirty="0"/>
+            <a:t>+2 .</a:t>
+          </a:r>
+          <a:r>
+            <a:rPr lang="en-US" sz="1700" kern="1200" dirty="0" err="1"/>
+            <a:t>rpt</a:t>
+          </a:r>
           <a:endParaRPr lang="fr-CA" sz="1700" kern="1200" dirty="0"/>
         </a:p>
       </dsp:txBody>
@@ -7182,6 +7234,17 @@
             <a:rPr lang="en-US" sz="1700" i="1" kern="1200" dirty="0"/>
             <a:t>printQA.bat</a:t>
           </a:r>
+          <a:br>
+            <a:rPr lang="en-US" sz="1700" i="1" kern="1200" dirty="0"/>
+          </a:br>
+          <a:r>
+            <a:rPr lang="en-US" sz="1700" i="1" kern="1200" dirty="0"/>
+            <a:t>+1 .</a:t>
+          </a:r>
+          <a:r>
+            <a:rPr lang="en-US" sz="1700" i="1" kern="1200" dirty="0" err="1"/>
+            <a:t>rpt</a:t>
+          </a:r>
           <a:endParaRPr lang="fr-CA" sz="1700" i="1" kern="1200" dirty="0"/>
         </a:p>
       </dsp:txBody>
@@ -7259,6 +7322,21 @@
           <a:r>
             <a:rPr lang="en-US" sz="1700" kern="1200" dirty="0"/>
             <a:t>printWIP.bat</a:t>
+          </a:r>
+          <a:br>
+            <a:rPr lang="en-US" sz="1700" kern="1200" dirty="0"/>
+          </a:br>
+          <a:r>
+            <a:rPr lang="en-US" sz="1700" kern="1200" dirty="0"/>
+            <a:t>+2 .</a:t>
+          </a:r>
+          <a:r>
+            <a:rPr lang="en-US" sz="1700" kern="1200" dirty="0" err="1"/>
+            <a:t>rpt</a:t>
+          </a:r>
+          <a:r>
+            <a:rPr lang="en-US" sz="1700" kern="1200" dirty="0"/>
+            <a:t> +.docx</a:t>
           </a:r>
           <a:endParaRPr lang="fr-CA" sz="1700" kern="1200" dirty="0"/>
         </a:p>
@@ -7822,12 +7900,12 @@
         </a:fontRef>
       </dsp:style>
       <dsp:txBody>
-        <a:bodyPr spcFirstLastPara="0" vert="horz" wrap="square" lIns="15240" tIns="15240" rIns="15240" bIns="15240" numCol="1" spcCol="1270" anchor="ctr" anchorCtr="0">
+        <a:bodyPr spcFirstLastPara="0" vert="horz" wrap="square" lIns="14605" tIns="14605" rIns="14605" bIns="14605" numCol="1" spcCol="1270" anchor="ctr" anchorCtr="0">
           <a:noAutofit/>
         </a:bodyPr>
         <a:lstStyle/>
         <a:p>
-          <a:pPr marL="0" lvl="0" indent="0" algn="ctr" defTabSz="1066800">
+          <a:pPr marL="0" lvl="0" indent="0" algn="ctr" defTabSz="1022350">
             <a:lnSpc>
               <a:spcPct val="90000"/>
             </a:lnSpc>
@@ -7840,10 +7918,10 @@
             <a:buNone/>
           </a:pPr>
           <a:r>
-            <a:rPr lang="en-US" sz="2400" kern="1200" dirty="0" err="1"/>
-            <a:t>Autohotkey</a:t>
+            <a:rPr lang="en-US" sz="2300" kern="1200" dirty="0" err="1"/>
+            <a:t>AutoHotkey</a:t>
           </a:r>
-          <a:endParaRPr lang="fr-CA" sz="2400" kern="1200" dirty="0"/>
+          <a:endParaRPr lang="fr-CA" sz="2300" kern="1200" dirty="0"/>
         </a:p>
       </dsp:txBody>
       <dsp:txXfrm>
@@ -7900,12 +7978,12 @@
         </a:fontRef>
       </dsp:style>
       <dsp:txBody>
-        <a:bodyPr spcFirstLastPara="0" vert="horz" wrap="square" lIns="15240" tIns="15240" rIns="15240" bIns="15240" numCol="1" spcCol="1270" anchor="ctr" anchorCtr="0">
+        <a:bodyPr spcFirstLastPara="0" vert="horz" wrap="square" lIns="14605" tIns="14605" rIns="14605" bIns="14605" numCol="1" spcCol="1270" anchor="ctr" anchorCtr="0">
           <a:noAutofit/>
         </a:bodyPr>
         <a:lstStyle/>
         <a:p>
-          <a:pPr marL="0" lvl="0" indent="0" algn="ctr" defTabSz="1066800">
+          <a:pPr marL="0" lvl="0" indent="0" algn="ctr" defTabSz="1022350">
             <a:lnSpc>
               <a:spcPct val="90000"/>
             </a:lnSpc>
@@ -7918,10 +7996,10 @@
             <a:buNone/>
           </a:pPr>
           <a:r>
-            <a:rPr lang="en-US" sz="2400" kern="1200" dirty="0"/>
+            <a:rPr lang="en-US" sz="2300" kern="1200" dirty="0"/>
             <a:t>C++</a:t>
           </a:r>
-          <a:endParaRPr lang="fr-CA" sz="2400" kern="1200" dirty="0"/>
+          <a:endParaRPr lang="fr-CA" sz="2300" kern="1200" dirty="0"/>
         </a:p>
       </dsp:txBody>
       <dsp:txXfrm>
@@ -7978,12 +8056,12 @@
         </a:fontRef>
       </dsp:style>
       <dsp:txBody>
-        <a:bodyPr spcFirstLastPara="0" vert="horz" wrap="square" lIns="15240" tIns="15240" rIns="15240" bIns="15240" numCol="1" spcCol="1270" anchor="ctr" anchorCtr="0">
+        <a:bodyPr spcFirstLastPara="0" vert="horz" wrap="square" lIns="14605" tIns="14605" rIns="14605" bIns="14605" numCol="1" spcCol="1270" anchor="ctr" anchorCtr="0">
           <a:noAutofit/>
         </a:bodyPr>
         <a:lstStyle/>
         <a:p>
-          <a:pPr marL="0" lvl="0" indent="0" algn="ctr" defTabSz="1066800">
+          <a:pPr marL="0" lvl="0" indent="0" algn="ctr" defTabSz="1022350">
             <a:lnSpc>
               <a:spcPct val="90000"/>
             </a:lnSpc>
@@ -7996,10 +8074,10 @@
             <a:buNone/>
           </a:pPr>
           <a:r>
-            <a:rPr lang="en-US" sz="2400" kern="1200" dirty="0"/>
+            <a:rPr lang="en-US" sz="2300" kern="1200" dirty="0"/>
             <a:t>batch</a:t>
           </a:r>
-          <a:endParaRPr lang="fr-CA" sz="2400" kern="1200" dirty="0"/>
+          <a:endParaRPr lang="fr-CA" sz="2300" kern="1200" dirty="0"/>
         </a:p>
       </dsp:txBody>
       <dsp:txXfrm>
@@ -8056,12 +8134,12 @@
         </a:fontRef>
       </dsp:style>
       <dsp:txBody>
-        <a:bodyPr spcFirstLastPara="0" vert="horz" wrap="square" lIns="15240" tIns="15240" rIns="15240" bIns="15240" numCol="1" spcCol="1270" anchor="ctr" anchorCtr="0">
+        <a:bodyPr spcFirstLastPara="0" vert="horz" wrap="square" lIns="14605" tIns="14605" rIns="14605" bIns="14605" numCol="1" spcCol="1270" anchor="ctr" anchorCtr="0">
           <a:noAutofit/>
         </a:bodyPr>
         <a:lstStyle/>
         <a:p>
-          <a:pPr marL="0" lvl="0" indent="0" algn="ctr" defTabSz="1066800">
+          <a:pPr marL="0" lvl="0" indent="0" algn="ctr" defTabSz="1022350">
             <a:lnSpc>
               <a:spcPct val="90000"/>
             </a:lnSpc>
@@ -8074,10 +8152,10 @@
             <a:buNone/>
           </a:pPr>
           <a:r>
-            <a:rPr lang="en-US" sz="2400" kern="1200" dirty="0"/>
+            <a:rPr lang="en-US" sz="2300" kern="1200" dirty="0"/>
             <a:t>batch</a:t>
           </a:r>
-          <a:endParaRPr lang="fr-CA" sz="2400" kern="1200" dirty="0"/>
+          <a:endParaRPr lang="fr-CA" sz="2300" kern="1200" dirty="0"/>
         </a:p>
       </dsp:txBody>
       <dsp:txXfrm>
@@ -8134,12 +8212,12 @@
         </a:fontRef>
       </dsp:style>
       <dsp:txBody>
-        <a:bodyPr spcFirstLastPara="0" vert="horz" wrap="square" lIns="15240" tIns="15240" rIns="15240" bIns="15240" numCol="1" spcCol="1270" anchor="ctr" anchorCtr="0">
+        <a:bodyPr spcFirstLastPara="0" vert="horz" wrap="square" lIns="14605" tIns="14605" rIns="14605" bIns="14605" numCol="1" spcCol="1270" anchor="ctr" anchorCtr="0">
           <a:noAutofit/>
         </a:bodyPr>
         <a:lstStyle/>
         <a:p>
-          <a:pPr marL="0" lvl="0" indent="0" algn="ctr" defTabSz="1066800">
+          <a:pPr marL="0" lvl="0" indent="0" algn="ctr" defTabSz="1022350">
             <a:lnSpc>
               <a:spcPct val="90000"/>
             </a:lnSpc>
@@ -8152,10 +8230,10 @@
             <a:buNone/>
           </a:pPr>
           <a:r>
-            <a:rPr lang="en-US" sz="2400" kern="1200" dirty="0"/>
+            <a:rPr lang="en-US" sz="2300" kern="1200" dirty="0"/>
             <a:t>txt</a:t>
           </a:r>
-          <a:endParaRPr lang="fr-CA" sz="2400" kern="1200" dirty="0"/>
+          <a:endParaRPr lang="fr-CA" sz="2300" kern="1200" dirty="0"/>
         </a:p>
       </dsp:txBody>
       <dsp:txXfrm>
@@ -8212,12 +8290,12 @@
         </a:fontRef>
       </dsp:style>
       <dsp:txBody>
-        <a:bodyPr spcFirstLastPara="0" vert="horz" wrap="square" lIns="15240" tIns="15240" rIns="15240" bIns="15240" numCol="1" spcCol="1270" anchor="ctr" anchorCtr="0">
+        <a:bodyPr spcFirstLastPara="0" vert="horz" wrap="square" lIns="14605" tIns="14605" rIns="14605" bIns="14605" numCol="1" spcCol="1270" anchor="ctr" anchorCtr="0">
           <a:noAutofit/>
         </a:bodyPr>
         <a:lstStyle/>
         <a:p>
-          <a:pPr marL="0" lvl="0" indent="0" algn="ctr" defTabSz="1066800">
+          <a:pPr marL="0" lvl="0" indent="0" algn="ctr" defTabSz="1022350">
             <a:lnSpc>
               <a:spcPct val="90000"/>
             </a:lnSpc>
@@ -8230,10 +8308,10 @@
             <a:buNone/>
           </a:pPr>
           <a:r>
-            <a:rPr lang="en-US" sz="2400" i="1" kern="1200" dirty="0"/>
+            <a:rPr lang="en-US" sz="2300" i="1" kern="1200" dirty="0"/>
             <a:t>batch</a:t>
           </a:r>
-          <a:endParaRPr lang="fr-CA" sz="2400" i="1" kern="1200" dirty="0"/>
+          <a:endParaRPr lang="fr-CA" sz="2300" i="1" kern="1200" dirty="0"/>
         </a:p>
       </dsp:txBody>
       <dsp:txXfrm>
@@ -8290,12 +8368,12 @@
         </a:fontRef>
       </dsp:style>
       <dsp:txBody>
-        <a:bodyPr spcFirstLastPara="0" vert="horz" wrap="square" lIns="15240" tIns="15240" rIns="15240" bIns="15240" numCol="1" spcCol="1270" anchor="ctr" anchorCtr="0">
+        <a:bodyPr spcFirstLastPara="0" vert="horz" wrap="square" lIns="14605" tIns="14605" rIns="14605" bIns="14605" numCol="1" spcCol="1270" anchor="ctr" anchorCtr="0">
           <a:noAutofit/>
         </a:bodyPr>
         <a:lstStyle/>
         <a:p>
-          <a:pPr marL="0" lvl="0" indent="0" algn="ctr" defTabSz="1066800">
+          <a:pPr marL="0" lvl="0" indent="0" algn="ctr" defTabSz="1022350">
             <a:lnSpc>
               <a:spcPct val="90000"/>
             </a:lnSpc>
@@ -8308,10 +8386,10 @@
             <a:buNone/>
           </a:pPr>
           <a:r>
-            <a:rPr lang="en-US" sz="2400" kern="1200" dirty="0"/>
+            <a:rPr lang="en-US" sz="2300" kern="1200" dirty="0"/>
             <a:t>batch</a:t>
           </a:r>
-          <a:endParaRPr lang="fr-CA" sz="2400" kern="1200" dirty="0"/>
+          <a:endParaRPr lang="fr-CA" sz="2300" kern="1200" dirty="0"/>
         </a:p>
       </dsp:txBody>
       <dsp:txXfrm>
@@ -8368,12 +8446,12 @@
         </a:fontRef>
       </dsp:style>
       <dsp:txBody>
-        <a:bodyPr spcFirstLastPara="0" vert="horz" wrap="square" lIns="15240" tIns="15240" rIns="15240" bIns="15240" numCol="1" spcCol="1270" anchor="ctr" anchorCtr="0">
+        <a:bodyPr spcFirstLastPara="0" vert="horz" wrap="square" lIns="14605" tIns="14605" rIns="14605" bIns="14605" numCol="1" spcCol="1270" anchor="ctr" anchorCtr="0">
           <a:noAutofit/>
         </a:bodyPr>
         <a:lstStyle/>
         <a:p>
-          <a:pPr marL="0" lvl="0" indent="0" algn="ctr" defTabSz="1066800">
+          <a:pPr marL="0" lvl="0" indent="0" algn="ctr" defTabSz="1022350">
             <a:lnSpc>
               <a:spcPct val="90000"/>
             </a:lnSpc>
@@ -8386,10 +8464,10 @@
             <a:buNone/>
           </a:pPr>
           <a:r>
-            <a:rPr lang="en-US" sz="2400" kern="1200" dirty="0"/>
+            <a:rPr lang="en-US" sz="2300" kern="1200" dirty="0"/>
             <a:t>txt</a:t>
           </a:r>
-          <a:endParaRPr lang="fr-CA" sz="2400" kern="1200" dirty="0"/>
+          <a:endParaRPr lang="fr-CA" sz="2300" kern="1200" dirty="0"/>
         </a:p>
       </dsp:txBody>
       <dsp:txXfrm>
@@ -17859,7 +17937,7 @@
             <a:fld id="{5586B75A-687E-405C-8A0B-8D00578BA2C3}" type="datetimeFigureOut">
               <a:rPr lang="en-US" dirty="0"/>
               <a:pPr/>
-              <a:t>9/10/2021</a:t>
+              <a:t>9/13/2021</a:t>
             </a:fld>
             <a:endParaRPr lang="en-US" dirty="0"/>
           </a:p>
@@ -18026,7 +18104,7 @@
             <a:fld id="{5586B75A-687E-405C-8A0B-8D00578BA2C3}" type="datetimeFigureOut">
               <a:rPr lang="en-US" dirty="0"/>
               <a:pPr/>
-              <a:t>9/10/2021</a:t>
+              <a:t>9/13/2021</a:t>
             </a:fld>
             <a:endParaRPr lang="en-US" dirty="0"/>
           </a:p>
@@ -18203,7 +18281,7 @@
             <a:fld id="{5586B75A-687E-405C-8A0B-8D00578BA2C3}" type="datetimeFigureOut">
               <a:rPr lang="en-US" dirty="0"/>
               <a:pPr/>
-              <a:t>9/10/2021</a:t>
+              <a:t>9/13/2021</a:t>
             </a:fld>
             <a:endParaRPr lang="en-US" dirty="0"/>
           </a:p>
@@ -18370,7 +18448,7 @@
             <a:fld id="{5586B75A-687E-405C-8A0B-8D00578BA2C3}" type="datetimeFigureOut">
               <a:rPr lang="en-US" dirty="0"/>
               <a:pPr/>
-              <a:t>9/10/2021</a:t>
+              <a:t>9/13/2021</a:t>
             </a:fld>
             <a:endParaRPr lang="en-US" dirty="0"/>
           </a:p>
@@ -18625,7 +18703,7 @@
             <a:fld id="{5586B75A-687E-405C-8A0B-8D00578BA2C3}" type="datetimeFigureOut">
               <a:rPr lang="en-US" dirty="0"/>
               <a:pPr/>
-              <a:t>9/10/2021</a:t>
+              <a:t>9/13/2021</a:t>
             </a:fld>
             <a:endParaRPr lang="en-US" dirty="0"/>
           </a:p>
@@ -18910,7 +18988,7 @@
             <a:fld id="{5586B75A-687E-405C-8A0B-8D00578BA2C3}" type="datetimeFigureOut">
               <a:rPr lang="en-US" dirty="0"/>
               <a:pPr/>
-              <a:t>9/10/2021</a:t>
+              <a:t>9/13/2021</a:t>
             </a:fld>
             <a:endParaRPr lang="en-US" dirty="0"/>
           </a:p>
@@ -19349,7 +19427,7 @@
             <a:fld id="{5586B75A-687E-405C-8A0B-8D00578BA2C3}" type="datetimeFigureOut">
               <a:rPr lang="en-US" dirty="0"/>
               <a:pPr/>
-              <a:t>9/10/2021</a:t>
+              <a:t>9/13/2021</a:t>
             </a:fld>
             <a:endParaRPr lang="en-US" dirty="0"/>
           </a:p>
@@ -19464,7 +19542,7 @@
             <a:fld id="{5586B75A-687E-405C-8A0B-8D00578BA2C3}" type="datetimeFigureOut">
               <a:rPr lang="en-US" dirty="0"/>
               <a:pPr/>
-              <a:t>9/10/2021</a:t>
+              <a:t>9/13/2021</a:t>
             </a:fld>
             <a:endParaRPr lang="en-US" dirty="0"/>
           </a:p>
@@ -19556,7 +19634,7 @@
             <a:fld id="{5586B75A-687E-405C-8A0B-8D00578BA2C3}" type="datetimeFigureOut">
               <a:rPr lang="en-US" dirty="0"/>
               <a:pPr/>
-              <a:t>9/10/2021</a:t>
+              <a:t>9/13/2021</a:t>
             </a:fld>
             <a:endParaRPr lang="en-US" dirty="0"/>
           </a:p>
@@ -19841,7 +19919,7 @@
             <a:fld id="{5586B75A-687E-405C-8A0B-8D00578BA2C3}" type="datetimeFigureOut">
               <a:rPr lang="en-US" dirty="0"/>
               <a:pPr/>
-              <a:t>9/10/2021</a:t>
+              <a:t>9/13/2021</a:t>
             </a:fld>
             <a:endParaRPr lang="en-US" dirty="0"/>
           </a:p>
@@ -20111,7 +20189,7 @@
             <a:fld id="{5586B75A-687E-405C-8A0B-8D00578BA2C3}" type="datetimeFigureOut">
               <a:rPr lang="en-US" dirty="0"/>
               <a:pPr/>
-              <a:t>9/10/2021</a:t>
+              <a:t>9/13/2021</a:t>
             </a:fld>
             <a:endParaRPr lang="en-US" dirty="0"/>
           </a:p>
@@ -20405,7 +20483,7 @@
             <a:fld id="{5586B75A-687E-405C-8A0B-8D00578BA2C3}" type="datetimeFigureOut">
               <a:rPr lang="en-US" dirty="0"/>
               <a:pPr/>
-              <a:t>9/10/2021</a:t>
+              <a:t>9/13/2021</a:t>
             </a:fld>
             <a:endParaRPr lang="en-US" dirty="0"/>
           </a:p>
@@ -20993,6 +21071,475 @@
           <p:cNvPr id="2" name="Title 1">
             <a:extLst>
               <a:ext uri="{FF2B5EF4-FFF2-40B4-BE49-F238E27FC236}">
+                <a16:creationId xmlns:a16="http://schemas.microsoft.com/office/drawing/2014/main" id="{BE3CE341-C8FD-4040-9162-4698F8695F23}"/>
+              </a:ext>
+            </a:extLst>
+          </p:cNvPr>
+          <p:cNvSpPr>
+            <a:spLocks noGrp="1"/>
+          </p:cNvSpPr>
+          <p:nvPr>
+            <p:ph type="title"/>
+          </p:nvPr>
+        </p:nvSpPr>
+        <p:spPr/>
+        <p:txBody>
+          <a:bodyPr/>
+          <a:lstStyle/>
+          <a:p>
+            <a:r>
+              <a:rPr lang="en-US" dirty="0"/>
+              <a:t>After Scanning</a:t>
+            </a:r>
+            <a:endParaRPr lang="fr-CA" dirty="0"/>
+          </a:p>
+        </p:txBody>
+      </p:sp>
+      <p:sp>
+        <p:nvSpPr>
+          <p:cNvPr id="4" name="Text Placeholder 3">
+            <a:extLst>
+              <a:ext uri="{FF2B5EF4-FFF2-40B4-BE49-F238E27FC236}">
+                <a16:creationId xmlns:a16="http://schemas.microsoft.com/office/drawing/2014/main" id="{86E1AAED-E98D-4B7A-802D-7B71E8A95AEC}"/>
+              </a:ext>
+            </a:extLst>
+          </p:cNvPr>
+          <p:cNvSpPr>
+            <a:spLocks noGrp="1"/>
+          </p:cNvSpPr>
+          <p:nvPr>
+            <p:ph type="body" sz="half" idx="2"/>
+          </p:nvPr>
+        </p:nvSpPr>
+        <p:spPr/>
+        <p:txBody>
+          <a:bodyPr/>
+          <a:lstStyle/>
+          <a:p>
+            <a:endParaRPr lang="fr-CA"/>
+          </a:p>
+        </p:txBody>
+      </p:sp>
+      <p:pic>
+        <p:nvPicPr>
+          <p:cNvPr id="6" name="Picture 5">
+            <a:extLst>
+              <a:ext uri="{FF2B5EF4-FFF2-40B4-BE49-F238E27FC236}">
+                <a16:creationId xmlns:a16="http://schemas.microsoft.com/office/drawing/2014/main" id="{DAC4F764-7F89-447D-B1F2-E12C376840B0}"/>
+              </a:ext>
+            </a:extLst>
+          </p:cNvPr>
+          <p:cNvPicPr>
+            <a:picLocks noChangeAspect="1"/>
+          </p:cNvPicPr>
+          <p:nvPr/>
+        </p:nvPicPr>
+        <p:blipFill>
+          <a:blip r:embed="rId2"/>
+          <a:stretch>
+            <a:fillRect/>
+          </a:stretch>
+        </p:blipFill>
+        <p:spPr>
+          <a:xfrm>
+            <a:off x="3512195" y="1273185"/>
+            <a:ext cx="8229004" cy="4311629"/>
+          </a:xfrm>
+          <a:prstGeom prst="rect">
+            <a:avLst/>
+          </a:prstGeom>
+        </p:spPr>
+      </p:pic>
+    </p:spTree>
+    <p:extLst>
+      <p:ext uri="{BB962C8B-B14F-4D97-AF65-F5344CB8AC3E}">
+        <p14:creationId xmlns:p14="http://schemas.microsoft.com/office/powerpoint/2010/main" val="439465011"/>
+      </p:ext>
+    </p:extLst>
+  </p:cSld>
+  <p:clrMapOvr>
+    <a:masterClrMapping/>
+  </p:clrMapOvr>
+</p:sld>
+</file>
+
+<file path=ppt/slides/slide11.xml><?xml version="1.0" encoding="utf-8"?>
+<p:sld xmlns:a="http://schemas.openxmlformats.org/drawingml/2006/main" xmlns:r="http://schemas.openxmlformats.org/officeDocument/2006/relationships" xmlns:p="http://schemas.openxmlformats.org/presentationml/2006/main">
+  <p:cSld>
+    <p:spTree>
+      <p:nvGrpSpPr>
+        <p:cNvPr id="1" name=""/>
+        <p:cNvGrpSpPr/>
+        <p:nvPr/>
+      </p:nvGrpSpPr>
+      <p:grpSpPr>
+        <a:xfrm>
+          <a:off x="0" y="0"/>
+          <a:ext cx="0" cy="0"/>
+          <a:chOff x="0" y="0"/>
+          <a:chExt cx="0" cy="0"/>
+        </a:xfrm>
+      </p:grpSpPr>
+      <p:sp>
+        <p:nvSpPr>
+          <p:cNvPr id="2" name="Title 1">
+            <a:extLst>
+              <a:ext uri="{FF2B5EF4-FFF2-40B4-BE49-F238E27FC236}">
+                <a16:creationId xmlns:a16="http://schemas.microsoft.com/office/drawing/2014/main" id="{6A39C7E6-719F-4360-82A7-D235406B0AE1}"/>
+              </a:ext>
+            </a:extLst>
+          </p:cNvPr>
+          <p:cNvSpPr>
+            <a:spLocks noGrp="1"/>
+          </p:cNvSpPr>
+          <p:nvPr>
+            <p:ph type="title"/>
+          </p:nvPr>
+        </p:nvSpPr>
+        <p:spPr/>
+        <p:txBody>
+          <a:bodyPr/>
+          <a:lstStyle/>
+          <a:p>
+            <a:r>
+              <a:rPr lang="en-US" dirty="0"/>
+              <a:t>After 2</a:t>
+            </a:r>
+            <a:r>
+              <a:rPr lang="en-US" baseline="30000" dirty="0"/>
+              <a:t>nd</a:t>
+            </a:r>
+            <a:r>
+              <a:rPr lang="en-US" dirty="0"/>
+              <a:t> Scan</a:t>
+            </a:r>
+            <a:endParaRPr lang="fr-CA" dirty="0"/>
+          </a:p>
+        </p:txBody>
+      </p:sp>
+      <p:sp>
+        <p:nvSpPr>
+          <p:cNvPr id="4" name="Text Placeholder 3">
+            <a:extLst>
+              <a:ext uri="{FF2B5EF4-FFF2-40B4-BE49-F238E27FC236}">
+                <a16:creationId xmlns:a16="http://schemas.microsoft.com/office/drawing/2014/main" id="{5D137186-B30B-4684-9E7B-C1B6E2AB7C05}"/>
+              </a:ext>
+            </a:extLst>
+          </p:cNvPr>
+          <p:cNvSpPr>
+            <a:spLocks noGrp="1"/>
+          </p:cNvSpPr>
+          <p:nvPr>
+            <p:ph type="body" sz="half" idx="2"/>
+          </p:nvPr>
+        </p:nvSpPr>
+        <p:spPr/>
+        <p:txBody>
+          <a:bodyPr/>
+          <a:lstStyle/>
+          <a:p>
+            <a:endParaRPr lang="fr-CA"/>
+          </a:p>
+        </p:txBody>
+      </p:sp>
+      <p:pic>
+        <p:nvPicPr>
+          <p:cNvPr id="8" name="Picture 7">
+            <a:extLst>
+              <a:ext uri="{FF2B5EF4-FFF2-40B4-BE49-F238E27FC236}">
+                <a16:creationId xmlns:a16="http://schemas.microsoft.com/office/drawing/2014/main" id="{06464887-E2EE-4A69-B34E-4B72B811C0FB}"/>
+              </a:ext>
+            </a:extLst>
+          </p:cNvPr>
+          <p:cNvPicPr>
+            <a:picLocks noChangeAspect="1"/>
+          </p:cNvPicPr>
+          <p:nvPr/>
+        </p:nvPicPr>
+        <p:blipFill>
+          <a:blip r:embed="rId2"/>
+          <a:stretch>
+            <a:fillRect/>
+          </a:stretch>
+        </p:blipFill>
+        <p:spPr>
+          <a:xfrm>
+            <a:off x="3592484" y="1308316"/>
+            <a:ext cx="8093389" cy="4241367"/>
+          </a:xfrm>
+          <a:prstGeom prst="rect">
+            <a:avLst/>
+          </a:prstGeom>
+        </p:spPr>
+      </p:pic>
+    </p:spTree>
+    <p:extLst>
+      <p:ext uri="{BB962C8B-B14F-4D97-AF65-F5344CB8AC3E}">
+        <p14:creationId xmlns:p14="http://schemas.microsoft.com/office/powerpoint/2010/main" val="519063218"/>
+      </p:ext>
+    </p:extLst>
+  </p:cSld>
+  <p:clrMapOvr>
+    <a:masterClrMapping/>
+  </p:clrMapOvr>
+</p:sld>
+</file>
+
+<file path=ppt/slides/slide12.xml><?xml version="1.0" encoding="utf-8"?>
+<p:sld xmlns:a="http://schemas.openxmlformats.org/drawingml/2006/main" xmlns:r="http://schemas.openxmlformats.org/officeDocument/2006/relationships" xmlns:p="http://schemas.openxmlformats.org/presentationml/2006/main">
+  <p:cSld>
+    <p:spTree>
+      <p:nvGrpSpPr>
+        <p:cNvPr id="1" name=""/>
+        <p:cNvGrpSpPr/>
+        <p:nvPr/>
+      </p:nvGrpSpPr>
+      <p:grpSpPr>
+        <a:xfrm>
+          <a:off x="0" y="0"/>
+          <a:ext cx="0" cy="0"/>
+          <a:chOff x="0" y="0"/>
+          <a:chExt cx="0" cy="0"/>
+        </a:xfrm>
+      </p:grpSpPr>
+      <p:sp>
+        <p:nvSpPr>
+          <p:cNvPr id="2" name="Title 1">
+            <a:extLst>
+              <a:ext uri="{FF2B5EF4-FFF2-40B4-BE49-F238E27FC236}">
+                <a16:creationId xmlns:a16="http://schemas.microsoft.com/office/drawing/2014/main" id="{61179D2D-801C-4EE8-A452-FEEBAB97827A}"/>
+              </a:ext>
+            </a:extLst>
+          </p:cNvPr>
+          <p:cNvSpPr>
+            <a:spLocks noGrp="1"/>
+          </p:cNvSpPr>
+          <p:nvPr>
+            <p:ph type="title"/>
+          </p:nvPr>
+        </p:nvSpPr>
+        <p:spPr/>
+        <p:txBody>
+          <a:bodyPr/>
+          <a:lstStyle/>
+          <a:p>
+            <a:r>
+              <a:rPr lang="en-US" dirty="0"/>
+              <a:t>Post Printing</a:t>
+            </a:r>
+            <a:endParaRPr lang="fr-CA" dirty="0"/>
+          </a:p>
+        </p:txBody>
+      </p:sp>
+      <p:sp>
+        <p:nvSpPr>
+          <p:cNvPr id="4" name="Text Placeholder 3">
+            <a:extLst>
+              <a:ext uri="{FF2B5EF4-FFF2-40B4-BE49-F238E27FC236}">
+                <a16:creationId xmlns:a16="http://schemas.microsoft.com/office/drawing/2014/main" id="{6C4C9579-17E8-4B90-A0AC-8E6A0551F6C7}"/>
+              </a:ext>
+            </a:extLst>
+          </p:cNvPr>
+          <p:cNvSpPr>
+            <a:spLocks noGrp="1"/>
+          </p:cNvSpPr>
+          <p:nvPr>
+            <p:ph type="body" sz="half" idx="2"/>
+          </p:nvPr>
+        </p:nvSpPr>
+        <p:spPr/>
+        <p:txBody>
+          <a:bodyPr/>
+          <a:lstStyle/>
+          <a:p>
+            <a:endParaRPr lang="fr-CA"/>
+          </a:p>
+        </p:txBody>
+      </p:sp>
+      <p:pic>
+        <p:nvPicPr>
+          <p:cNvPr id="10" name="Picture 9">
+            <a:extLst>
+              <a:ext uri="{FF2B5EF4-FFF2-40B4-BE49-F238E27FC236}">
+                <a16:creationId xmlns:a16="http://schemas.microsoft.com/office/drawing/2014/main" id="{7A7C9B36-7F1C-4532-A3D9-54A8700FC300}"/>
+              </a:ext>
+            </a:extLst>
+          </p:cNvPr>
+          <p:cNvPicPr>
+            <a:picLocks noChangeAspect="1"/>
+          </p:cNvPicPr>
+          <p:nvPr/>
+        </p:nvPicPr>
+        <p:blipFill>
+          <a:blip r:embed="rId2"/>
+          <a:stretch>
+            <a:fillRect/>
+          </a:stretch>
+        </p:blipFill>
+        <p:spPr>
+          <a:xfrm>
+            <a:off x="3587420" y="1311445"/>
+            <a:ext cx="8115231" cy="4235110"/>
+          </a:xfrm>
+          <a:prstGeom prst="rect">
+            <a:avLst/>
+          </a:prstGeom>
+        </p:spPr>
+      </p:pic>
+    </p:spTree>
+    <p:extLst>
+      <p:ext uri="{BB962C8B-B14F-4D97-AF65-F5344CB8AC3E}">
+        <p14:creationId xmlns:p14="http://schemas.microsoft.com/office/powerpoint/2010/main" val="4089766087"/>
+      </p:ext>
+    </p:extLst>
+  </p:cSld>
+  <p:clrMapOvr>
+    <a:masterClrMapping/>
+  </p:clrMapOvr>
+</p:sld>
+</file>
+
+<file path=ppt/slides/slide13.xml><?xml version="1.0" encoding="utf-8"?>
+<p:sld xmlns:a="http://schemas.openxmlformats.org/drawingml/2006/main" xmlns:r="http://schemas.openxmlformats.org/officeDocument/2006/relationships" xmlns:p="http://schemas.openxmlformats.org/presentationml/2006/main">
+  <p:cSld>
+    <p:spTree>
+      <p:nvGrpSpPr>
+        <p:cNvPr id="1" name=""/>
+        <p:cNvGrpSpPr/>
+        <p:nvPr/>
+      </p:nvGrpSpPr>
+      <p:grpSpPr>
+        <a:xfrm>
+          <a:off x="0" y="0"/>
+          <a:ext cx="0" cy="0"/>
+          <a:chOff x="0" y="0"/>
+          <a:chExt cx="0" cy="0"/>
+        </a:xfrm>
+      </p:grpSpPr>
+      <p:sp>
+        <p:nvSpPr>
+          <p:cNvPr id="2" name="Title 1">
+            <a:extLst>
+              <a:ext uri="{FF2B5EF4-FFF2-40B4-BE49-F238E27FC236}">
+                <a16:creationId xmlns:a16="http://schemas.microsoft.com/office/drawing/2014/main" id="{6F03E9D7-C0D2-45C9-BECD-CEBE9C1D961B}"/>
+              </a:ext>
+            </a:extLst>
+          </p:cNvPr>
+          <p:cNvSpPr>
+            <a:spLocks noGrp="1"/>
+          </p:cNvSpPr>
+          <p:nvPr>
+            <p:ph type="title"/>
+          </p:nvPr>
+        </p:nvSpPr>
+        <p:spPr/>
+        <p:txBody>
+          <a:bodyPr/>
+          <a:lstStyle/>
+          <a:p>
+            <a:r>
+              <a:rPr lang="en-US" dirty="0"/>
+              <a:t>Reoccurring programs</a:t>
+            </a:r>
+            <a:endParaRPr lang="fr-CA" dirty="0"/>
+          </a:p>
+        </p:txBody>
+      </p:sp>
+      <p:graphicFrame>
+        <p:nvGraphicFramePr>
+          <p:cNvPr id="5" name="Content Placeholder 4">
+            <a:extLst>
+              <a:ext uri="{FF2B5EF4-FFF2-40B4-BE49-F238E27FC236}">
+                <a16:creationId xmlns:a16="http://schemas.microsoft.com/office/drawing/2014/main" id="{8F68204E-F95C-4EE6-84D7-A7FE7E2FAB7F}"/>
+              </a:ext>
+            </a:extLst>
+          </p:cNvPr>
+          <p:cNvGraphicFramePr>
+            <a:graphicFrameLocks noGrp="1"/>
+          </p:cNvGraphicFramePr>
+          <p:nvPr>
+            <p:ph idx="1"/>
+            <p:extLst>
+              <p:ext uri="{D42A27DB-BD31-4B8C-83A1-F6EECF244321}">
+                <p14:modId xmlns:p14="http://schemas.microsoft.com/office/powerpoint/2010/main" val="3667617667"/>
+              </p:ext>
+            </p:extLst>
+          </p:nvPr>
+        </p:nvGraphicFramePr>
+        <p:xfrm>
+          <a:off x="3867150" y="868363"/>
+          <a:ext cx="7315200" cy="5121275"/>
+        </p:xfrm>
+        <a:graphic>
+          <a:graphicData uri="http://schemas.openxmlformats.org/drawingml/2006/diagram">
+            <dgm:relIds xmlns:dgm="http://schemas.openxmlformats.org/drawingml/2006/diagram" xmlns:r="http://schemas.openxmlformats.org/officeDocument/2006/relationships" r:dm="rId2" r:lo="rId3" r:qs="rId4" r:cs="rId5"/>
+          </a:graphicData>
+        </a:graphic>
+      </p:graphicFrame>
+      <p:sp>
+        <p:nvSpPr>
+          <p:cNvPr id="4" name="Text Placeholder 3">
+            <a:extLst>
+              <a:ext uri="{FF2B5EF4-FFF2-40B4-BE49-F238E27FC236}">
+                <a16:creationId xmlns:a16="http://schemas.microsoft.com/office/drawing/2014/main" id="{734A07F1-973D-4E00-ACA7-9FE52C52E28B}"/>
+              </a:ext>
+            </a:extLst>
+          </p:cNvPr>
+          <p:cNvSpPr>
+            <a:spLocks noGrp="1"/>
+          </p:cNvSpPr>
+          <p:nvPr>
+            <p:ph type="body" sz="half" idx="2"/>
+          </p:nvPr>
+        </p:nvSpPr>
+        <p:spPr/>
+        <p:txBody>
+          <a:bodyPr/>
+          <a:lstStyle/>
+          <a:p>
+            <a:r>
+              <a:rPr lang="en-US" dirty="0"/>
+              <a:t>Need to be setup via Windows Task Scheduler </a:t>
+            </a:r>
+            <a:endParaRPr lang="fr-CA" dirty="0"/>
+          </a:p>
+        </p:txBody>
+      </p:sp>
+    </p:spTree>
+    <p:extLst>
+      <p:ext uri="{BB962C8B-B14F-4D97-AF65-F5344CB8AC3E}">
+        <p14:creationId xmlns:p14="http://schemas.microsoft.com/office/powerpoint/2010/main" val="2626867415"/>
+      </p:ext>
+    </p:extLst>
+  </p:cSld>
+  <p:clrMapOvr>
+    <a:masterClrMapping/>
+  </p:clrMapOvr>
+</p:sld>
+</file>
+
+<file path=ppt/slides/slide14.xml><?xml version="1.0" encoding="utf-8"?>
+<p:sld xmlns:a="http://schemas.openxmlformats.org/drawingml/2006/main" xmlns:r="http://schemas.openxmlformats.org/officeDocument/2006/relationships" xmlns:p="http://schemas.openxmlformats.org/presentationml/2006/main">
+  <p:cSld>
+    <p:spTree>
+      <p:nvGrpSpPr>
+        <p:cNvPr id="1" name=""/>
+        <p:cNvGrpSpPr/>
+        <p:nvPr/>
+      </p:nvGrpSpPr>
+      <p:grpSpPr>
+        <a:xfrm>
+          <a:off x="0" y="0"/>
+          <a:ext cx="0" cy="0"/>
+          <a:chOff x="0" y="0"/>
+          <a:chExt cx="0" cy="0"/>
+        </a:xfrm>
+      </p:grpSpPr>
+      <p:sp>
+        <p:nvSpPr>
+          <p:cNvPr id="2" name="Title 1">
+            <a:extLst>
+              <a:ext uri="{FF2B5EF4-FFF2-40B4-BE49-F238E27FC236}">
                 <a16:creationId xmlns:a16="http://schemas.microsoft.com/office/drawing/2014/main" id="{BEDB5C02-A62B-4368-9609-8A357DC152DD}"/>
               </a:ext>
             </a:extLst>
@@ -21061,7 +21608,7 @@
 </p:sld>
 </file>
 
-<file path=ppt/slides/slide11.xml><?xml version="1.0" encoding="utf-8"?>
+<file path=ppt/slides/slide15.xml><?xml version="1.0" encoding="utf-8"?>
 <p:sld xmlns:a="http://schemas.openxmlformats.org/drawingml/2006/main" xmlns:r="http://schemas.openxmlformats.org/officeDocument/2006/relationships" xmlns:p="http://schemas.openxmlformats.org/presentationml/2006/main">
   <p:cSld>
     <p:spTree>
@@ -21156,7 +21703,7 @@
           <a:p>
             <a:r>
               <a:rPr lang="en-US" dirty="0"/>
-              <a:t>Scanner needs to preamble with F10</a:t>
+              <a:t>Scanner needs to preamble with F9</a:t>
             </a:r>
           </a:p>
           <a:p>
@@ -21168,7 +21715,7 @@
           <a:p>
             <a:r>
               <a:rPr lang="en-US" dirty="0"/>
-              <a:t>User needs to type number of prints they want, defaulted to 1 currently *</a:t>
+              <a:t>User needs to type number of prints they want, defaulted to 1 pending SQL</a:t>
             </a:r>
           </a:p>
           <a:p>
@@ -21196,18 +21743,13 @@
               <a:rPr lang="en-US" dirty="0"/>
               <a:t>Easily found in code of scannerUsageCheck.cpp</a:t>
             </a:r>
-            <a:endParaRPr lang="en-US" dirty="0">
-              <a:hlinkClick r:id="rId2"/>
-            </a:endParaRPr>
           </a:p>
           <a:p>
+            <a:pPr lvl="1"/>
             <a:r>
-              <a:rPr lang="en-US" dirty="0">
-                <a:hlinkClick r:id="rId2"/>
-              </a:rPr>
-              <a:t>https://github.com/pixustechnologies/labelSerialNumberProject</a:t>
+              <a:rPr lang="en-US" dirty="0"/>
+              <a:t>Then compiled again</a:t>
             </a:r>
-            <a:endParaRPr lang="en-US" dirty="0"/>
           </a:p>
         </p:txBody>
       </p:sp>
@@ -21224,7 +21766,7 @@
 </p:sld>
 </file>
 
-<file path=ppt/slides/slide12.xml><?xml version="1.0" encoding="utf-8"?>
+<file path=ppt/slides/slide16.xml><?xml version="1.0" encoding="utf-8"?>
 <p:sld xmlns:a="http://schemas.openxmlformats.org/drawingml/2006/main" xmlns:r="http://schemas.openxmlformats.org/officeDocument/2006/relationships" xmlns:p="http://schemas.openxmlformats.org/presentationml/2006/main">
   <p:cSld>
     <p:spTree>
@@ -21265,7 +21807,15 @@
             <a:pPr algn="ctr"/>
             <a:r>
               <a:rPr lang="en-US" dirty="0"/>
-              <a:t>Technical Debt 2</a:t>
+              <a:t>Technical Debt </a:t>
+            </a:r>
+            <a:r>
+              <a:rPr lang="en-US" dirty="0" err="1"/>
+              <a:t>Cont</a:t>
+            </a:r>
+            <a:r>
+              <a:rPr lang="en-US" dirty="0"/>
+              <a:t>…</a:t>
             </a:r>
             <a:endParaRPr lang="fr-CA" dirty="0"/>
           </a:p>
@@ -21294,7 +21844,32 @@
           <a:p>
             <a:r>
               <a:rPr lang="en-US" dirty="0"/>
-              <a:t>A</a:t>
+              <a:t>Location of data and relevant files is hyper dependent on code</a:t>
+            </a:r>
+          </a:p>
+          <a:p>
+            <a:r>
+              <a:rPr lang="en-US" dirty="0"/>
+              <a:t>System will be hard to move between computers</a:t>
+            </a:r>
+          </a:p>
+          <a:p>
+            <a:r>
+              <a:rPr lang="en-US" dirty="0"/>
+              <a:t>Report extract is impossible to work with</a:t>
+            </a:r>
+          </a:p>
+          <a:p>
+            <a:r>
+              <a:rPr lang="en-US" dirty="0"/>
+              <a:t>Crystal reports wont intake a text file easily, serial number is being imported as a parameter from visual cut</a:t>
+            </a:r>
+          </a:p>
+          <a:p>
+            <a:pPr lvl="1"/>
+            <a:r>
+              <a:rPr lang="en-US" dirty="0"/>
+              <a:t>Tried ODBC text file</a:t>
             </a:r>
           </a:p>
           <a:p>
@@ -21321,7 +21896,7 @@
 </p:sld>
 </file>
 
-<file path=ppt/slides/slide13.xml><?xml version="1.0" encoding="utf-8"?>
+<file path=ppt/slides/slide17.xml><?xml version="1.0" encoding="utf-8"?>
 <p:sld xmlns:a="http://schemas.openxmlformats.org/drawingml/2006/main" xmlns:r="http://schemas.openxmlformats.org/officeDocument/2006/relationships" xmlns:p="http://schemas.openxmlformats.org/presentationml/2006/main">
   <p:cSld>
     <p:spTree>
@@ -21365,7 +21940,7 @@
             </a:r>
             <a:r>
               <a:rPr lang="en-US" dirty="0"/>
-              <a:t> account</a:t>
+              <a:t> account details</a:t>
             </a:r>
             <a:endParaRPr lang="fr-CA" dirty="0"/>
           </a:p>
@@ -21413,7 +21988,7 @@
 </p:sld>
 </file>
 
-<file path=ppt/slides/slide14.xml><?xml version="1.0" encoding="utf-8"?>
+<file path=ppt/slides/slide18.xml><?xml version="1.0" encoding="utf-8"?>
 <p:sld xmlns:a="http://schemas.openxmlformats.org/drawingml/2006/main" xmlns:r="http://schemas.openxmlformats.org/officeDocument/2006/relationships" xmlns:p="http://schemas.openxmlformats.org/presentationml/2006/main">
   <p:cSld>
     <p:spTree>
@@ -21457,7 +22032,7 @@
             </a:r>
             <a:r>
               <a:rPr lang="en-US" dirty="0"/>
-              <a:t> Account</a:t>
+              <a:t> account details</a:t>
             </a:r>
             <a:endParaRPr lang="fr-CA" dirty="0"/>
           </a:p>
@@ -21580,10 +22155,10 @@
       </p:sp>
       <p:pic>
         <p:nvPicPr>
-          <p:cNvPr id="6" name="Picture 5">
+          <p:cNvPr id="8" name="Picture 7">
             <a:extLst>
               <a:ext uri="{FF2B5EF4-FFF2-40B4-BE49-F238E27FC236}">
-                <a16:creationId xmlns:a16="http://schemas.microsoft.com/office/drawing/2014/main" id="{CBCA6F81-F4C6-4E3E-AE9D-D544C93530BA}"/>
+                <a16:creationId xmlns:a16="http://schemas.microsoft.com/office/drawing/2014/main" id="{5DC55BB6-4905-4058-A1A3-E55A95185973}"/>
               </a:ext>
             </a:extLst>
           </p:cNvPr>
@@ -21600,8 +22175,8 @@
         </p:blipFill>
         <p:spPr>
           <a:xfrm>
-            <a:off x="3553865" y="763524"/>
-            <a:ext cx="7996430" cy="5330952"/>
+            <a:off x="3692560" y="775981"/>
+            <a:ext cx="7979783" cy="5306037"/>
           </a:xfrm>
           <a:prstGeom prst="rect">
             <a:avLst/>
@@ -21694,10 +22269,10 @@
       </p:sp>
       <p:pic>
         <p:nvPicPr>
-          <p:cNvPr id="7" name="Picture 6">
+          <p:cNvPr id="5" name="Picture 4">
             <a:extLst>
               <a:ext uri="{FF2B5EF4-FFF2-40B4-BE49-F238E27FC236}">
-                <a16:creationId xmlns:a16="http://schemas.microsoft.com/office/drawing/2014/main" id="{272D22D8-054F-4BEA-A4BF-386FD196E98B}"/>
+                <a16:creationId xmlns:a16="http://schemas.microsoft.com/office/drawing/2014/main" id="{08EC3C67-21F3-4A32-937C-4E2FF61CCD21}"/>
               </a:ext>
             </a:extLst>
           </p:cNvPr>
@@ -21714,8 +22289,8 @@
         </p:blipFill>
         <p:spPr>
           <a:xfrm>
-            <a:off x="3646146" y="759629"/>
-            <a:ext cx="7973802" cy="5338742"/>
+            <a:off x="3548543" y="747630"/>
+            <a:ext cx="8065113" cy="5362739"/>
           </a:xfrm>
           <a:prstGeom prst="rect">
             <a:avLst/>
@@ -21825,16 +22400,25 @@
               <a:rPr lang="en-US" dirty="0"/>
               <a:t>Spacing?</a:t>
             </a:r>
+          </a:p>
+          <a:p>
+            <a:r>
+              <a:rPr lang="en-US" dirty="0"/>
+              <a:t>Not enough SN per Orders?</a:t>
+            </a:r>
+            <a:endParaRPr lang="fr-CA" dirty="0"/>
+          </a:p>
+          <a:p>
             <a:endParaRPr lang="fr-CA" dirty="0"/>
           </a:p>
         </p:txBody>
       </p:sp>
       <p:pic>
         <p:nvPicPr>
-          <p:cNvPr id="13" name="Picture 12">
+          <p:cNvPr id="5" name="Picture 4">
             <a:extLst>
               <a:ext uri="{FF2B5EF4-FFF2-40B4-BE49-F238E27FC236}">
-                <a16:creationId xmlns:a16="http://schemas.microsoft.com/office/drawing/2014/main" id="{4C972FD7-027D-480D-8207-745B0BF055CE}"/>
+                <a16:creationId xmlns:a16="http://schemas.microsoft.com/office/drawing/2014/main" id="{9EE89808-8709-4562-8462-64509626BE3E}"/>
               </a:ext>
             </a:extLst>
           </p:cNvPr>
@@ -21843,16 +22427,15 @@
           </p:cNvPicPr>
           <p:nvPr/>
         </p:nvPicPr>
-        <p:blipFill>
+        <p:blipFill rotWithShape="1">
           <a:blip r:embed="rId2"/>
-          <a:stretch>
-            <a:fillRect/>
-          </a:stretch>
+          <a:srcRect b="9091"/>
+          <a:stretch/>
         </p:blipFill>
         <p:spPr>
           <a:xfrm>
-            <a:off x="3570644" y="767420"/>
-            <a:ext cx="8115230" cy="5042280"/>
+            <a:off x="3836512" y="755009"/>
+            <a:ext cx="7770623" cy="5327009"/>
           </a:xfrm>
           <a:prstGeom prst="rect">
             <a:avLst/>
@@ -21980,7 +22563,20 @@
               <a:rPr lang="en-US" dirty="0"/>
               <a:t>Spacing?</a:t>
             </a:r>
-            <a:endParaRPr lang="fr-CA" dirty="0"/>
+          </a:p>
+          <a:p>
+            <a:r>
+              <a:rPr lang="en-US" dirty="0"/>
+              <a:t>Not enough SN per Orders?</a:t>
+            </a:r>
+            <a:br>
+              <a:rPr lang="fr-CA" dirty="0"/>
+            </a:br>
+            <a:r>
+              <a:rPr lang="fr-CA" dirty="0"/>
+              <a:t>-alt for reprint?</a:t>
+            </a:r>
+            <a:endParaRPr lang="en-US" dirty="0"/>
           </a:p>
         </p:txBody>
       </p:sp>
@@ -22206,7 +22802,7 @@
             <p:ph idx="1"/>
             <p:extLst>
               <p:ext uri="{D42A27DB-BD31-4B8C-83A1-F6EECF244321}">
-                <p14:modId xmlns:p14="http://schemas.microsoft.com/office/powerpoint/2010/main" val="445049179"/>
+                <p14:modId xmlns:p14="http://schemas.microsoft.com/office/powerpoint/2010/main" val="2805922393"/>
               </p:ext>
             </p:extLst>
           </p:nvPr>
@@ -22248,13 +22844,13 @@
             </a:r>
             <a:r>
               <a:rPr lang="en-US" dirty="0"/>
-              <a:t> will search for Ctrl+F10 to start the program</a:t>
+              <a:t> will search for Ctrl+F9 to start the program</a:t>
             </a:r>
           </a:p>
           <a:p>
             <a:r>
               <a:rPr lang="en-US" dirty="0"/>
-              <a:t>Scanners will automatically press F10, user must hold Ctrl</a:t>
+              <a:t>Scanners will automatically press F9, user must hold Ctrl</a:t>
             </a:r>
           </a:p>
           <a:p>
@@ -22346,7 +22942,7 @@
             <p:ph idx="1"/>
             <p:extLst>
               <p:ext uri="{D42A27DB-BD31-4B8C-83A1-F6EECF244321}">
-                <p14:modId xmlns:p14="http://schemas.microsoft.com/office/powerpoint/2010/main" val="1659771835"/>
+                <p14:modId xmlns:p14="http://schemas.microsoft.com/office/powerpoint/2010/main" val="3305338273"/>
               </p:ext>
             </p:extLst>
           </p:nvPr>
@@ -22424,7 +23020,7 @@
           <p:cNvPr id="2" name="Title 1">
             <a:extLst>
               <a:ext uri="{FF2B5EF4-FFF2-40B4-BE49-F238E27FC236}">
-                <a16:creationId xmlns:a16="http://schemas.microsoft.com/office/drawing/2014/main" id="{6F03E9D7-C0D2-45C9-BECD-CEBE9C1D961B}"/>
+                <a16:creationId xmlns:a16="http://schemas.microsoft.com/office/drawing/2014/main" id="{C376B12C-079A-499A-8094-BEB67BEA8687}"/>
               </a:ext>
             </a:extLst>
           </p:cNvPr>
@@ -22441,50 +23037,23 @@
           <a:lstStyle/>
           <a:p>
             <a:r>
+              <a:rPr lang="en-US" dirty="0" err="1"/>
+              <a:t>AutoHotkey</a:t>
+            </a:r>
+            <a:r>
               <a:rPr lang="en-US" dirty="0"/>
-              <a:t>Reoccurring programs</a:t>
+              <a:t> Running</a:t>
             </a:r>
             <a:endParaRPr lang="fr-CA" dirty="0"/>
           </a:p>
         </p:txBody>
       </p:sp>
-      <p:graphicFrame>
-        <p:nvGraphicFramePr>
-          <p:cNvPr id="5" name="Content Placeholder 4">
-            <a:extLst>
-              <a:ext uri="{FF2B5EF4-FFF2-40B4-BE49-F238E27FC236}">
-                <a16:creationId xmlns:a16="http://schemas.microsoft.com/office/drawing/2014/main" id="{8F68204E-F95C-4EE6-84D7-A7FE7E2FAB7F}"/>
-              </a:ext>
-            </a:extLst>
-          </p:cNvPr>
-          <p:cNvGraphicFramePr>
-            <a:graphicFrameLocks noGrp="1"/>
-          </p:cNvGraphicFramePr>
-          <p:nvPr>
-            <p:ph idx="1"/>
-            <p:extLst>
-              <p:ext uri="{D42A27DB-BD31-4B8C-83A1-F6EECF244321}">
-                <p14:modId xmlns:p14="http://schemas.microsoft.com/office/powerpoint/2010/main" val="3667617667"/>
-              </p:ext>
-            </p:extLst>
-          </p:nvPr>
-        </p:nvGraphicFramePr>
-        <p:xfrm>
-          <a:off x="3867150" y="868363"/>
-          <a:ext cx="7315200" cy="5121275"/>
-        </p:xfrm>
-        <a:graphic>
-          <a:graphicData uri="http://schemas.openxmlformats.org/drawingml/2006/diagram">
-            <dgm:relIds xmlns:dgm="http://schemas.openxmlformats.org/drawingml/2006/diagram" xmlns:r="http://schemas.openxmlformats.org/officeDocument/2006/relationships" r:dm="rId2" r:lo="rId3" r:qs="rId4" r:cs="rId5"/>
-          </a:graphicData>
-        </a:graphic>
-      </p:graphicFrame>
       <p:sp>
         <p:nvSpPr>
           <p:cNvPr id="4" name="Text Placeholder 3">
             <a:extLst>
               <a:ext uri="{FF2B5EF4-FFF2-40B4-BE49-F238E27FC236}">
-                <a16:creationId xmlns:a16="http://schemas.microsoft.com/office/drawing/2014/main" id="{734A07F1-973D-4E00-ACA7-9FE52C52E28B}"/>
+                <a16:creationId xmlns:a16="http://schemas.microsoft.com/office/drawing/2014/main" id="{B059A18B-9299-4AD4-AF09-AAA8C675F5CF}"/>
               </a:ext>
             </a:extLst>
           </p:cNvPr>
@@ -22500,18 +23069,44 @@
           <a:bodyPr/>
           <a:lstStyle/>
           <a:p>
-            <a:r>
-              <a:rPr lang="en-US" dirty="0"/>
-              <a:t>Need to be setup via Windows Task Scheduler </a:t>
-            </a:r>
-            <a:endParaRPr lang="fr-CA" dirty="0"/>
+            <a:endParaRPr lang="fr-CA"/>
           </a:p>
         </p:txBody>
       </p:sp>
+      <p:pic>
+        <p:nvPicPr>
+          <p:cNvPr id="8" name="Picture 7">
+            <a:extLst>
+              <a:ext uri="{FF2B5EF4-FFF2-40B4-BE49-F238E27FC236}">
+                <a16:creationId xmlns:a16="http://schemas.microsoft.com/office/drawing/2014/main" id="{8310F9D6-F365-4576-B882-DFF02B8C4CFF}"/>
+              </a:ext>
+            </a:extLst>
+          </p:cNvPr>
+          <p:cNvPicPr>
+            <a:picLocks noChangeAspect="1"/>
+          </p:cNvPicPr>
+          <p:nvPr/>
+        </p:nvPicPr>
+        <p:blipFill>
+          <a:blip r:embed="rId2"/>
+          <a:stretch>
+            <a:fillRect/>
+          </a:stretch>
+        </p:blipFill>
+        <p:spPr>
+          <a:xfrm>
+            <a:off x="3724712" y="1292270"/>
+            <a:ext cx="7896894" cy="4456339"/>
+          </a:xfrm>
+          <a:prstGeom prst="rect">
+            <a:avLst/>
+          </a:prstGeom>
+        </p:spPr>
+      </p:pic>
     </p:spTree>
     <p:extLst>
       <p:ext uri="{BB962C8B-B14F-4D97-AF65-F5344CB8AC3E}">
-        <p14:creationId xmlns:p14="http://schemas.microsoft.com/office/powerpoint/2010/main" val="2626867415"/>
+        <p14:creationId xmlns:p14="http://schemas.microsoft.com/office/powerpoint/2010/main" val="1914247205"/>
       </p:ext>
     </p:extLst>
   </p:cSld>

</xml_diff>

<commit_message>
AutoHotkey change takes in the barcode properly, and doesnt require two scans QA Sheet Added Readme/ppt updated Config Sheet properly printing
</commit_message>
<xml_diff>
--- a/LabelSerialNumberChangeProposal.pptx
+++ b/LabelSerialNumberChangeProposal.pptx
@@ -3968,7 +3968,7 @@
           </a:br>
           <a:r>
             <a:rPr lang="en-US" dirty="0"/>
-            <a:t>+2 .</a:t>
+            <a:t>+3 .</a:t>
           </a:r>
           <a:r>
             <a:rPr lang="en-US" dirty="0" err="1"/>
@@ -4027,58 +4027,6 @@
       </dgm:t>
     </dgm:pt>
     <dgm:pt modelId="{8B6F1219-C0C9-42EE-A202-422710B569C5}" type="sibTrans" cxnId="{DB621BB4-1721-46CA-9C90-60643B419F26}">
-      <dgm:prSet/>
-      <dgm:spPr/>
-      <dgm:t>
-        <a:bodyPr/>
-        <a:lstStyle/>
-        <a:p>
-          <a:endParaRPr lang="fr-CA"/>
-        </a:p>
-      </dgm:t>
-    </dgm:pt>
-    <dgm:pt modelId="{4A4E3E50-38C2-4C3C-AE96-953BA26A11C9}">
-      <dgm:prSet/>
-      <dgm:spPr/>
-      <dgm:t>
-        <a:bodyPr/>
-        <a:lstStyle/>
-        <a:p>
-          <a:r>
-            <a:rPr lang="en-US" dirty="0"/>
-            <a:t>printWIP.bat</a:t>
-          </a:r>
-          <a:br>
-            <a:rPr lang="en-US" dirty="0"/>
-          </a:br>
-          <a:r>
-            <a:rPr lang="en-US" dirty="0"/>
-            <a:t>+2 .</a:t>
-          </a:r>
-          <a:r>
-            <a:rPr lang="en-US" dirty="0" err="1"/>
-            <a:t>rpt</a:t>
-          </a:r>
-          <a:r>
-            <a:rPr lang="en-US" dirty="0"/>
-            <a:t> +.docx</a:t>
-          </a:r>
-          <a:endParaRPr lang="fr-CA" dirty="0"/>
-        </a:p>
-      </dgm:t>
-    </dgm:pt>
-    <dgm:pt modelId="{F4856804-261D-4CA9-AEA7-CB9CCF3B24D3}" type="sibTrans" cxnId="{F1DC65E4-3406-49EF-8BD7-3B43D972B953}">
-      <dgm:prSet/>
-      <dgm:spPr/>
-      <dgm:t>
-        <a:bodyPr/>
-        <a:lstStyle/>
-        <a:p>
-          <a:endParaRPr lang="fr-CA"/>
-        </a:p>
-      </dgm:t>
-    </dgm:pt>
-    <dgm:pt modelId="{F92BA4C8-D8E7-4F76-9AE8-619682ED5A87}" type="parTrans" cxnId="{F1DC65E4-3406-49EF-8BD7-3B43D972B953}">
       <dgm:prSet/>
       <dgm:spPr/>
       <dgm:t>
@@ -4163,7 +4111,7 @@
         </a:p>
       </dgm:t>
     </dgm:pt>
-    <dgm:pt modelId="{DCC0585E-4EEF-477E-9E64-47DB63E3B1F0}">
+    <dgm:pt modelId="{4A4E3E50-38C2-4C3C-AE96-953BA26A11C9}">
       <dgm:prSet/>
       <dgm:spPr/>
       <dgm:t>
@@ -4171,25 +4119,29 @@
         <a:lstStyle/>
         <a:p>
           <a:r>
-            <a:rPr lang="en-US" i="1" dirty="0"/>
-            <a:t>printQA.bat</a:t>
+            <a:rPr lang="en-US" dirty="0"/>
+            <a:t>printWIP.bat</a:t>
           </a:r>
           <a:br>
-            <a:rPr lang="en-US" i="1" dirty="0"/>
+            <a:rPr lang="en-US" dirty="0"/>
           </a:br>
           <a:r>
-            <a:rPr lang="en-US" i="1" dirty="0"/>
-            <a:t>+1 .</a:t>
+            <a:rPr lang="en-US" dirty="0"/>
+            <a:t>+2 .</a:t>
           </a:r>
           <a:r>
-            <a:rPr lang="en-US" i="1" dirty="0" err="1"/>
+            <a:rPr lang="en-US" dirty="0" err="1"/>
             <a:t>rpt</a:t>
           </a:r>
-          <a:endParaRPr lang="fr-CA" i="1" dirty="0"/>
+          <a:r>
+            <a:rPr lang="en-US" dirty="0"/>
+            <a:t> +.docx</a:t>
+          </a:r>
+          <a:endParaRPr lang="fr-CA" dirty="0"/>
         </a:p>
       </dgm:t>
     </dgm:pt>
-    <dgm:pt modelId="{5E696FD1-73A9-49CE-9C82-A67D5179851A}" type="parTrans" cxnId="{933C0776-BD08-42D1-ADA6-BA5B5B3BC905}">
+    <dgm:pt modelId="{F4856804-261D-4CA9-AEA7-CB9CCF3B24D3}" type="sibTrans" cxnId="{F1DC65E4-3406-49EF-8BD7-3B43D972B953}">
       <dgm:prSet/>
       <dgm:spPr/>
       <dgm:t>
@@ -4200,7 +4152,7 @@
         </a:p>
       </dgm:t>
     </dgm:pt>
-    <dgm:pt modelId="{D959DD05-460A-431F-803F-199126E0D621}" type="sibTrans" cxnId="{933C0776-BD08-42D1-ADA6-BA5B5B3BC905}">
+    <dgm:pt modelId="{F92BA4C8-D8E7-4F76-9AE8-619682ED5A87}" type="parTrans" cxnId="{F1DC65E4-3406-49EF-8BD7-3B43D972B953}">
       <dgm:prSet/>
       <dgm:spPr/>
       <dgm:t>
@@ -4285,7 +4237,7 @@
       <dgm:spPr/>
     </dgm:pt>
     <dgm:pt modelId="{CA698B96-2FDD-477F-82FD-3398AEE00C53}" type="pres">
-      <dgm:prSet presAssocID="{E91B2509-2172-40BF-92BF-95C71C842B9D}" presName="Name37" presStyleLbl="parChTrans1D3" presStyleIdx="0" presStyleCnt="5"/>
+      <dgm:prSet presAssocID="{E91B2509-2172-40BF-92BF-95C71C842B9D}" presName="Name37" presStyleLbl="parChTrans1D3" presStyleIdx="0" presStyleCnt="4"/>
       <dgm:spPr/>
     </dgm:pt>
     <dgm:pt modelId="{473DEF0C-42E2-4A50-856D-1F839CCF32C4}" type="pres">
@@ -4301,7 +4253,7 @@
       <dgm:spPr/>
     </dgm:pt>
     <dgm:pt modelId="{CB2F9E2B-60EC-401F-A7AE-483C76BC0EC4}" type="pres">
-      <dgm:prSet presAssocID="{C1DA3676-0503-49EC-84DF-0840E579CFEF}" presName="rootText" presStyleLbl="node3" presStyleIdx="0" presStyleCnt="4">
+      <dgm:prSet presAssocID="{C1DA3676-0503-49EC-84DF-0840E579CFEF}" presName="rootText" presStyleLbl="node3" presStyleIdx="0" presStyleCnt="3">
         <dgm:presLayoutVars>
           <dgm:chPref val="3"/>
         </dgm:presLayoutVars>
@@ -4309,7 +4261,7 @@
       <dgm:spPr/>
     </dgm:pt>
     <dgm:pt modelId="{87894099-6401-42BD-9593-FCCC7AE42C49}" type="pres">
-      <dgm:prSet presAssocID="{C1DA3676-0503-49EC-84DF-0840E579CFEF}" presName="rootConnector" presStyleLbl="node3" presStyleIdx="0" presStyleCnt="4"/>
+      <dgm:prSet presAssocID="{C1DA3676-0503-49EC-84DF-0840E579CFEF}" presName="rootConnector" presStyleLbl="node3" presStyleIdx="0" presStyleCnt="3"/>
       <dgm:spPr/>
     </dgm:pt>
     <dgm:pt modelId="{5AB908CA-153D-4CCC-9357-A7CB91FB315D}" type="pres">
@@ -4321,7 +4273,7 @@
       <dgm:spPr/>
     </dgm:pt>
     <dgm:pt modelId="{28A959D3-8E8F-4C33-8E58-743CD226A445}" type="pres">
-      <dgm:prSet presAssocID="{8F3C6AC4-A53B-4B83-A481-13534CEBBE7D}" presName="Name37" presStyleLbl="parChTrans1D3" presStyleIdx="1" presStyleCnt="5"/>
+      <dgm:prSet presAssocID="{8F3C6AC4-A53B-4B83-A481-13534CEBBE7D}" presName="Name37" presStyleLbl="parChTrans1D3" presStyleIdx="1" presStyleCnt="4"/>
       <dgm:spPr/>
     </dgm:pt>
     <dgm:pt modelId="{9942EE3E-75B3-40C5-9515-14C899144BE6}" type="pres">
@@ -4337,7 +4289,7 @@
       <dgm:spPr/>
     </dgm:pt>
     <dgm:pt modelId="{227A2695-8EBE-4628-A9EE-801697A0D3C2}" type="pres">
-      <dgm:prSet presAssocID="{4DE9C598-B23B-4383-915B-55E3A905EC09}" presName="rootText" presStyleLbl="node3" presStyleIdx="1" presStyleCnt="4">
+      <dgm:prSet presAssocID="{4DE9C598-B23B-4383-915B-55E3A905EC09}" presName="rootText" presStyleLbl="node3" presStyleIdx="1" presStyleCnt="3">
         <dgm:presLayoutVars>
           <dgm:chPref val="3"/>
         </dgm:presLayoutVars>
@@ -4345,7 +4297,7 @@
       <dgm:spPr/>
     </dgm:pt>
     <dgm:pt modelId="{EAF98DA0-A25D-4689-9A35-0FB204C4D414}" type="pres">
-      <dgm:prSet presAssocID="{4DE9C598-B23B-4383-915B-55E3A905EC09}" presName="rootConnector" presStyleLbl="node3" presStyleIdx="1" presStyleCnt="4"/>
+      <dgm:prSet presAssocID="{4DE9C598-B23B-4383-915B-55E3A905EC09}" presName="rootConnector" presStyleLbl="node3" presStyleIdx="1" presStyleCnt="3"/>
       <dgm:spPr/>
     </dgm:pt>
     <dgm:pt modelId="{B1130AF9-6FE0-4F08-9475-22188116C08D}" type="pres">
@@ -4392,44 +4344,8 @@
       <dgm:prSet presAssocID="{A7E99E54-94B2-4D9C-82A3-E8D7CBB0FC6A}" presName="hierChild7" presStyleCnt="0"/>
       <dgm:spPr/>
     </dgm:pt>
-    <dgm:pt modelId="{D2C33EE2-902F-4DEC-A486-716BCF9C574A}" type="pres">
-      <dgm:prSet presAssocID="{5E696FD1-73A9-49CE-9C82-A67D5179851A}" presName="Name37" presStyleLbl="parChTrans1D3" presStyleIdx="2" presStyleCnt="5"/>
-      <dgm:spPr/>
-    </dgm:pt>
-    <dgm:pt modelId="{ECCFF307-6359-4DCA-BF55-ED05B5388428}" type="pres">
-      <dgm:prSet presAssocID="{DCC0585E-4EEF-477E-9E64-47DB63E3B1F0}" presName="hierRoot2" presStyleCnt="0">
-        <dgm:presLayoutVars>
-          <dgm:hierBranch val="init"/>
-        </dgm:presLayoutVars>
-      </dgm:prSet>
-      <dgm:spPr/>
-    </dgm:pt>
-    <dgm:pt modelId="{E1A219C8-0B21-4371-AEDF-DFE36A8898FB}" type="pres">
-      <dgm:prSet presAssocID="{DCC0585E-4EEF-477E-9E64-47DB63E3B1F0}" presName="rootComposite" presStyleCnt="0"/>
-      <dgm:spPr/>
-    </dgm:pt>
-    <dgm:pt modelId="{E16286B1-F6DD-435B-8D33-2273810FC772}" type="pres">
-      <dgm:prSet presAssocID="{DCC0585E-4EEF-477E-9E64-47DB63E3B1F0}" presName="rootText" presStyleLbl="node3" presStyleIdx="2" presStyleCnt="4">
-        <dgm:presLayoutVars>
-          <dgm:chPref val="3"/>
-        </dgm:presLayoutVars>
-      </dgm:prSet>
-      <dgm:spPr/>
-    </dgm:pt>
-    <dgm:pt modelId="{05167FCA-E22E-4DDC-A69D-5406D39E103B}" type="pres">
-      <dgm:prSet presAssocID="{DCC0585E-4EEF-477E-9E64-47DB63E3B1F0}" presName="rootConnector" presStyleLbl="node3" presStyleIdx="2" presStyleCnt="4"/>
-      <dgm:spPr/>
-    </dgm:pt>
-    <dgm:pt modelId="{04B065D9-B02C-48CA-909E-658C017FE0CF}" type="pres">
-      <dgm:prSet presAssocID="{DCC0585E-4EEF-477E-9E64-47DB63E3B1F0}" presName="hierChild4" presStyleCnt="0"/>
-      <dgm:spPr/>
-    </dgm:pt>
-    <dgm:pt modelId="{C39E0C51-7389-4934-9866-1F5F14D69376}" type="pres">
-      <dgm:prSet presAssocID="{DCC0585E-4EEF-477E-9E64-47DB63E3B1F0}" presName="hierChild5" presStyleCnt="0"/>
-      <dgm:spPr/>
-    </dgm:pt>
     <dgm:pt modelId="{36F9C691-4B50-4159-9F42-B35EF32A6B44}" type="pres">
-      <dgm:prSet presAssocID="{F92BA4C8-D8E7-4F76-9AE8-619682ED5A87}" presName="Name37" presStyleLbl="parChTrans1D3" presStyleIdx="3" presStyleCnt="5"/>
+      <dgm:prSet presAssocID="{F92BA4C8-D8E7-4F76-9AE8-619682ED5A87}" presName="Name37" presStyleLbl="parChTrans1D3" presStyleIdx="2" presStyleCnt="4"/>
       <dgm:spPr/>
     </dgm:pt>
     <dgm:pt modelId="{312C63B7-2356-4591-A8D8-CB4355394DE3}" type="pres">
@@ -4445,7 +4361,7 @@
       <dgm:spPr/>
     </dgm:pt>
     <dgm:pt modelId="{B7B9E35F-3141-4501-8C8E-ECDBA7C3D699}" type="pres">
-      <dgm:prSet presAssocID="{4A4E3E50-38C2-4C3C-AE96-953BA26A11C9}" presName="rootText" presStyleLbl="node3" presStyleIdx="3" presStyleCnt="4">
+      <dgm:prSet presAssocID="{4A4E3E50-38C2-4C3C-AE96-953BA26A11C9}" presName="rootText" presStyleLbl="node3" presStyleIdx="2" presStyleCnt="3">
         <dgm:presLayoutVars>
           <dgm:chPref val="3"/>
         </dgm:presLayoutVars>
@@ -4453,7 +4369,7 @@
       <dgm:spPr/>
     </dgm:pt>
     <dgm:pt modelId="{7914E8B1-80D5-4A71-9775-0A174E4B78BC}" type="pres">
-      <dgm:prSet presAssocID="{4A4E3E50-38C2-4C3C-AE96-953BA26A11C9}" presName="rootConnector" presStyleLbl="node3" presStyleIdx="3" presStyleCnt="4"/>
+      <dgm:prSet presAssocID="{4A4E3E50-38C2-4C3C-AE96-953BA26A11C9}" presName="rootConnector" presStyleLbl="node3" presStyleIdx="2" presStyleCnt="3"/>
       <dgm:spPr/>
     </dgm:pt>
     <dgm:pt modelId="{9A41BE5B-11A2-49DE-9691-74C1D4BA987E}" type="pres">
@@ -4469,7 +4385,7 @@
       <dgm:spPr/>
     </dgm:pt>
     <dgm:pt modelId="{FC040049-51F5-41BD-8A19-8EF975D2FEC2}" type="pres">
-      <dgm:prSet presAssocID="{F5961BDC-783E-4C07-BC92-9011F5BBD285}" presName="Name111" presStyleLbl="parChTrans1D3" presStyleIdx="4" presStyleCnt="5"/>
+      <dgm:prSet presAssocID="{F5961BDC-783E-4C07-BC92-9011F5BBD285}" presName="Name111" presStyleLbl="parChTrans1D3" presStyleIdx="3" presStyleCnt="4"/>
       <dgm:spPr/>
     </dgm:pt>
     <dgm:pt modelId="{E0DB40E2-3599-401C-9680-5F546B644036}" type="pres">
@@ -4513,16 +4429,13 @@
     <dgm:cxn modelId="{EC288514-5953-4371-B614-67E2587A0632}" type="presOf" srcId="{8F3C6AC4-A53B-4B83-A481-13534CEBBE7D}" destId="{28A959D3-8E8F-4C33-8E58-743CD226A445}" srcOrd="0" destOrd="0" presId="urn:microsoft.com/office/officeart/2005/8/layout/orgChart1"/>
     <dgm:cxn modelId="{E6F4F318-A20C-4F11-A512-B27325BAF16D}" type="presOf" srcId="{1763EED3-26D7-4B0E-B022-1B72A013A70C}" destId="{CDB323ED-45A3-4822-B212-E9401A6C85A9}" srcOrd="1" destOrd="0" presId="urn:microsoft.com/office/officeart/2005/8/layout/orgChart1"/>
     <dgm:cxn modelId="{824EB01B-7989-4B5E-B04F-F041A0FBE0D9}" type="presOf" srcId="{12B359AD-F8D0-452E-9FE6-4E1434D70F15}" destId="{62E9EE9C-9C61-429A-9C9D-4DB0E88E4329}" srcOrd="1" destOrd="0" presId="urn:microsoft.com/office/officeart/2005/8/layout/orgChart1"/>
-    <dgm:cxn modelId="{4D05E120-7DBB-46A6-B2C5-DF7850427A80}" type="presOf" srcId="{5E696FD1-73A9-49CE-9C82-A67D5179851A}" destId="{D2C33EE2-902F-4DEC-A486-716BCF9C574A}" srcOrd="0" destOrd="0" presId="urn:microsoft.com/office/officeart/2005/8/layout/orgChart1"/>
     <dgm:cxn modelId="{D4789563-D13B-4B08-BDCA-385B520F591F}" type="presOf" srcId="{A7BDC5C7-F208-4337-83DA-CEAB2AF8A6E8}" destId="{CA2AF3D0-A783-4F4A-AF16-39637F115AA6}" srcOrd="0" destOrd="0" presId="urn:microsoft.com/office/officeart/2005/8/layout/orgChart1"/>
     <dgm:cxn modelId="{B22BB143-FF24-4728-B175-EA1552D06D94}" type="presOf" srcId="{B11103E8-CD81-40BE-B579-4FCAB035D7D0}" destId="{4E2D0EDB-C4D6-450E-83EA-96CF439066D6}" srcOrd="1" destOrd="0" presId="urn:microsoft.com/office/officeart/2005/8/layout/orgChart1"/>
     <dgm:cxn modelId="{175ED643-4624-4279-9AC0-71B49AB06463}" type="presOf" srcId="{12B359AD-F8D0-452E-9FE6-4E1434D70F15}" destId="{92DD8E95-5792-4CAF-BBE2-B190055FFE9B}" srcOrd="0" destOrd="0" presId="urn:microsoft.com/office/officeart/2005/8/layout/orgChart1"/>
     <dgm:cxn modelId="{19586B45-307A-4F82-965B-3618C233D3C3}" type="presOf" srcId="{C1DA3676-0503-49EC-84DF-0840E579CFEF}" destId="{87894099-6401-42BD-9593-FCCC7AE42C49}" srcOrd="1" destOrd="0" presId="urn:microsoft.com/office/officeart/2005/8/layout/orgChart1"/>
     <dgm:cxn modelId="{198BD745-2D9F-4E83-921B-DBA00E038AA2}" type="presOf" srcId="{1763EED3-26D7-4B0E-B022-1B72A013A70C}" destId="{B7666E4B-FE3C-4B7F-ADE2-C772AB73DAAC}" srcOrd="0" destOrd="0" presId="urn:microsoft.com/office/officeart/2005/8/layout/orgChart1"/>
-    <dgm:cxn modelId="{5F4F376D-5620-4216-AF82-C04C5F55E5B0}" type="presOf" srcId="{DCC0585E-4EEF-477E-9E64-47DB63E3B1F0}" destId="{E16286B1-F6DD-435B-8D33-2273810FC772}" srcOrd="0" destOrd="0" presId="urn:microsoft.com/office/officeart/2005/8/layout/orgChart1"/>
     <dgm:cxn modelId="{56DEE571-1D10-4A28-9146-2F3255577C1A}" srcId="{B11103E8-CD81-40BE-B579-4FCAB035D7D0}" destId="{C1DA3676-0503-49EC-84DF-0840E579CFEF}" srcOrd="0" destOrd="0" parTransId="{E91B2509-2172-40BF-92BF-95C71C842B9D}" sibTransId="{249178E8-CF68-4256-8FB4-C392210D1F0F}"/>
     <dgm:cxn modelId="{1DE58273-423C-4229-8419-B58F7186758D}" type="presOf" srcId="{F92BA4C8-D8E7-4F76-9AE8-619682ED5A87}" destId="{36F9C691-4B50-4159-9F42-B35EF32A6B44}" srcOrd="0" destOrd="0" presId="urn:microsoft.com/office/officeart/2005/8/layout/orgChart1"/>
-    <dgm:cxn modelId="{933C0776-BD08-42D1-ADA6-BA5B5B3BC905}" srcId="{B11103E8-CD81-40BE-B579-4FCAB035D7D0}" destId="{DCC0585E-4EEF-477E-9E64-47DB63E3B1F0}" srcOrd="2" destOrd="0" parTransId="{5E696FD1-73A9-49CE-9C82-A67D5179851A}" sibTransId="{D959DD05-460A-431F-803F-199126E0D621}"/>
     <dgm:cxn modelId="{A0CB5C58-44FD-4B28-8DA0-AC4381DFBDCD}" type="presOf" srcId="{4A4E3E50-38C2-4C3C-AE96-953BA26A11C9}" destId="{B7B9E35F-3141-4501-8C8E-ECDBA7C3D699}" srcOrd="0" destOrd="0" presId="urn:microsoft.com/office/officeart/2005/8/layout/orgChart1"/>
     <dgm:cxn modelId="{67EF6583-DA13-4DCD-B2C7-E01EC5ABDE4A}" srcId="{EC376E4E-E648-41DA-86DB-8DA8BA5FAEC7}" destId="{12B359AD-F8D0-452E-9FE6-4E1434D70F15}" srcOrd="0" destOrd="0" parTransId="{F38279A6-DA67-4CAC-9D98-9FD4DBAA81BE}" sibTransId="{718721CD-C249-4EFA-880F-8D85A96569A0}"/>
     <dgm:cxn modelId="{B6C0118D-A2B4-48B2-9D92-51426B77C601}" type="presOf" srcId="{F5961BDC-783E-4C07-BC92-9011F5BBD285}" destId="{FC040049-51F5-41BD-8A19-8EF975D2FEC2}" srcOrd="0" destOrd="0" presId="urn:microsoft.com/office/officeart/2005/8/layout/orgChart1"/>
@@ -4531,13 +4444,12 @@
     <dgm:cxn modelId="{E964689A-B3A3-4628-A308-30C81D211922}" type="presOf" srcId="{EC376E4E-E648-41DA-86DB-8DA8BA5FAEC7}" destId="{1FB3CEF6-77BB-4E6C-A2DD-4A3F7EC690C5}" srcOrd="0" destOrd="0" presId="urn:microsoft.com/office/officeart/2005/8/layout/orgChart1"/>
     <dgm:cxn modelId="{E02A83A2-B2E9-46F4-AF77-D471A4A0459A}" type="presOf" srcId="{4DE9C598-B23B-4383-915B-55E3A905EC09}" destId="{EAF98DA0-A25D-4689-9A35-0FB204C4D414}" srcOrd="1" destOrd="0" presId="urn:microsoft.com/office/officeart/2005/8/layout/orgChart1"/>
     <dgm:cxn modelId="{169577A9-2FA2-4D9B-B2B3-3293E28A18B5}" srcId="{12B359AD-F8D0-452E-9FE6-4E1434D70F15}" destId="{B11103E8-CD81-40BE-B579-4FCAB035D7D0}" srcOrd="0" destOrd="0" parTransId="{8EAAB40C-C46B-4763-9B19-143C18560BB8}" sibTransId="{066CED9E-DDC2-4B20-81DF-84AEF02375EA}"/>
-    <dgm:cxn modelId="{DB621BB4-1721-46CA-9C90-60643B419F26}" srcId="{B11103E8-CD81-40BE-B579-4FCAB035D7D0}" destId="{1763EED3-26D7-4B0E-B022-1B72A013A70C}" srcOrd="4" destOrd="0" parTransId="{F5961BDC-783E-4C07-BC92-9011F5BBD285}" sibTransId="{8B6F1219-C0C9-42EE-A202-422710B569C5}"/>
+    <dgm:cxn modelId="{DB621BB4-1721-46CA-9C90-60643B419F26}" srcId="{B11103E8-CD81-40BE-B579-4FCAB035D7D0}" destId="{1763EED3-26D7-4B0E-B022-1B72A013A70C}" srcOrd="3" destOrd="0" parTransId="{F5961BDC-783E-4C07-BC92-9011F5BBD285}" sibTransId="{8B6F1219-C0C9-42EE-A202-422710B569C5}"/>
     <dgm:cxn modelId="{8A53A4C3-6031-4734-B3C1-7BBE70A6195C}" type="presOf" srcId="{A7E99E54-94B2-4D9C-82A3-E8D7CBB0FC6A}" destId="{54DB9B34-E7B2-41DC-B13D-F457F995CDFC}" srcOrd="0" destOrd="0" presId="urn:microsoft.com/office/officeart/2005/8/layout/orgChart1"/>
     <dgm:cxn modelId="{2D5715C6-4B16-4AF8-A0C8-2697B477409C}" type="presOf" srcId="{4A4E3E50-38C2-4C3C-AE96-953BA26A11C9}" destId="{7914E8B1-80D5-4A71-9775-0A174E4B78BC}" srcOrd="1" destOrd="0" presId="urn:microsoft.com/office/officeart/2005/8/layout/orgChart1"/>
     <dgm:cxn modelId="{756917CD-3304-41C1-83A7-9955CB260BC6}" type="presOf" srcId="{8EAAB40C-C46B-4763-9B19-143C18560BB8}" destId="{4F485F08-228B-4F23-9920-ED58748DD612}" srcOrd="0" destOrd="0" presId="urn:microsoft.com/office/officeart/2005/8/layout/orgChart1"/>
-    <dgm:cxn modelId="{027DE8CD-8FAF-4678-A5D7-7F37B082E9FC}" type="presOf" srcId="{DCC0585E-4EEF-477E-9E64-47DB63E3B1F0}" destId="{05167FCA-E22E-4DDC-A69D-5406D39E103B}" srcOrd="1" destOrd="0" presId="urn:microsoft.com/office/officeart/2005/8/layout/orgChart1"/>
     <dgm:cxn modelId="{931F97D1-3692-4A52-A385-70D3E0FA82DE}" type="presOf" srcId="{E91B2509-2172-40BF-92BF-95C71C842B9D}" destId="{CA698B96-2FDD-477F-82FD-3398AEE00C53}" srcOrd="0" destOrd="0" presId="urn:microsoft.com/office/officeart/2005/8/layout/orgChart1"/>
-    <dgm:cxn modelId="{F1DC65E4-3406-49EF-8BD7-3B43D972B953}" srcId="{B11103E8-CD81-40BE-B579-4FCAB035D7D0}" destId="{4A4E3E50-38C2-4C3C-AE96-953BA26A11C9}" srcOrd="3" destOrd="0" parTransId="{F92BA4C8-D8E7-4F76-9AE8-619682ED5A87}" sibTransId="{F4856804-261D-4CA9-AEA7-CB9CCF3B24D3}"/>
+    <dgm:cxn modelId="{F1DC65E4-3406-49EF-8BD7-3B43D972B953}" srcId="{B11103E8-CD81-40BE-B579-4FCAB035D7D0}" destId="{4A4E3E50-38C2-4C3C-AE96-953BA26A11C9}" srcOrd="2" destOrd="0" parTransId="{F92BA4C8-D8E7-4F76-9AE8-619682ED5A87}" sibTransId="{F4856804-261D-4CA9-AEA7-CB9CCF3B24D3}"/>
     <dgm:cxn modelId="{9C4E09F7-60C7-4A17-883C-565801E26701}" srcId="{4DE9C598-B23B-4383-915B-55E3A905EC09}" destId="{A7E99E54-94B2-4D9C-82A3-E8D7CBB0FC6A}" srcOrd="0" destOrd="0" parTransId="{A7BDC5C7-F208-4337-83DA-CEAB2AF8A6E8}" sibTransId="{E5ADC721-8733-4901-A13E-0A3C1A6D9EA5}"/>
     <dgm:cxn modelId="{ECEF2BFB-C19C-4668-B0B2-A06335D9AE4F}" type="presOf" srcId="{B11103E8-CD81-40BE-B579-4FCAB035D7D0}" destId="{F58A63D3-C78F-4550-80E7-D69343F847C2}" srcOrd="0" destOrd="0" presId="urn:microsoft.com/office/officeart/2005/8/layout/orgChart1"/>
     <dgm:cxn modelId="{AE87FEFC-59F2-4DF6-8D52-F70F37326785}" type="presOf" srcId="{A7E99E54-94B2-4D9C-82A3-E8D7CBB0FC6A}" destId="{89957609-8B97-47C3-AEE9-6DD7393B124C}" srcOrd="1" destOrd="0" presId="urn:microsoft.com/office/officeart/2005/8/layout/orgChart1"/>
@@ -4574,15 +4486,8 @@
     <dgm:cxn modelId="{95772096-7DBA-4E8C-91C6-4F8A0A64416C}" type="presParOf" srcId="{1ED732C6-4FB8-4A1E-BC80-51448E89ECFB}" destId="{89957609-8B97-47C3-AEE9-6DD7393B124C}" srcOrd="1" destOrd="0" presId="urn:microsoft.com/office/officeart/2005/8/layout/orgChart1"/>
     <dgm:cxn modelId="{2739B281-BD78-4410-BADC-C96574C56CCB}" type="presParOf" srcId="{1A754903-320B-4D58-8D1D-B1046E7A0C09}" destId="{98A76313-0002-4F08-8C2A-2C9E7CF86A01}" srcOrd="1" destOrd="0" presId="urn:microsoft.com/office/officeart/2005/8/layout/orgChart1"/>
     <dgm:cxn modelId="{1040F5D0-2127-428D-B706-9E5757FFC25A}" type="presParOf" srcId="{1A754903-320B-4D58-8D1D-B1046E7A0C09}" destId="{B66ED59C-56CC-4674-9E98-64456A927D23}" srcOrd="2" destOrd="0" presId="urn:microsoft.com/office/officeart/2005/8/layout/orgChart1"/>
-    <dgm:cxn modelId="{8665360A-069C-438B-B348-BE17BDD53A30}" type="presParOf" srcId="{DF366C04-0EC9-45EA-9E59-CA10E9616C42}" destId="{D2C33EE2-902F-4DEC-A486-716BCF9C574A}" srcOrd="4" destOrd="0" presId="urn:microsoft.com/office/officeart/2005/8/layout/orgChart1"/>
-    <dgm:cxn modelId="{210AD954-3BF6-41BA-BF9D-314A1DA0489C}" type="presParOf" srcId="{DF366C04-0EC9-45EA-9E59-CA10E9616C42}" destId="{ECCFF307-6359-4DCA-BF55-ED05B5388428}" srcOrd="5" destOrd="0" presId="urn:microsoft.com/office/officeart/2005/8/layout/orgChart1"/>
-    <dgm:cxn modelId="{FF80E84C-32E4-41F8-AE92-2B365DF8FC17}" type="presParOf" srcId="{ECCFF307-6359-4DCA-BF55-ED05B5388428}" destId="{E1A219C8-0B21-4371-AEDF-DFE36A8898FB}" srcOrd="0" destOrd="0" presId="urn:microsoft.com/office/officeart/2005/8/layout/orgChart1"/>
-    <dgm:cxn modelId="{89AFDE49-FEEF-49F4-A926-EE60B8CFF04C}" type="presParOf" srcId="{E1A219C8-0B21-4371-AEDF-DFE36A8898FB}" destId="{E16286B1-F6DD-435B-8D33-2273810FC772}" srcOrd="0" destOrd="0" presId="urn:microsoft.com/office/officeart/2005/8/layout/orgChart1"/>
-    <dgm:cxn modelId="{40F9ECC6-485F-4032-8331-0A512C8D41DF}" type="presParOf" srcId="{E1A219C8-0B21-4371-AEDF-DFE36A8898FB}" destId="{05167FCA-E22E-4DDC-A69D-5406D39E103B}" srcOrd="1" destOrd="0" presId="urn:microsoft.com/office/officeart/2005/8/layout/orgChart1"/>
-    <dgm:cxn modelId="{A28DB575-C011-4191-8075-82E820FE698A}" type="presParOf" srcId="{ECCFF307-6359-4DCA-BF55-ED05B5388428}" destId="{04B065D9-B02C-48CA-909E-658C017FE0CF}" srcOrd="1" destOrd="0" presId="urn:microsoft.com/office/officeart/2005/8/layout/orgChart1"/>
-    <dgm:cxn modelId="{5A0E0D31-0F75-4FA6-BA31-6F8C67F2952C}" type="presParOf" srcId="{ECCFF307-6359-4DCA-BF55-ED05B5388428}" destId="{C39E0C51-7389-4934-9866-1F5F14D69376}" srcOrd="2" destOrd="0" presId="urn:microsoft.com/office/officeart/2005/8/layout/orgChart1"/>
-    <dgm:cxn modelId="{9198E430-4E3B-4BE6-B09D-89FA0286C30C}" type="presParOf" srcId="{DF366C04-0EC9-45EA-9E59-CA10E9616C42}" destId="{36F9C691-4B50-4159-9F42-B35EF32A6B44}" srcOrd="6" destOrd="0" presId="urn:microsoft.com/office/officeart/2005/8/layout/orgChart1"/>
-    <dgm:cxn modelId="{2B36E909-34B6-4C95-8761-53C7FC7080B9}" type="presParOf" srcId="{DF366C04-0EC9-45EA-9E59-CA10E9616C42}" destId="{312C63B7-2356-4591-A8D8-CB4355394DE3}" srcOrd="7" destOrd="0" presId="urn:microsoft.com/office/officeart/2005/8/layout/orgChart1"/>
+    <dgm:cxn modelId="{9198E430-4E3B-4BE6-B09D-89FA0286C30C}" type="presParOf" srcId="{DF366C04-0EC9-45EA-9E59-CA10E9616C42}" destId="{36F9C691-4B50-4159-9F42-B35EF32A6B44}" srcOrd="4" destOrd="0" presId="urn:microsoft.com/office/officeart/2005/8/layout/orgChart1"/>
+    <dgm:cxn modelId="{2B36E909-34B6-4C95-8761-53C7FC7080B9}" type="presParOf" srcId="{DF366C04-0EC9-45EA-9E59-CA10E9616C42}" destId="{312C63B7-2356-4591-A8D8-CB4355394DE3}" srcOrd="5" destOrd="0" presId="urn:microsoft.com/office/officeart/2005/8/layout/orgChart1"/>
     <dgm:cxn modelId="{72D56477-E19B-4C56-8DCA-ABF4A3C334B7}" type="presParOf" srcId="{312C63B7-2356-4591-A8D8-CB4355394DE3}" destId="{980CD6A4-C2BD-46F1-9817-29D82D14EAD8}" srcOrd="0" destOrd="0" presId="urn:microsoft.com/office/officeart/2005/8/layout/orgChart1"/>
     <dgm:cxn modelId="{A760D4C3-30AD-46E6-BE5F-1C179C8D0BE2}" type="presParOf" srcId="{980CD6A4-C2BD-46F1-9817-29D82D14EAD8}" destId="{B7B9E35F-3141-4501-8C8E-ECDBA7C3D699}" srcOrd="0" destOrd="0" presId="urn:microsoft.com/office/officeart/2005/8/layout/orgChart1"/>
     <dgm:cxn modelId="{0B1DAF5E-956D-45F9-ABE7-38276EE83E97}" type="presParOf" srcId="{980CD6A4-C2BD-46F1-9817-29D82D14EAD8}" destId="{7914E8B1-80D5-4A71-9775-0A174E4B78BC}" srcOrd="1" destOrd="0" presId="urn:microsoft.com/office/officeart/2005/8/layout/orgChart1"/>
@@ -4881,43 +4786,6 @@
         </a:p>
       </dgm:t>
     </dgm:pt>
-    <dgm:pt modelId="{DCC0585E-4EEF-477E-9E64-47DB63E3B1F0}">
-      <dgm:prSet/>
-      <dgm:spPr/>
-      <dgm:t>
-        <a:bodyPr/>
-        <a:lstStyle/>
-        <a:p>
-          <a:r>
-            <a:rPr lang="en-US" i="1" dirty="0"/>
-            <a:t>batch</a:t>
-          </a:r>
-          <a:endParaRPr lang="fr-CA" i="1" dirty="0"/>
-        </a:p>
-      </dgm:t>
-    </dgm:pt>
-    <dgm:pt modelId="{5E696FD1-73A9-49CE-9C82-A67D5179851A}" type="parTrans" cxnId="{933C0776-BD08-42D1-ADA6-BA5B5B3BC905}">
-      <dgm:prSet/>
-      <dgm:spPr/>
-      <dgm:t>
-        <a:bodyPr/>
-        <a:lstStyle/>
-        <a:p>
-          <a:endParaRPr lang="fr-CA"/>
-        </a:p>
-      </dgm:t>
-    </dgm:pt>
-    <dgm:pt modelId="{D959DD05-460A-431F-803F-199126E0D621}" type="sibTrans" cxnId="{933C0776-BD08-42D1-ADA6-BA5B5B3BC905}">
-      <dgm:prSet/>
-      <dgm:spPr/>
-      <dgm:t>
-        <a:bodyPr/>
-        <a:lstStyle/>
-        <a:p>
-          <a:endParaRPr lang="fr-CA"/>
-        </a:p>
-      </dgm:t>
-    </dgm:pt>
     <dgm:pt modelId="{1FB3CEF6-77BB-4E6C-A2DD-4A3F7EC690C5}" type="pres">
       <dgm:prSet presAssocID="{EC376E4E-E648-41DA-86DB-8DA8BA5FAEC7}" presName="hierChild1" presStyleCnt="0">
         <dgm:presLayoutVars>
@@ -4992,7 +4860,7 @@
       <dgm:spPr/>
     </dgm:pt>
     <dgm:pt modelId="{CA698B96-2FDD-477F-82FD-3398AEE00C53}" type="pres">
-      <dgm:prSet presAssocID="{E91B2509-2172-40BF-92BF-95C71C842B9D}" presName="Name37" presStyleLbl="parChTrans1D3" presStyleIdx="0" presStyleCnt="5"/>
+      <dgm:prSet presAssocID="{E91B2509-2172-40BF-92BF-95C71C842B9D}" presName="Name37" presStyleLbl="parChTrans1D3" presStyleIdx="0" presStyleCnt="4"/>
       <dgm:spPr/>
     </dgm:pt>
     <dgm:pt modelId="{473DEF0C-42E2-4A50-856D-1F839CCF32C4}" type="pres">
@@ -5008,7 +4876,7 @@
       <dgm:spPr/>
     </dgm:pt>
     <dgm:pt modelId="{CB2F9E2B-60EC-401F-A7AE-483C76BC0EC4}" type="pres">
-      <dgm:prSet presAssocID="{C1DA3676-0503-49EC-84DF-0840E579CFEF}" presName="rootText" presStyleLbl="node3" presStyleIdx="0" presStyleCnt="4">
+      <dgm:prSet presAssocID="{C1DA3676-0503-49EC-84DF-0840E579CFEF}" presName="rootText" presStyleLbl="node3" presStyleIdx="0" presStyleCnt="3">
         <dgm:presLayoutVars>
           <dgm:chPref val="3"/>
         </dgm:presLayoutVars>
@@ -5016,7 +4884,7 @@
       <dgm:spPr/>
     </dgm:pt>
     <dgm:pt modelId="{87894099-6401-42BD-9593-FCCC7AE42C49}" type="pres">
-      <dgm:prSet presAssocID="{C1DA3676-0503-49EC-84DF-0840E579CFEF}" presName="rootConnector" presStyleLbl="node3" presStyleIdx="0" presStyleCnt="4"/>
+      <dgm:prSet presAssocID="{C1DA3676-0503-49EC-84DF-0840E579CFEF}" presName="rootConnector" presStyleLbl="node3" presStyleIdx="0" presStyleCnt="3"/>
       <dgm:spPr/>
     </dgm:pt>
     <dgm:pt modelId="{5AB908CA-153D-4CCC-9357-A7CB91FB315D}" type="pres">
@@ -5028,7 +4896,7 @@
       <dgm:spPr/>
     </dgm:pt>
     <dgm:pt modelId="{28A959D3-8E8F-4C33-8E58-743CD226A445}" type="pres">
-      <dgm:prSet presAssocID="{8F3C6AC4-A53B-4B83-A481-13534CEBBE7D}" presName="Name37" presStyleLbl="parChTrans1D3" presStyleIdx="1" presStyleCnt="5"/>
+      <dgm:prSet presAssocID="{8F3C6AC4-A53B-4B83-A481-13534CEBBE7D}" presName="Name37" presStyleLbl="parChTrans1D3" presStyleIdx="1" presStyleCnt="4"/>
       <dgm:spPr/>
     </dgm:pt>
     <dgm:pt modelId="{9942EE3E-75B3-40C5-9515-14C899144BE6}" type="pres">
@@ -5044,7 +4912,7 @@
       <dgm:spPr/>
     </dgm:pt>
     <dgm:pt modelId="{227A2695-8EBE-4628-A9EE-801697A0D3C2}" type="pres">
-      <dgm:prSet presAssocID="{4DE9C598-B23B-4383-915B-55E3A905EC09}" presName="rootText" presStyleLbl="node3" presStyleIdx="1" presStyleCnt="4">
+      <dgm:prSet presAssocID="{4DE9C598-B23B-4383-915B-55E3A905EC09}" presName="rootText" presStyleLbl="node3" presStyleIdx="1" presStyleCnt="3">
         <dgm:presLayoutVars>
           <dgm:chPref val="3"/>
         </dgm:presLayoutVars>
@@ -5052,7 +4920,7 @@
       <dgm:spPr/>
     </dgm:pt>
     <dgm:pt modelId="{EAF98DA0-A25D-4689-9A35-0FB204C4D414}" type="pres">
-      <dgm:prSet presAssocID="{4DE9C598-B23B-4383-915B-55E3A905EC09}" presName="rootConnector" presStyleLbl="node3" presStyleIdx="1" presStyleCnt="4"/>
+      <dgm:prSet presAssocID="{4DE9C598-B23B-4383-915B-55E3A905EC09}" presName="rootConnector" presStyleLbl="node3" presStyleIdx="1" presStyleCnt="3"/>
       <dgm:spPr/>
     </dgm:pt>
     <dgm:pt modelId="{B1130AF9-6FE0-4F08-9475-22188116C08D}" type="pres">
@@ -5099,44 +4967,8 @@
       <dgm:prSet presAssocID="{A7E99E54-94B2-4D9C-82A3-E8D7CBB0FC6A}" presName="hierChild7" presStyleCnt="0"/>
       <dgm:spPr/>
     </dgm:pt>
-    <dgm:pt modelId="{D2C33EE2-902F-4DEC-A486-716BCF9C574A}" type="pres">
-      <dgm:prSet presAssocID="{5E696FD1-73A9-49CE-9C82-A67D5179851A}" presName="Name37" presStyleLbl="parChTrans1D3" presStyleIdx="2" presStyleCnt="5"/>
-      <dgm:spPr/>
-    </dgm:pt>
-    <dgm:pt modelId="{ECCFF307-6359-4DCA-BF55-ED05B5388428}" type="pres">
-      <dgm:prSet presAssocID="{DCC0585E-4EEF-477E-9E64-47DB63E3B1F0}" presName="hierRoot2" presStyleCnt="0">
-        <dgm:presLayoutVars>
-          <dgm:hierBranch val="init"/>
-        </dgm:presLayoutVars>
-      </dgm:prSet>
-      <dgm:spPr/>
-    </dgm:pt>
-    <dgm:pt modelId="{E1A219C8-0B21-4371-AEDF-DFE36A8898FB}" type="pres">
-      <dgm:prSet presAssocID="{DCC0585E-4EEF-477E-9E64-47DB63E3B1F0}" presName="rootComposite" presStyleCnt="0"/>
-      <dgm:spPr/>
-    </dgm:pt>
-    <dgm:pt modelId="{E16286B1-F6DD-435B-8D33-2273810FC772}" type="pres">
-      <dgm:prSet presAssocID="{DCC0585E-4EEF-477E-9E64-47DB63E3B1F0}" presName="rootText" presStyleLbl="node3" presStyleIdx="2" presStyleCnt="4">
-        <dgm:presLayoutVars>
-          <dgm:chPref val="3"/>
-        </dgm:presLayoutVars>
-      </dgm:prSet>
-      <dgm:spPr/>
-    </dgm:pt>
-    <dgm:pt modelId="{05167FCA-E22E-4DDC-A69D-5406D39E103B}" type="pres">
-      <dgm:prSet presAssocID="{DCC0585E-4EEF-477E-9E64-47DB63E3B1F0}" presName="rootConnector" presStyleLbl="node3" presStyleIdx="2" presStyleCnt="4"/>
-      <dgm:spPr/>
-    </dgm:pt>
-    <dgm:pt modelId="{04B065D9-B02C-48CA-909E-658C017FE0CF}" type="pres">
-      <dgm:prSet presAssocID="{DCC0585E-4EEF-477E-9E64-47DB63E3B1F0}" presName="hierChild4" presStyleCnt="0"/>
-      <dgm:spPr/>
-    </dgm:pt>
-    <dgm:pt modelId="{C39E0C51-7389-4934-9866-1F5F14D69376}" type="pres">
-      <dgm:prSet presAssocID="{DCC0585E-4EEF-477E-9E64-47DB63E3B1F0}" presName="hierChild5" presStyleCnt="0"/>
-      <dgm:spPr/>
-    </dgm:pt>
     <dgm:pt modelId="{36F9C691-4B50-4159-9F42-B35EF32A6B44}" type="pres">
-      <dgm:prSet presAssocID="{F92BA4C8-D8E7-4F76-9AE8-619682ED5A87}" presName="Name37" presStyleLbl="parChTrans1D3" presStyleIdx="3" presStyleCnt="5"/>
+      <dgm:prSet presAssocID="{F92BA4C8-D8E7-4F76-9AE8-619682ED5A87}" presName="Name37" presStyleLbl="parChTrans1D3" presStyleIdx="2" presStyleCnt="4"/>
       <dgm:spPr/>
     </dgm:pt>
     <dgm:pt modelId="{312C63B7-2356-4591-A8D8-CB4355394DE3}" type="pres">
@@ -5152,7 +4984,7 @@
       <dgm:spPr/>
     </dgm:pt>
     <dgm:pt modelId="{B7B9E35F-3141-4501-8C8E-ECDBA7C3D699}" type="pres">
-      <dgm:prSet presAssocID="{4A4E3E50-38C2-4C3C-AE96-953BA26A11C9}" presName="rootText" presStyleLbl="node3" presStyleIdx="3" presStyleCnt="4">
+      <dgm:prSet presAssocID="{4A4E3E50-38C2-4C3C-AE96-953BA26A11C9}" presName="rootText" presStyleLbl="node3" presStyleIdx="2" presStyleCnt="3">
         <dgm:presLayoutVars>
           <dgm:chPref val="3"/>
         </dgm:presLayoutVars>
@@ -5160,7 +4992,7 @@
       <dgm:spPr/>
     </dgm:pt>
     <dgm:pt modelId="{7914E8B1-80D5-4A71-9775-0A174E4B78BC}" type="pres">
-      <dgm:prSet presAssocID="{4A4E3E50-38C2-4C3C-AE96-953BA26A11C9}" presName="rootConnector" presStyleLbl="node3" presStyleIdx="3" presStyleCnt="4"/>
+      <dgm:prSet presAssocID="{4A4E3E50-38C2-4C3C-AE96-953BA26A11C9}" presName="rootConnector" presStyleLbl="node3" presStyleIdx="2" presStyleCnt="3"/>
       <dgm:spPr/>
     </dgm:pt>
     <dgm:pt modelId="{9A41BE5B-11A2-49DE-9691-74C1D4BA987E}" type="pres">
@@ -5176,7 +5008,7 @@
       <dgm:spPr/>
     </dgm:pt>
     <dgm:pt modelId="{FC040049-51F5-41BD-8A19-8EF975D2FEC2}" type="pres">
-      <dgm:prSet presAssocID="{F5961BDC-783E-4C07-BC92-9011F5BBD285}" presName="Name111" presStyleLbl="parChTrans1D3" presStyleIdx="4" presStyleCnt="5"/>
+      <dgm:prSet presAssocID="{F5961BDC-783E-4C07-BC92-9011F5BBD285}" presName="Name111" presStyleLbl="parChTrans1D3" presStyleIdx="3" presStyleCnt="4"/>
       <dgm:spPr/>
     </dgm:pt>
     <dgm:pt modelId="{E0DB40E2-3599-401C-9680-5F546B644036}" type="pres">
@@ -5220,16 +5052,13 @@
     <dgm:cxn modelId="{EC288514-5953-4371-B614-67E2587A0632}" type="presOf" srcId="{8F3C6AC4-A53B-4B83-A481-13534CEBBE7D}" destId="{28A959D3-8E8F-4C33-8E58-743CD226A445}" srcOrd="0" destOrd="0" presId="urn:microsoft.com/office/officeart/2005/8/layout/orgChart1"/>
     <dgm:cxn modelId="{E6F4F318-A20C-4F11-A512-B27325BAF16D}" type="presOf" srcId="{1763EED3-26D7-4B0E-B022-1B72A013A70C}" destId="{CDB323ED-45A3-4822-B212-E9401A6C85A9}" srcOrd="1" destOrd="0" presId="urn:microsoft.com/office/officeart/2005/8/layout/orgChart1"/>
     <dgm:cxn modelId="{824EB01B-7989-4B5E-B04F-F041A0FBE0D9}" type="presOf" srcId="{12B359AD-F8D0-452E-9FE6-4E1434D70F15}" destId="{62E9EE9C-9C61-429A-9C9D-4DB0E88E4329}" srcOrd="1" destOrd="0" presId="urn:microsoft.com/office/officeart/2005/8/layout/orgChart1"/>
-    <dgm:cxn modelId="{4D05E120-7DBB-46A6-B2C5-DF7850427A80}" type="presOf" srcId="{5E696FD1-73A9-49CE-9C82-A67D5179851A}" destId="{D2C33EE2-902F-4DEC-A486-716BCF9C574A}" srcOrd="0" destOrd="0" presId="urn:microsoft.com/office/officeart/2005/8/layout/orgChart1"/>
     <dgm:cxn modelId="{D4789563-D13B-4B08-BDCA-385B520F591F}" type="presOf" srcId="{A7BDC5C7-F208-4337-83DA-CEAB2AF8A6E8}" destId="{CA2AF3D0-A783-4F4A-AF16-39637F115AA6}" srcOrd="0" destOrd="0" presId="urn:microsoft.com/office/officeart/2005/8/layout/orgChart1"/>
     <dgm:cxn modelId="{B22BB143-FF24-4728-B175-EA1552D06D94}" type="presOf" srcId="{B11103E8-CD81-40BE-B579-4FCAB035D7D0}" destId="{4E2D0EDB-C4D6-450E-83EA-96CF439066D6}" srcOrd="1" destOrd="0" presId="urn:microsoft.com/office/officeart/2005/8/layout/orgChart1"/>
     <dgm:cxn modelId="{175ED643-4624-4279-9AC0-71B49AB06463}" type="presOf" srcId="{12B359AD-F8D0-452E-9FE6-4E1434D70F15}" destId="{92DD8E95-5792-4CAF-BBE2-B190055FFE9B}" srcOrd="0" destOrd="0" presId="urn:microsoft.com/office/officeart/2005/8/layout/orgChart1"/>
     <dgm:cxn modelId="{19586B45-307A-4F82-965B-3618C233D3C3}" type="presOf" srcId="{C1DA3676-0503-49EC-84DF-0840E579CFEF}" destId="{87894099-6401-42BD-9593-FCCC7AE42C49}" srcOrd="1" destOrd="0" presId="urn:microsoft.com/office/officeart/2005/8/layout/orgChart1"/>
     <dgm:cxn modelId="{198BD745-2D9F-4E83-921B-DBA00E038AA2}" type="presOf" srcId="{1763EED3-26D7-4B0E-B022-1B72A013A70C}" destId="{B7666E4B-FE3C-4B7F-ADE2-C772AB73DAAC}" srcOrd="0" destOrd="0" presId="urn:microsoft.com/office/officeart/2005/8/layout/orgChart1"/>
-    <dgm:cxn modelId="{5F4F376D-5620-4216-AF82-C04C5F55E5B0}" type="presOf" srcId="{DCC0585E-4EEF-477E-9E64-47DB63E3B1F0}" destId="{E16286B1-F6DD-435B-8D33-2273810FC772}" srcOrd="0" destOrd="0" presId="urn:microsoft.com/office/officeart/2005/8/layout/orgChart1"/>
     <dgm:cxn modelId="{56DEE571-1D10-4A28-9146-2F3255577C1A}" srcId="{B11103E8-CD81-40BE-B579-4FCAB035D7D0}" destId="{C1DA3676-0503-49EC-84DF-0840E579CFEF}" srcOrd="0" destOrd="0" parTransId="{E91B2509-2172-40BF-92BF-95C71C842B9D}" sibTransId="{249178E8-CF68-4256-8FB4-C392210D1F0F}"/>
     <dgm:cxn modelId="{1DE58273-423C-4229-8419-B58F7186758D}" type="presOf" srcId="{F92BA4C8-D8E7-4F76-9AE8-619682ED5A87}" destId="{36F9C691-4B50-4159-9F42-B35EF32A6B44}" srcOrd="0" destOrd="0" presId="urn:microsoft.com/office/officeart/2005/8/layout/orgChart1"/>
-    <dgm:cxn modelId="{933C0776-BD08-42D1-ADA6-BA5B5B3BC905}" srcId="{B11103E8-CD81-40BE-B579-4FCAB035D7D0}" destId="{DCC0585E-4EEF-477E-9E64-47DB63E3B1F0}" srcOrd="2" destOrd="0" parTransId="{5E696FD1-73A9-49CE-9C82-A67D5179851A}" sibTransId="{D959DD05-460A-431F-803F-199126E0D621}"/>
     <dgm:cxn modelId="{A0CB5C58-44FD-4B28-8DA0-AC4381DFBDCD}" type="presOf" srcId="{4A4E3E50-38C2-4C3C-AE96-953BA26A11C9}" destId="{B7B9E35F-3141-4501-8C8E-ECDBA7C3D699}" srcOrd="0" destOrd="0" presId="urn:microsoft.com/office/officeart/2005/8/layout/orgChart1"/>
     <dgm:cxn modelId="{67EF6583-DA13-4DCD-B2C7-E01EC5ABDE4A}" srcId="{EC376E4E-E648-41DA-86DB-8DA8BA5FAEC7}" destId="{12B359AD-F8D0-452E-9FE6-4E1434D70F15}" srcOrd="0" destOrd="0" parTransId="{F38279A6-DA67-4CAC-9D98-9FD4DBAA81BE}" sibTransId="{718721CD-C249-4EFA-880F-8D85A96569A0}"/>
     <dgm:cxn modelId="{B6C0118D-A2B4-48B2-9D92-51426B77C601}" type="presOf" srcId="{F5961BDC-783E-4C07-BC92-9011F5BBD285}" destId="{FC040049-51F5-41BD-8A19-8EF975D2FEC2}" srcOrd="0" destOrd="0" presId="urn:microsoft.com/office/officeart/2005/8/layout/orgChart1"/>
@@ -5238,13 +5067,12 @@
     <dgm:cxn modelId="{E964689A-B3A3-4628-A308-30C81D211922}" type="presOf" srcId="{EC376E4E-E648-41DA-86DB-8DA8BA5FAEC7}" destId="{1FB3CEF6-77BB-4E6C-A2DD-4A3F7EC690C5}" srcOrd="0" destOrd="0" presId="urn:microsoft.com/office/officeart/2005/8/layout/orgChart1"/>
     <dgm:cxn modelId="{E02A83A2-B2E9-46F4-AF77-D471A4A0459A}" type="presOf" srcId="{4DE9C598-B23B-4383-915B-55E3A905EC09}" destId="{EAF98DA0-A25D-4689-9A35-0FB204C4D414}" srcOrd="1" destOrd="0" presId="urn:microsoft.com/office/officeart/2005/8/layout/orgChart1"/>
     <dgm:cxn modelId="{169577A9-2FA2-4D9B-B2B3-3293E28A18B5}" srcId="{12B359AD-F8D0-452E-9FE6-4E1434D70F15}" destId="{B11103E8-CD81-40BE-B579-4FCAB035D7D0}" srcOrd="0" destOrd="0" parTransId="{8EAAB40C-C46B-4763-9B19-143C18560BB8}" sibTransId="{066CED9E-DDC2-4B20-81DF-84AEF02375EA}"/>
-    <dgm:cxn modelId="{DB621BB4-1721-46CA-9C90-60643B419F26}" srcId="{B11103E8-CD81-40BE-B579-4FCAB035D7D0}" destId="{1763EED3-26D7-4B0E-B022-1B72A013A70C}" srcOrd="4" destOrd="0" parTransId="{F5961BDC-783E-4C07-BC92-9011F5BBD285}" sibTransId="{8B6F1219-C0C9-42EE-A202-422710B569C5}"/>
+    <dgm:cxn modelId="{DB621BB4-1721-46CA-9C90-60643B419F26}" srcId="{B11103E8-CD81-40BE-B579-4FCAB035D7D0}" destId="{1763EED3-26D7-4B0E-B022-1B72A013A70C}" srcOrd="3" destOrd="0" parTransId="{F5961BDC-783E-4C07-BC92-9011F5BBD285}" sibTransId="{8B6F1219-C0C9-42EE-A202-422710B569C5}"/>
     <dgm:cxn modelId="{8A53A4C3-6031-4734-B3C1-7BBE70A6195C}" type="presOf" srcId="{A7E99E54-94B2-4D9C-82A3-E8D7CBB0FC6A}" destId="{54DB9B34-E7B2-41DC-B13D-F457F995CDFC}" srcOrd="0" destOrd="0" presId="urn:microsoft.com/office/officeart/2005/8/layout/orgChart1"/>
     <dgm:cxn modelId="{2D5715C6-4B16-4AF8-A0C8-2697B477409C}" type="presOf" srcId="{4A4E3E50-38C2-4C3C-AE96-953BA26A11C9}" destId="{7914E8B1-80D5-4A71-9775-0A174E4B78BC}" srcOrd="1" destOrd="0" presId="urn:microsoft.com/office/officeart/2005/8/layout/orgChart1"/>
     <dgm:cxn modelId="{756917CD-3304-41C1-83A7-9955CB260BC6}" type="presOf" srcId="{8EAAB40C-C46B-4763-9B19-143C18560BB8}" destId="{4F485F08-228B-4F23-9920-ED58748DD612}" srcOrd="0" destOrd="0" presId="urn:microsoft.com/office/officeart/2005/8/layout/orgChart1"/>
-    <dgm:cxn modelId="{027DE8CD-8FAF-4678-A5D7-7F37B082E9FC}" type="presOf" srcId="{DCC0585E-4EEF-477E-9E64-47DB63E3B1F0}" destId="{05167FCA-E22E-4DDC-A69D-5406D39E103B}" srcOrd="1" destOrd="0" presId="urn:microsoft.com/office/officeart/2005/8/layout/orgChart1"/>
     <dgm:cxn modelId="{931F97D1-3692-4A52-A385-70D3E0FA82DE}" type="presOf" srcId="{E91B2509-2172-40BF-92BF-95C71C842B9D}" destId="{CA698B96-2FDD-477F-82FD-3398AEE00C53}" srcOrd="0" destOrd="0" presId="urn:microsoft.com/office/officeart/2005/8/layout/orgChart1"/>
-    <dgm:cxn modelId="{F1DC65E4-3406-49EF-8BD7-3B43D972B953}" srcId="{B11103E8-CD81-40BE-B579-4FCAB035D7D0}" destId="{4A4E3E50-38C2-4C3C-AE96-953BA26A11C9}" srcOrd="3" destOrd="0" parTransId="{F92BA4C8-D8E7-4F76-9AE8-619682ED5A87}" sibTransId="{F4856804-261D-4CA9-AEA7-CB9CCF3B24D3}"/>
+    <dgm:cxn modelId="{F1DC65E4-3406-49EF-8BD7-3B43D972B953}" srcId="{B11103E8-CD81-40BE-B579-4FCAB035D7D0}" destId="{4A4E3E50-38C2-4C3C-AE96-953BA26A11C9}" srcOrd="2" destOrd="0" parTransId="{F92BA4C8-D8E7-4F76-9AE8-619682ED5A87}" sibTransId="{F4856804-261D-4CA9-AEA7-CB9CCF3B24D3}"/>
     <dgm:cxn modelId="{9C4E09F7-60C7-4A17-883C-565801E26701}" srcId="{4DE9C598-B23B-4383-915B-55E3A905EC09}" destId="{A7E99E54-94B2-4D9C-82A3-E8D7CBB0FC6A}" srcOrd="0" destOrd="0" parTransId="{A7BDC5C7-F208-4337-83DA-CEAB2AF8A6E8}" sibTransId="{E5ADC721-8733-4901-A13E-0A3C1A6D9EA5}"/>
     <dgm:cxn modelId="{ECEF2BFB-C19C-4668-B0B2-A06335D9AE4F}" type="presOf" srcId="{B11103E8-CD81-40BE-B579-4FCAB035D7D0}" destId="{F58A63D3-C78F-4550-80E7-D69343F847C2}" srcOrd="0" destOrd="0" presId="urn:microsoft.com/office/officeart/2005/8/layout/orgChart1"/>
     <dgm:cxn modelId="{AE87FEFC-59F2-4DF6-8D52-F70F37326785}" type="presOf" srcId="{A7E99E54-94B2-4D9C-82A3-E8D7CBB0FC6A}" destId="{89957609-8B97-47C3-AEE9-6DD7393B124C}" srcOrd="1" destOrd="0" presId="urn:microsoft.com/office/officeart/2005/8/layout/orgChart1"/>
@@ -5281,15 +5109,8 @@
     <dgm:cxn modelId="{95772096-7DBA-4E8C-91C6-4F8A0A64416C}" type="presParOf" srcId="{1ED732C6-4FB8-4A1E-BC80-51448E89ECFB}" destId="{89957609-8B97-47C3-AEE9-6DD7393B124C}" srcOrd="1" destOrd="0" presId="urn:microsoft.com/office/officeart/2005/8/layout/orgChart1"/>
     <dgm:cxn modelId="{2739B281-BD78-4410-BADC-C96574C56CCB}" type="presParOf" srcId="{1A754903-320B-4D58-8D1D-B1046E7A0C09}" destId="{98A76313-0002-4F08-8C2A-2C9E7CF86A01}" srcOrd="1" destOrd="0" presId="urn:microsoft.com/office/officeart/2005/8/layout/orgChart1"/>
     <dgm:cxn modelId="{1040F5D0-2127-428D-B706-9E5757FFC25A}" type="presParOf" srcId="{1A754903-320B-4D58-8D1D-B1046E7A0C09}" destId="{B66ED59C-56CC-4674-9E98-64456A927D23}" srcOrd="2" destOrd="0" presId="urn:microsoft.com/office/officeart/2005/8/layout/orgChart1"/>
-    <dgm:cxn modelId="{8665360A-069C-438B-B348-BE17BDD53A30}" type="presParOf" srcId="{DF366C04-0EC9-45EA-9E59-CA10E9616C42}" destId="{D2C33EE2-902F-4DEC-A486-716BCF9C574A}" srcOrd="4" destOrd="0" presId="urn:microsoft.com/office/officeart/2005/8/layout/orgChart1"/>
-    <dgm:cxn modelId="{210AD954-3BF6-41BA-BF9D-314A1DA0489C}" type="presParOf" srcId="{DF366C04-0EC9-45EA-9E59-CA10E9616C42}" destId="{ECCFF307-6359-4DCA-BF55-ED05B5388428}" srcOrd="5" destOrd="0" presId="urn:microsoft.com/office/officeart/2005/8/layout/orgChart1"/>
-    <dgm:cxn modelId="{FF80E84C-32E4-41F8-AE92-2B365DF8FC17}" type="presParOf" srcId="{ECCFF307-6359-4DCA-BF55-ED05B5388428}" destId="{E1A219C8-0B21-4371-AEDF-DFE36A8898FB}" srcOrd="0" destOrd="0" presId="urn:microsoft.com/office/officeart/2005/8/layout/orgChart1"/>
-    <dgm:cxn modelId="{89AFDE49-FEEF-49F4-A926-EE60B8CFF04C}" type="presParOf" srcId="{E1A219C8-0B21-4371-AEDF-DFE36A8898FB}" destId="{E16286B1-F6DD-435B-8D33-2273810FC772}" srcOrd="0" destOrd="0" presId="urn:microsoft.com/office/officeart/2005/8/layout/orgChart1"/>
-    <dgm:cxn modelId="{40F9ECC6-485F-4032-8331-0A512C8D41DF}" type="presParOf" srcId="{E1A219C8-0B21-4371-AEDF-DFE36A8898FB}" destId="{05167FCA-E22E-4DDC-A69D-5406D39E103B}" srcOrd="1" destOrd="0" presId="urn:microsoft.com/office/officeart/2005/8/layout/orgChart1"/>
-    <dgm:cxn modelId="{A28DB575-C011-4191-8075-82E820FE698A}" type="presParOf" srcId="{ECCFF307-6359-4DCA-BF55-ED05B5388428}" destId="{04B065D9-B02C-48CA-909E-658C017FE0CF}" srcOrd="1" destOrd="0" presId="urn:microsoft.com/office/officeart/2005/8/layout/orgChart1"/>
-    <dgm:cxn modelId="{5A0E0D31-0F75-4FA6-BA31-6F8C67F2952C}" type="presParOf" srcId="{ECCFF307-6359-4DCA-BF55-ED05B5388428}" destId="{C39E0C51-7389-4934-9866-1F5F14D69376}" srcOrd="2" destOrd="0" presId="urn:microsoft.com/office/officeart/2005/8/layout/orgChart1"/>
-    <dgm:cxn modelId="{9198E430-4E3B-4BE6-B09D-89FA0286C30C}" type="presParOf" srcId="{DF366C04-0EC9-45EA-9E59-CA10E9616C42}" destId="{36F9C691-4B50-4159-9F42-B35EF32A6B44}" srcOrd="6" destOrd="0" presId="urn:microsoft.com/office/officeart/2005/8/layout/orgChart1"/>
-    <dgm:cxn modelId="{2B36E909-34B6-4C95-8761-53C7FC7080B9}" type="presParOf" srcId="{DF366C04-0EC9-45EA-9E59-CA10E9616C42}" destId="{312C63B7-2356-4591-A8D8-CB4355394DE3}" srcOrd="7" destOrd="0" presId="urn:microsoft.com/office/officeart/2005/8/layout/orgChart1"/>
+    <dgm:cxn modelId="{9198E430-4E3B-4BE6-B09D-89FA0286C30C}" type="presParOf" srcId="{DF366C04-0EC9-45EA-9E59-CA10E9616C42}" destId="{36F9C691-4B50-4159-9F42-B35EF32A6B44}" srcOrd="4" destOrd="0" presId="urn:microsoft.com/office/officeart/2005/8/layout/orgChart1"/>
+    <dgm:cxn modelId="{2B36E909-34B6-4C95-8761-53C7FC7080B9}" type="presParOf" srcId="{DF366C04-0EC9-45EA-9E59-CA10E9616C42}" destId="{312C63B7-2356-4591-A8D8-CB4355394DE3}" srcOrd="5" destOrd="0" presId="urn:microsoft.com/office/officeart/2005/8/layout/orgChart1"/>
     <dgm:cxn modelId="{72D56477-E19B-4C56-8DCA-ABF4A3C334B7}" type="presParOf" srcId="{312C63B7-2356-4591-A8D8-CB4355394DE3}" destId="{980CD6A4-C2BD-46F1-9817-29D82D14EAD8}" srcOrd="0" destOrd="0" presId="urn:microsoft.com/office/officeart/2005/8/layout/orgChart1"/>
     <dgm:cxn modelId="{A760D4C3-30AD-46E6-BE5F-1C179C8D0BE2}" type="presParOf" srcId="{980CD6A4-C2BD-46F1-9817-29D82D14EAD8}" destId="{B7B9E35F-3141-4501-8C8E-ECDBA7C3D699}" srcOrd="0" destOrd="0" presId="urn:microsoft.com/office/officeart/2005/8/layout/orgChart1"/>
     <dgm:cxn modelId="{0B1DAF5E-956D-45F9-ABE7-38276EE83E97}" type="presParOf" srcId="{980CD6A4-C2BD-46F1-9817-29D82D14EAD8}" destId="{7914E8B1-80D5-4A71-9775-0A174E4B78BC}" srcOrd="1" destOrd="0" presId="urn:microsoft.com/office/officeart/2005/8/layout/orgChart1"/>
@@ -6414,7 +6235,7 @@
       <dsp:spPr>
         <a:xfrm>
           <a:off x="3657600" y="1856174"/>
-          <a:ext cx="2779566" cy="1408926"/>
+          <a:ext cx="1853044" cy="1408926"/>
         </a:xfrm>
         <a:custGeom>
           <a:avLst/>
@@ -6431,71 +6252,10 @@
                 <a:pt x="0" y="1248124"/>
               </a:lnTo>
               <a:lnTo>
-                <a:pt x="2779566" y="1248124"/>
+                <a:pt x="1853044" y="1248124"/>
               </a:lnTo>
               <a:lnTo>
-                <a:pt x="2779566" y="1408926"/>
-              </a:lnTo>
-            </a:path>
-          </a:pathLst>
-        </a:custGeom>
-        <a:noFill/>
-        <a:ln w="10795" cap="flat" cmpd="sng" algn="ctr">
-          <a:solidFill>
-            <a:schemeClr val="accent1">
-              <a:shade val="80000"/>
-              <a:hueOff val="0"/>
-              <a:satOff val="0"/>
-              <a:lumOff val="0"/>
-              <a:alphaOff val="0"/>
-            </a:schemeClr>
-          </a:solidFill>
-          <a:prstDash val="solid"/>
-        </a:ln>
-        <a:effectLst/>
-      </dsp:spPr>
-      <dsp:style>
-        <a:lnRef idx="2">
-          <a:scrgbClr r="0" g="0" b="0"/>
-        </a:lnRef>
-        <a:fillRef idx="0">
-          <a:scrgbClr r="0" g="0" b="0"/>
-        </a:fillRef>
-        <a:effectRef idx="0">
-          <a:scrgbClr r="0" g="0" b="0"/>
-        </a:effectRef>
-        <a:fontRef idx="minor"/>
-      </dsp:style>
-    </dsp:sp>
-    <dsp:sp modelId="{D2C33EE2-902F-4DEC-A486-716BCF9C574A}">
-      <dsp:nvSpPr>
-        <dsp:cNvPr id="0" name=""/>
-        <dsp:cNvSpPr/>
-      </dsp:nvSpPr>
-      <dsp:spPr>
-        <a:xfrm>
-          <a:off x="3657600" y="1856174"/>
-          <a:ext cx="926522" cy="1408926"/>
-        </a:xfrm>
-        <a:custGeom>
-          <a:avLst/>
-          <a:gdLst/>
-          <a:ahLst/>
-          <a:cxnLst/>
-          <a:rect l="0" t="0" r="0" b="0"/>
-          <a:pathLst>
-            <a:path>
-              <a:moveTo>
-                <a:pt x="0" y="0"/>
-              </a:moveTo>
-              <a:lnTo>
-                <a:pt x="0" y="1248124"/>
-              </a:lnTo>
-              <a:lnTo>
-                <a:pt x="926522" y="1248124"/>
-              </a:lnTo>
-              <a:lnTo>
-                <a:pt x="926522" y="1408926"/>
+                <a:pt x="1853044" y="1408926"/>
               </a:lnTo>
             </a:path>
           </a:pathLst>
@@ -6535,7 +6295,7 @@
       </dsp:nvSpPr>
       <dsp:spPr>
         <a:xfrm>
-          <a:off x="2570276" y="4030821"/>
+          <a:off x="3496798" y="4030821"/>
           <a:ext cx="160801" cy="704463"/>
         </a:xfrm>
         <a:custGeom>
@@ -6593,8 +6353,8 @@
       </dsp:nvSpPr>
       <dsp:spPr>
         <a:xfrm>
-          <a:off x="2731077" y="1856174"/>
-          <a:ext cx="926522" cy="1408926"/>
+          <a:off x="3611880" y="1856174"/>
+          <a:ext cx="91440" cy="1408926"/>
         </a:xfrm>
         <a:custGeom>
           <a:avLst/>
@@ -6605,16 +6365,10 @@
           <a:pathLst>
             <a:path>
               <a:moveTo>
-                <a:pt x="926522" y="0"/>
+                <a:pt x="45720" y="0"/>
               </a:moveTo>
               <a:lnTo>
-                <a:pt x="926522" y="1248124"/>
-              </a:lnTo>
-              <a:lnTo>
-                <a:pt x="0" y="1248124"/>
-              </a:lnTo>
-              <a:lnTo>
-                <a:pt x="0" y="1408926"/>
+                <a:pt x="45720" y="1408926"/>
               </a:lnTo>
             </a:path>
           </a:pathLst>
@@ -6654,8 +6408,8 @@
       </dsp:nvSpPr>
       <dsp:spPr>
         <a:xfrm>
-          <a:off x="878033" y="1856174"/>
-          <a:ext cx="2779566" cy="1408926"/>
+          <a:off x="1804555" y="1856174"/>
+          <a:ext cx="1853044" cy="1408926"/>
         </a:xfrm>
         <a:custGeom>
           <a:avLst/>
@@ -6666,10 +6420,10 @@
           <a:pathLst>
             <a:path>
               <a:moveTo>
-                <a:pt x="2779566" y="0"/>
+                <a:pt x="1853044" y="0"/>
               </a:moveTo>
               <a:lnTo>
-                <a:pt x="2779566" y="1248124"/>
+                <a:pt x="1853044" y="1248124"/>
               </a:lnTo>
               <a:lnTo>
                 <a:pt x="0" y="1248124"/>
@@ -6926,7 +6680,7 @@
       </dsp:nvSpPr>
       <dsp:spPr>
         <a:xfrm>
-          <a:off x="112313" y="3265100"/>
+          <a:off x="1038835" y="3265100"/>
           <a:ext cx="1531441" cy="765720"/>
         </a:xfrm>
         <a:prstGeom prst="rect">
@@ -6994,7 +6748,7 @@
           </a:br>
           <a:r>
             <a:rPr lang="en-US" sz="1700" kern="1200" dirty="0"/>
-            <a:t>+2 .</a:t>
+            <a:t>+3 .</a:t>
           </a:r>
           <a:r>
             <a:rPr lang="en-US" sz="1700" kern="1200" dirty="0" err="1"/>
@@ -7004,7 +6758,7 @@
         </a:p>
       </dsp:txBody>
       <dsp:txXfrm>
-        <a:off x="112313" y="3265100"/>
+        <a:off x="1038835" y="3265100"/>
         <a:ext cx="1531441" cy="765720"/>
       </dsp:txXfrm>
     </dsp:sp>
@@ -7015,7 +6769,7 @@
       </dsp:nvSpPr>
       <dsp:spPr>
         <a:xfrm>
-          <a:off x="1965357" y="3265100"/>
+          <a:off x="2891879" y="3265100"/>
           <a:ext cx="1531441" cy="765720"/>
         </a:xfrm>
         <a:prstGeom prst="rect">
@@ -7082,7 +6836,7 @@
         </a:p>
       </dsp:txBody>
       <dsp:txXfrm>
-        <a:off x="1965357" y="3265100"/>
+        <a:off x="2891879" y="3265100"/>
         <a:ext cx="1531441" cy="765720"/>
       </dsp:txXfrm>
     </dsp:sp>
@@ -7093,7 +6847,7 @@
       </dsp:nvSpPr>
       <dsp:spPr>
         <a:xfrm>
-          <a:off x="1038835" y="4352423"/>
+          <a:off x="1965357" y="4352423"/>
           <a:ext cx="1531441" cy="765720"/>
         </a:xfrm>
         <a:prstGeom prst="rect">
@@ -7160,96 +6914,7 @@
         </a:p>
       </dsp:txBody>
       <dsp:txXfrm>
-        <a:off x="1038835" y="4352423"/>
-        <a:ext cx="1531441" cy="765720"/>
-      </dsp:txXfrm>
-    </dsp:sp>
-    <dsp:sp modelId="{E16286B1-F6DD-435B-8D33-2273810FC772}">
-      <dsp:nvSpPr>
-        <dsp:cNvPr id="0" name=""/>
-        <dsp:cNvSpPr/>
-      </dsp:nvSpPr>
-      <dsp:spPr>
-        <a:xfrm>
-          <a:off x="3818401" y="3265100"/>
-          <a:ext cx="1531441" cy="765720"/>
-        </a:xfrm>
-        <a:prstGeom prst="rect">
-          <a:avLst/>
-        </a:prstGeom>
-        <a:solidFill>
-          <a:schemeClr val="accent1">
-            <a:hueOff val="0"/>
-            <a:satOff val="0"/>
-            <a:lumOff val="0"/>
-            <a:alphaOff val="0"/>
-          </a:schemeClr>
-        </a:solidFill>
-        <a:ln w="10795" cap="flat" cmpd="sng" algn="ctr">
-          <a:solidFill>
-            <a:schemeClr val="lt1">
-              <a:hueOff val="0"/>
-              <a:satOff val="0"/>
-              <a:lumOff val="0"/>
-              <a:alphaOff val="0"/>
-            </a:schemeClr>
-          </a:solidFill>
-          <a:prstDash val="solid"/>
-        </a:ln>
-        <a:effectLst/>
-      </dsp:spPr>
-      <dsp:style>
-        <a:lnRef idx="2">
-          <a:scrgbClr r="0" g="0" b="0"/>
-        </a:lnRef>
-        <a:fillRef idx="1">
-          <a:scrgbClr r="0" g="0" b="0"/>
-        </a:fillRef>
-        <a:effectRef idx="0">
-          <a:scrgbClr r="0" g="0" b="0"/>
-        </a:effectRef>
-        <a:fontRef idx="minor">
-          <a:schemeClr val="lt1"/>
-        </a:fontRef>
-      </dsp:style>
-      <dsp:txBody>
-        <a:bodyPr spcFirstLastPara="0" vert="horz" wrap="square" lIns="10795" tIns="10795" rIns="10795" bIns="10795" numCol="1" spcCol="1270" anchor="ctr" anchorCtr="0">
-          <a:noAutofit/>
-        </a:bodyPr>
-        <a:lstStyle/>
-        <a:p>
-          <a:pPr marL="0" lvl="0" indent="0" algn="ctr" defTabSz="755650">
-            <a:lnSpc>
-              <a:spcPct val="90000"/>
-            </a:lnSpc>
-            <a:spcBef>
-              <a:spcPct val="0"/>
-            </a:spcBef>
-            <a:spcAft>
-              <a:spcPct val="35000"/>
-            </a:spcAft>
-            <a:buNone/>
-          </a:pPr>
-          <a:r>
-            <a:rPr lang="en-US" sz="1700" i="1" kern="1200" dirty="0"/>
-            <a:t>printQA.bat</a:t>
-          </a:r>
-          <a:br>
-            <a:rPr lang="en-US" sz="1700" i="1" kern="1200" dirty="0"/>
-          </a:br>
-          <a:r>
-            <a:rPr lang="en-US" sz="1700" i="1" kern="1200" dirty="0"/>
-            <a:t>+1 .</a:t>
-          </a:r>
-          <a:r>
-            <a:rPr lang="en-US" sz="1700" i="1" kern="1200" dirty="0" err="1"/>
-            <a:t>rpt</a:t>
-          </a:r>
-          <a:endParaRPr lang="fr-CA" sz="1700" i="1" kern="1200" dirty="0"/>
-        </a:p>
-      </dsp:txBody>
-      <dsp:txXfrm>
-        <a:off x="3818401" y="3265100"/>
+        <a:off x="1965357" y="4352423"/>
         <a:ext cx="1531441" cy="765720"/>
       </dsp:txXfrm>
     </dsp:sp>
@@ -7260,7 +6925,7 @@
       </dsp:nvSpPr>
       <dsp:spPr>
         <a:xfrm>
-          <a:off x="5671445" y="3265100"/>
+          <a:off x="4744923" y="3265100"/>
           <a:ext cx="1531441" cy="765720"/>
         </a:xfrm>
         <a:prstGeom prst="rect">
@@ -7342,7 +7007,7 @@
         </a:p>
       </dsp:txBody>
       <dsp:txXfrm>
-        <a:off x="5671445" y="3265100"/>
+        <a:off x="4744923" y="3265100"/>
         <a:ext cx="1531441" cy="765720"/>
       </dsp:txXfrm>
     </dsp:sp>
@@ -7502,7 +7167,7 @@
       <dsp:spPr>
         <a:xfrm>
           <a:off x="3657600" y="1856174"/>
-          <a:ext cx="2779566" cy="1408926"/>
+          <a:ext cx="1853044" cy="1408926"/>
         </a:xfrm>
         <a:custGeom>
           <a:avLst/>
@@ -7519,71 +7184,10 @@
                 <a:pt x="0" y="1248124"/>
               </a:lnTo>
               <a:lnTo>
-                <a:pt x="2779566" y="1248124"/>
+                <a:pt x="1853044" y="1248124"/>
               </a:lnTo>
               <a:lnTo>
-                <a:pt x="2779566" y="1408926"/>
-              </a:lnTo>
-            </a:path>
-          </a:pathLst>
-        </a:custGeom>
-        <a:noFill/>
-        <a:ln w="10795" cap="flat" cmpd="sng" algn="ctr">
-          <a:solidFill>
-            <a:schemeClr val="accent1">
-              <a:shade val="80000"/>
-              <a:hueOff val="0"/>
-              <a:satOff val="0"/>
-              <a:lumOff val="0"/>
-              <a:alphaOff val="0"/>
-            </a:schemeClr>
-          </a:solidFill>
-          <a:prstDash val="solid"/>
-        </a:ln>
-        <a:effectLst/>
-      </dsp:spPr>
-      <dsp:style>
-        <a:lnRef idx="2">
-          <a:scrgbClr r="0" g="0" b="0"/>
-        </a:lnRef>
-        <a:fillRef idx="0">
-          <a:scrgbClr r="0" g="0" b="0"/>
-        </a:fillRef>
-        <a:effectRef idx="0">
-          <a:scrgbClr r="0" g="0" b="0"/>
-        </a:effectRef>
-        <a:fontRef idx="minor"/>
-      </dsp:style>
-    </dsp:sp>
-    <dsp:sp modelId="{D2C33EE2-902F-4DEC-A486-716BCF9C574A}">
-      <dsp:nvSpPr>
-        <dsp:cNvPr id="0" name=""/>
-        <dsp:cNvSpPr/>
-      </dsp:nvSpPr>
-      <dsp:spPr>
-        <a:xfrm>
-          <a:off x="3657600" y="1856174"/>
-          <a:ext cx="926522" cy="1408926"/>
-        </a:xfrm>
-        <a:custGeom>
-          <a:avLst/>
-          <a:gdLst/>
-          <a:ahLst/>
-          <a:cxnLst/>
-          <a:rect l="0" t="0" r="0" b="0"/>
-          <a:pathLst>
-            <a:path>
-              <a:moveTo>
-                <a:pt x="0" y="0"/>
-              </a:moveTo>
-              <a:lnTo>
-                <a:pt x="0" y="1248124"/>
-              </a:lnTo>
-              <a:lnTo>
-                <a:pt x="926522" y="1248124"/>
-              </a:lnTo>
-              <a:lnTo>
-                <a:pt x="926522" y="1408926"/>
+                <a:pt x="1853044" y="1408926"/>
               </a:lnTo>
             </a:path>
           </a:pathLst>
@@ -7623,7 +7227,7 @@
       </dsp:nvSpPr>
       <dsp:spPr>
         <a:xfrm>
-          <a:off x="2570276" y="4030821"/>
+          <a:off x="3496798" y="4030821"/>
           <a:ext cx="160801" cy="704463"/>
         </a:xfrm>
         <a:custGeom>
@@ -7681,8 +7285,8 @@
       </dsp:nvSpPr>
       <dsp:spPr>
         <a:xfrm>
-          <a:off x="2731077" y="1856174"/>
-          <a:ext cx="926522" cy="1408926"/>
+          <a:off x="3611880" y="1856174"/>
+          <a:ext cx="91440" cy="1408926"/>
         </a:xfrm>
         <a:custGeom>
           <a:avLst/>
@@ -7693,16 +7297,10 @@
           <a:pathLst>
             <a:path>
               <a:moveTo>
-                <a:pt x="926522" y="0"/>
+                <a:pt x="45720" y="0"/>
               </a:moveTo>
               <a:lnTo>
-                <a:pt x="926522" y="1248124"/>
-              </a:lnTo>
-              <a:lnTo>
-                <a:pt x="0" y="1248124"/>
-              </a:lnTo>
-              <a:lnTo>
-                <a:pt x="0" y="1408926"/>
+                <a:pt x="45720" y="1408926"/>
               </a:lnTo>
             </a:path>
           </a:pathLst>
@@ -7742,8 +7340,8 @@
       </dsp:nvSpPr>
       <dsp:spPr>
         <a:xfrm>
-          <a:off x="878033" y="1856174"/>
-          <a:ext cx="2779566" cy="1408926"/>
+          <a:off x="1804555" y="1856174"/>
+          <a:ext cx="1853044" cy="1408926"/>
         </a:xfrm>
         <a:custGeom>
           <a:avLst/>
@@ -7754,10 +7352,10 @@
           <a:pathLst>
             <a:path>
               <a:moveTo>
-                <a:pt x="2779566" y="0"/>
+                <a:pt x="1853044" y="0"/>
               </a:moveTo>
               <a:lnTo>
-                <a:pt x="2779566" y="1248124"/>
+                <a:pt x="1853044" y="1248124"/>
               </a:lnTo>
               <a:lnTo>
                 <a:pt x="0" y="1248124"/>
@@ -8014,7 +7612,7 @@
       </dsp:nvSpPr>
       <dsp:spPr>
         <a:xfrm>
-          <a:off x="112313" y="3265100"/>
+          <a:off x="1038835" y="3265100"/>
           <a:ext cx="1531441" cy="765720"/>
         </a:xfrm>
         <a:prstGeom prst="rect">
@@ -8081,7 +7679,7 @@
         </a:p>
       </dsp:txBody>
       <dsp:txXfrm>
-        <a:off x="112313" y="3265100"/>
+        <a:off x="1038835" y="3265100"/>
         <a:ext cx="1531441" cy="765720"/>
       </dsp:txXfrm>
     </dsp:sp>
@@ -8092,7 +7690,7 @@
       </dsp:nvSpPr>
       <dsp:spPr>
         <a:xfrm>
-          <a:off x="1965357" y="3265100"/>
+          <a:off x="2891879" y="3265100"/>
           <a:ext cx="1531441" cy="765720"/>
         </a:xfrm>
         <a:prstGeom prst="rect">
@@ -8159,7 +7757,7 @@
         </a:p>
       </dsp:txBody>
       <dsp:txXfrm>
-        <a:off x="1965357" y="3265100"/>
+        <a:off x="2891879" y="3265100"/>
         <a:ext cx="1531441" cy="765720"/>
       </dsp:txXfrm>
     </dsp:sp>
@@ -8170,7 +7768,7 @@
       </dsp:nvSpPr>
       <dsp:spPr>
         <a:xfrm>
-          <a:off x="1038835" y="4352423"/>
+          <a:off x="1965357" y="4352423"/>
           <a:ext cx="1531441" cy="765720"/>
         </a:xfrm>
         <a:prstGeom prst="rect">
@@ -8237,85 +7835,7 @@
         </a:p>
       </dsp:txBody>
       <dsp:txXfrm>
-        <a:off x="1038835" y="4352423"/>
-        <a:ext cx="1531441" cy="765720"/>
-      </dsp:txXfrm>
-    </dsp:sp>
-    <dsp:sp modelId="{E16286B1-F6DD-435B-8D33-2273810FC772}">
-      <dsp:nvSpPr>
-        <dsp:cNvPr id="0" name=""/>
-        <dsp:cNvSpPr/>
-      </dsp:nvSpPr>
-      <dsp:spPr>
-        <a:xfrm>
-          <a:off x="3818401" y="3265100"/>
-          <a:ext cx="1531441" cy="765720"/>
-        </a:xfrm>
-        <a:prstGeom prst="rect">
-          <a:avLst/>
-        </a:prstGeom>
-        <a:solidFill>
-          <a:schemeClr val="accent1">
-            <a:hueOff val="0"/>
-            <a:satOff val="0"/>
-            <a:lumOff val="0"/>
-            <a:alphaOff val="0"/>
-          </a:schemeClr>
-        </a:solidFill>
-        <a:ln w="10795" cap="flat" cmpd="sng" algn="ctr">
-          <a:solidFill>
-            <a:schemeClr val="lt1">
-              <a:hueOff val="0"/>
-              <a:satOff val="0"/>
-              <a:lumOff val="0"/>
-              <a:alphaOff val="0"/>
-            </a:schemeClr>
-          </a:solidFill>
-          <a:prstDash val="solid"/>
-        </a:ln>
-        <a:effectLst/>
-      </dsp:spPr>
-      <dsp:style>
-        <a:lnRef idx="2">
-          <a:scrgbClr r="0" g="0" b="0"/>
-        </a:lnRef>
-        <a:fillRef idx="1">
-          <a:scrgbClr r="0" g="0" b="0"/>
-        </a:fillRef>
-        <a:effectRef idx="0">
-          <a:scrgbClr r="0" g="0" b="0"/>
-        </a:effectRef>
-        <a:fontRef idx="minor">
-          <a:schemeClr val="lt1"/>
-        </a:fontRef>
-      </dsp:style>
-      <dsp:txBody>
-        <a:bodyPr spcFirstLastPara="0" vert="horz" wrap="square" lIns="14605" tIns="14605" rIns="14605" bIns="14605" numCol="1" spcCol="1270" anchor="ctr" anchorCtr="0">
-          <a:noAutofit/>
-        </a:bodyPr>
-        <a:lstStyle/>
-        <a:p>
-          <a:pPr marL="0" lvl="0" indent="0" algn="ctr" defTabSz="1022350">
-            <a:lnSpc>
-              <a:spcPct val="90000"/>
-            </a:lnSpc>
-            <a:spcBef>
-              <a:spcPct val="0"/>
-            </a:spcBef>
-            <a:spcAft>
-              <a:spcPct val="35000"/>
-            </a:spcAft>
-            <a:buNone/>
-          </a:pPr>
-          <a:r>
-            <a:rPr lang="en-US" sz="2300" i="1" kern="1200" dirty="0"/>
-            <a:t>batch</a:t>
-          </a:r>
-          <a:endParaRPr lang="fr-CA" sz="2300" i="1" kern="1200" dirty="0"/>
-        </a:p>
-      </dsp:txBody>
-      <dsp:txXfrm>
-        <a:off x="3818401" y="3265100"/>
+        <a:off x="1965357" y="4352423"/>
         <a:ext cx="1531441" cy="765720"/>
       </dsp:txXfrm>
     </dsp:sp>
@@ -8326,7 +7846,7 @@
       </dsp:nvSpPr>
       <dsp:spPr>
         <a:xfrm>
-          <a:off x="5671445" y="3265100"/>
+          <a:off x="4744923" y="3265100"/>
           <a:ext cx="1531441" cy="765720"/>
         </a:xfrm>
         <a:prstGeom prst="rect">
@@ -8393,7 +7913,7 @@
         </a:p>
       </dsp:txBody>
       <dsp:txXfrm>
-        <a:off x="5671445" y="3265100"/>
+        <a:off x="4744923" y="3265100"/>
         <a:ext cx="1531441" cy="765720"/>
       </dsp:txXfrm>
     </dsp:sp>
@@ -17937,7 +17457,7 @@
             <a:fld id="{5586B75A-687E-405C-8A0B-8D00578BA2C3}" type="datetimeFigureOut">
               <a:rPr lang="en-US" dirty="0"/>
               <a:pPr/>
-              <a:t>9/13/2021</a:t>
+              <a:t>9/15/2021</a:t>
             </a:fld>
             <a:endParaRPr lang="en-US" dirty="0"/>
           </a:p>
@@ -18104,7 +17624,7 @@
             <a:fld id="{5586B75A-687E-405C-8A0B-8D00578BA2C3}" type="datetimeFigureOut">
               <a:rPr lang="en-US" dirty="0"/>
               <a:pPr/>
-              <a:t>9/13/2021</a:t>
+              <a:t>9/15/2021</a:t>
             </a:fld>
             <a:endParaRPr lang="en-US" dirty="0"/>
           </a:p>
@@ -18281,7 +17801,7 @@
             <a:fld id="{5586B75A-687E-405C-8A0B-8D00578BA2C3}" type="datetimeFigureOut">
               <a:rPr lang="en-US" dirty="0"/>
               <a:pPr/>
-              <a:t>9/13/2021</a:t>
+              <a:t>9/15/2021</a:t>
             </a:fld>
             <a:endParaRPr lang="en-US" dirty="0"/>
           </a:p>
@@ -18448,7 +17968,7 @@
             <a:fld id="{5586B75A-687E-405C-8A0B-8D00578BA2C3}" type="datetimeFigureOut">
               <a:rPr lang="en-US" dirty="0"/>
               <a:pPr/>
-              <a:t>9/13/2021</a:t>
+              <a:t>9/15/2021</a:t>
             </a:fld>
             <a:endParaRPr lang="en-US" dirty="0"/>
           </a:p>
@@ -18703,7 +18223,7 @@
             <a:fld id="{5586B75A-687E-405C-8A0B-8D00578BA2C3}" type="datetimeFigureOut">
               <a:rPr lang="en-US" dirty="0"/>
               <a:pPr/>
-              <a:t>9/13/2021</a:t>
+              <a:t>9/15/2021</a:t>
             </a:fld>
             <a:endParaRPr lang="en-US" dirty="0"/>
           </a:p>
@@ -18988,7 +18508,7 @@
             <a:fld id="{5586B75A-687E-405C-8A0B-8D00578BA2C3}" type="datetimeFigureOut">
               <a:rPr lang="en-US" dirty="0"/>
               <a:pPr/>
-              <a:t>9/13/2021</a:t>
+              <a:t>9/15/2021</a:t>
             </a:fld>
             <a:endParaRPr lang="en-US" dirty="0"/>
           </a:p>
@@ -19427,7 +18947,7 @@
             <a:fld id="{5586B75A-687E-405C-8A0B-8D00578BA2C3}" type="datetimeFigureOut">
               <a:rPr lang="en-US" dirty="0"/>
               <a:pPr/>
-              <a:t>9/13/2021</a:t>
+              <a:t>9/15/2021</a:t>
             </a:fld>
             <a:endParaRPr lang="en-US" dirty="0"/>
           </a:p>
@@ -19542,7 +19062,7 @@
             <a:fld id="{5586B75A-687E-405C-8A0B-8D00578BA2C3}" type="datetimeFigureOut">
               <a:rPr lang="en-US" dirty="0"/>
               <a:pPr/>
-              <a:t>9/13/2021</a:t>
+              <a:t>9/15/2021</a:t>
             </a:fld>
             <a:endParaRPr lang="en-US" dirty="0"/>
           </a:p>
@@ -19634,7 +19154,7 @@
             <a:fld id="{5586B75A-687E-405C-8A0B-8D00578BA2C3}" type="datetimeFigureOut">
               <a:rPr lang="en-US" dirty="0"/>
               <a:pPr/>
-              <a:t>9/13/2021</a:t>
+              <a:t>9/15/2021</a:t>
             </a:fld>
             <a:endParaRPr lang="en-US" dirty="0"/>
           </a:p>
@@ -19919,7 +19439,7 @@
             <a:fld id="{5586B75A-687E-405C-8A0B-8D00578BA2C3}" type="datetimeFigureOut">
               <a:rPr lang="en-US" dirty="0"/>
               <a:pPr/>
-              <a:t>9/13/2021</a:t>
+              <a:t>9/15/2021</a:t>
             </a:fld>
             <a:endParaRPr lang="en-US" dirty="0"/>
           </a:p>
@@ -20189,7 +19709,7 @@
             <a:fld id="{5586B75A-687E-405C-8A0B-8D00578BA2C3}" type="datetimeFigureOut">
               <a:rPr lang="en-US" dirty="0"/>
               <a:pPr/>
-              <a:t>9/13/2021</a:t>
+              <a:t>9/15/2021</a:t>
             </a:fld>
             <a:endParaRPr lang="en-US" dirty="0"/>
           </a:p>
@@ -20483,7 +20003,7 @@
             <a:fld id="{5586B75A-687E-405C-8A0B-8D00578BA2C3}" type="datetimeFigureOut">
               <a:rPr lang="en-US" dirty="0"/>
               <a:pPr/>
-              <a:t>9/13/2021</a:t>
+              <a:t>9/15/2021</a:t>
             </a:fld>
             <a:endParaRPr lang="en-US" dirty="0"/>
           </a:p>
@@ -21874,6 +21394,15 @@
           </a:p>
           <a:p>
             <a:r>
+              <a:rPr lang="en-US" dirty="0"/>
+              <a:t>Set paper printer to default to duplex</a:t>
+            </a:r>
+            <a:endParaRPr lang="en-US" dirty="0">
+              <a:hlinkClick r:id="rId2"/>
+            </a:endParaRPr>
+          </a:p>
+          <a:p>
+            <a:r>
               <a:rPr lang="en-US" dirty="0">
                 <a:hlinkClick r:id="rId2"/>
               </a:rPr>
@@ -22690,20 +22219,16 @@
           <a:bodyPr/>
           <a:lstStyle/>
           <a:p>
-            <a:r>
-              <a:rPr lang="en-US" dirty="0"/>
-              <a:t>-missing database</a:t>
-            </a:r>
             <a:endParaRPr lang="fr-CA" dirty="0"/>
           </a:p>
         </p:txBody>
       </p:sp>
       <p:pic>
         <p:nvPicPr>
-          <p:cNvPr id="6" name="Picture 5">
+          <p:cNvPr id="10" name="Picture 9">
             <a:extLst>
               <a:ext uri="{FF2B5EF4-FFF2-40B4-BE49-F238E27FC236}">
-                <a16:creationId xmlns:a16="http://schemas.microsoft.com/office/drawing/2014/main" id="{659BD9C9-3F99-40A5-9650-47665D1F33E6}"/>
+                <a16:creationId xmlns:a16="http://schemas.microsoft.com/office/drawing/2014/main" id="{3A0F78D8-F064-4E9F-87D8-65140904C8FD}"/>
               </a:ext>
             </a:extLst>
           </p:cNvPr>
@@ -22712,15 +22237,16 @@
           </p:cNvPicPr>
           <p:nvPr/>
         </p:nvPicPr>
-        <p:blipFill rotWithShape="1">
+        <p:blipFill>
           <a:blip r:embed="rId2"/>
-          <a:srcRect b="12722"/>
-          <a:stretch/>
+          <a:stretch>
+            <a:fillRect/>
+          </a:stretch>
         </p:blipFill>
         <p:spPr>
           <a:xfrm>
-            <a:off x="4563611" y="438325"/>
-            <a:ext cx="5719674" cy="5981350"/>
+            <a:off x="5125101" y="0"/>
+            <a:ext cx="5297393" cy="6858000"/>
           </a:xfrm>
           <a:prstGeom prst="rect">
             <a:avLst/>
@@ -22802,7 +22328,7 @@
             <p:ph idx="1"/>
             <p:extLst>
               <p:ext uri="{D42A27DB-BD31-4B8C-83A1-F6EECF244321}">
-                <p14:modId xmlns:p14="http://schemas.microsoft.com/office/powerpoint/2010/main" val="2805922393"/>
+                <p14:modId xmlns:p14="http://schemas.microsoft.com/office/powerpoint/2010/main" val="3639353537"/>
               </p:ext>
             </p:extLst>
           </p:nvPr>
@@ -22942,7 +22468,7 @@
             <p:ph idx="1"/>
             <p:extLst>
               <p:ext uri="{D42A27DB-BD31-4B8C-83A1-F6EECF244321}">
-                <p14:modId xmlns:p14="http://schemas.microsoft.com/office/powerpoint/2010/main" val="3305338273"/>
+                <p14:modId xmlns:p14="http://schemas.microsoft.com/office/powerpoint/2010/main" val="893185750"/>
               </p:ext>
             </p:extLst>
           </p:nvPr>

</xml_diff>

<commit_message>
logCheck change added SQL to take in the labels, and their notes for the repsective report to print added option to reprint one serial number created printLabelv2 to be the updated version that takes in a report Updated the powerpoint
</commit_message>
<xml_diff>
--- a/LabelSerialNumberChangeProposal.pptx
+++ b/LabelSerialNumberChangeProposal.pptx
@@ -17457,7 +17457,7 @@
             <a:fld id="{5586B75A-687E-405C-8A0B-8D00578BA2C3}" type="datetimeFigureOut">
               <a:rPr lang="en-US" dirty="0"/>
               <a:pPr/>
-              <a:t>9/15/2021</a:t>
+              <a:t>9/16/2021</a:t>
             </a:fld>
             <a:endParaRPr lang="en-US" dirty="0"/>
           </a:p>
@@ -17624,7 +17624,7 @@
             <a:fld id="{5586B75A-687E-405C-8A0B-8D00578BA2C3}" type="datetimeFigureOut">
               <a:rPr lang="en-US" dirty="0"/>
               <a:pPr/>
-              <a:t>9/15/2021</a:t>
+              <a:t>9/16/2021</a:t>
             </a:fld>
             <a:endParaRPr lang="en-US" dirty="0"/>
           </a:p>
@@ -17801,7 +17801,7 @@
             <a:fld id="{5586B75A-687E-405C-8A0B-8D00578BA2C3}" type="datetimeFigureOut">
               <a:rPr lang="en-US" dirty="0"/>
               <a:pPr/>
-              <a:t>9/15/2021</a:t>
+              <a:t>9/16/2021</a:t>
             </a:fld>
             <a:endParaRPr lang="en-US" dirty="0"/>
           </a:p>
@@ -17968,7 +17968,7 @@
             <a:fld id="{5586B75A-687E-405C-8A0B-8D00578BA2C3}" type="datetimeFigureOut">
               <a:rPr lang="en-US" dirty="0"/>
               <a:pPr/>
-              <a:t>9/15/2021</a:t>
+              <a:t>9/16/2021</a:t>
             </a:fld>
             <a:endParaRPr lang="en-US" dirty="0"/>
           </a:p>
@@ -18223,7 +18223,7 @@
             <a:fld id="{5586B75A-687E-405C-8A0B-8D00578BA2C3}" type="datetimeFigureOut">
               <a:rPr lang="en-US" dirty="0"/>
               <a:pPr/>
-              <a:t>9/15/2021</a:t>
+              <a:t>9/16/2021</a:t>
             </a:fld>
             <a:endParaRPr lang="en-US" dirty="0"/>
           </a:p>
@@ -18508,7 +18508,7 @@
             <a:fld id="{5586B75A-687E-405C-8A0B-8D00578BA2C3}" type="datetimeFigureOut">
               <a:rPr lang="en-US" dirty="0"/>
               <a:pPr/>
-              <a:t>9/15/2021</a:t>
+              <a:t>9/16/2021</a:t>
             </a:fld>
             <a:endParaRPr lang="en-US" dirty="0"/>
           </a:p>
@@ -18947,7 +18947,7 @@
             <a:fld id="{5586B75A-687E-405C-8A0B-8D00578BA2C3}" type="datetimeFigureOut">
               <a:rPr lang="en-US" dirty="0"/>
               <a:pPr/>
-              <a:t>9/15/2021</a:t>
+              <a:t>9/16/2021</a:t>
             </a:fld>
             <a:endParaRPr lang="en-US" dirty="0"/>
           </a:p>
@@ -19062,7 +19062,7 @@
             <a:fld id="{5586B75A-687E-405C-8A0B-8D00578BA2C3}" type="datetimeFigureOut">
               <a:rPr lang="en-US" dirty="0"/>
               <a:pPr/>
-              <a:t>9/15/2021</a:t>
+              <a:t>9/16/2021</a:t>
             </a:fld>
             <a:endParaRPr lang="en-US" dirty="0"/>
           </a:p>
@@ -19154,7 +19154,7 @@
             <a:fld id="{5586B75A-687E-405C-8A0B-8D00578BA2C3}" type="datetimeFigureOut">
               <a:rPr lang="en-US" dirty="0"/>
               <a:pPr/>
-              <a:t>9/15/2021</a:t>
+              <a:t>9/16/2021</a:t>
             </a:fld>
             <a:endParaRPr lang="en-US" dirty="0"/>
           </a:p>
@@ -19439,7 +19439,7 @@
             <a:fld id="{5586B75A-687E-405C-8A0B-8D00578BA2C3}" type="datetimeFigureOut">
               <a:rPr lang="en-US" dirty="0"/>
               <a:pPr/>
-              <a:t>9/15/2021</a:t>
+              <a:t>9/16/2021</a:t>
             </a:fld>
             <a:endParaRPr lang="en-US" dirty="0"/>
           </a:p>
@@ -19709,7 +19709,7 @@
             <a:fld id="{5586B75A-687E-405C-8A0B-8D00578BA2C3}" type="datetimeFigureOut">
               <a:rPr lang="en-US" dirty="0"/>
               <a:pPr/>
-              <a:t>9/15/2021</a:t>
+              <a:t>9/16/2021</a:t>
             </a:fld>
             <a:endParaRPr lang="en-US" dirty="0"/>
           </a:p>
@@ -20003,7 +20003,7 @@
             <a:fld id="{5586B75A-687E-405C-8A0B-8D00578BA2C3}" type="datetimeFigureOut">
               <a:rPr lang="en-US" dirty="0"/>
               <a:pPr/>
-              <a:t>9/15/2021</a:t>
+              <a:t>9/16/2021</a:t>
             </a:fld>
             <a:endParaRPr lang="en-US" dirty="0"/>
           </a:p>
@@ -20642,10 +20642,10 @@
       </p:sp>
       <p:pic>
         <p:nvPicPr>
-          <p:cNvPr id="6" name="Picture 5">
+          <p:cNvPr id="5" name="Picture 4">
             <a:extLst>
               <a:ext uri="{FF2B5EF4-FFF2-40B4-BE49-F238E27FC236}">
-                <a16:creationId xmlns:a16="http://schemas.microsoft.com/office/drawing/2014/main" id="{DAC4F764-7F89-447D-B1F2-E12C376840B0}"/>
+                <a16:creationId xmlns:a16="http://schemas.microsoft.com/office/drawing/2014/main" id="{925D0FFF-23DA-4B5A-AFBF-C3F4FBCA08EB}"/>
               </a:ext>
             </a:extLst>
           </p:cNvPr>
@@ -20662,8 +20662,8 @@
         </p:blipFill>
         <p:spPr>
           <a:xfrm>
-            <a:off x="3512195" y="1273185"/>
-            <a:ext cx="8229004" cy="4311629"/>
+            <a:off x="3639855" y="1316292"/>
+            <a:ext cx="8077999" cy="4225415"/>
           </a:xfrm>
           <a:prstGeom prst="rect">
             <a:avLst/>
@@ -20723,15 +20723,7 @@
           <a:p>
             <a:r>
               <a:rPr lang="en-US" dirty="0"/>
-              <a:t>After 2</a:t>
-            </a:r>
-            <a:r>
-              <a:rPr lang="en-US" baseline="30000" dirty="0"/>
-              <a:t>nd</a:t>
-            </a:r>
-            <a:r>
-              <a:rPr lang="en-US" dirty="0"/>
-              <a:t> Scan</a:t>
+              <a:t>After Question</a:t>
             </a:r>
             <a:endParaRPr lang="fr-CA" dirty="0"/>
           </a:p>
@@ -20758,16 +20750,20 @@
           <a:bodyPr/>
           <a:lstStyle/>
           <a:p>
-            <a:endParaRPr lang="fr-CA"/>
+            <a:r>
+              <a:rPr lang="en-US" dirty="0"/>
+              <a:t>If it is the first time, there will be no question, just straight to the print</a:t>
+            </a:r>
+            <a:endParaRPr lang="fr-CA" dirty="0"/>
           </a:p>
         </p:txBody>
       </p:sp>
       <p:pic>
         <p:nvPicPr>
-          <p:cNvPr id="8" name="Picture 7">
+          <p:cNvPr id="5" name="Picture 4">
             <a:extLst>
               <a:ext uri="{FF2B5EF4-FFF2-40B4-BE49-F238E27FC236}">
-                <a16:creationId xmlns:a16="http://schemas.microsoft.com/office/drawing/2014/main" id="{06464887-E2EE-4A69-B34E-4B72B811C0FB}"/>
+                <a16:creationId xmlns:a16="http://schemas.microsoft.com/office/drawing/2014/main" id="{87B14B07-E0F9-4C41-8E3E-F58DBA5EB808}"/>
               </a:ext>
             </a:extLst>
           </p:cNvPr>
@@ -20784,8 +20780,8 @@
         </p:blipFill>
         <p:spPr>
           <a:xfrm>
-            <a:off x="3592484" y="1308316"/>
-            <a:ext cx="8093389" cy="4241367"/>
+            <a:off x="3595176" y="1309656"/>
+            <a:ext cx="8135947" cy="4238687"/>
           </a:xfrm>
           <a:prstGeom prst="rect">
             <a:avLst/>
@@ -21684,10 +21680,10 @@
       </p:sp>
       <p:pic>
         <p:nvPicPr>
-          <p:cNvPr id="8" name="Picture 7">
+          <p:cNvPr id="5" name="Picture 4">
             <a:extLst>
               <a:ext uri="{FF2B5EF4-FFF2-40B4-BE49-F238E27FC236}">
-                <a16:creationId xmlns:a16="http://schemas.microsoft.com/office/drawing/2014/main" id="{5DC55BB6-4905-4058-A1A3-E55A95185973}"/>
+                <a16:creationId xmlns:a16="http://schemas.microsoft.com/office/drawing/2014/main" id="{D9B95BC8-DD36-4108-89F1-F11176309BBE}"/>
               </a:ext>
             </a:extLst>
           </p:cNvPr>
@@ -21704,8 +21700,8 @@
         </p:blipFill>
         <p:spPr>
           <a:xfrm>
-            <a:off x="3692560" y="775981"/>
-            <a:ext cx="7979783" cy="5306037"/>
+            <a:off x="3565321" y="755460"/>
+            <a:ext cx="8013673" cy="5347079"/>
           </a:xfrm>
           <a:prstGeom prst="rect">
             <a:avLst/>
@@ -21906,48 +21902,16 @@
           <a:bodyPr/>
           <a:lstStyle/>
           <a:p>
-            <a:r>
-              <a:rPr lang="en-US" dirty="0"/>
-              <a:t>Amt/Amt or Amt?</a:t>
-            </a:r>
-          </a:p>
-          <a:p>
-            <a:r>
-              <a:rPr lang="en-US" dirty="0"/>
-              <a:t>Boxes or Circle?</a:t>
-            </a:r>
-          </a:p>
-          <a:p>
-            <a:r>
-              <a:rPr lang="en-US" dirty="0"/>
-              <a:t>Any more info wanted?</a:t>
-            </a:r>
-            <a:endParaRPr lang="fr-CA" dirty="0"/>
-          </a:p>
-          <a:p>
-            <a:r>
-              <a:rPr lang="en-US" dirty="0"/>
-              <a:t>Spacing?</a:t>
-            </a:r>
-          </a:p>
-          <a:p>
-            <a:r>
-              <a:rPr lang="en-US" dirty="0"/>
-              <a:t>Not enough SN per Orders?</a:t>
-            </a:r>
-            <a:endParaRPr lang="fr-CA" dirty="0"/>
-          </a:p>
-          <a:p>
             <a:endParaRPr lang="fr-CA" dirty="0"/>
           </a:p>
         </p:txBody>
       </p:sp>
       <p:pic>
         <p:nvPicPr>
-          <p:cNvPr id="5" name="Picture 4">
+          <p:cNvPr id="6" name="Picture 5">
             <a:extLst>
               <a:ext uri="{FF2B5EF4-FFF2-40B4-BE49-F238E27FC236}">
-                <a16:creationId xmlns:a16="http://schemas.microsoft.com/office/drawing/2014/main" id="{9EE89808-8709-4562-8462-64509626BE3E}"/>
+                <a16:creationId xmlns:a16="http://schemas.microsoft.com/office/drawing/2014/main" id="{078D3E07-4BE7-4D3B-B12B-E244F3FA1CC9}"/>
               </a:ext>
             </a:extLst>
           </p:cNvPr>
@@ -21956,15 +21920,16 @@
           </p:cNvPicPr>
           <p:nvPr/>
         </p:nvPicPr>
-        <p:blipFill rotWithShape="1">
+        <p:blipFill>
           <a:blip r:embed="rId2"/>
-          <a:srcRect b="9091"/>
-          <a:stretch/>
+          <a:stretch>
+            <a:fillRect/>
+          </a:stretch>
         </p:blipFill>
         <p:spPr>
           <a:xfrm>
-            <a:off x="3836512" y="755009"/>
-            <a:ext cx="7770623" cy="5327009"/>
+            <a:off x="3875715" y="741623"/>
+            <a:ext cx="7477121" cy="5374753"/>
           </a:xfrm>
           <a:prstGeom prst="rect">
             <a:avLst/>
@@ -22032,24 +21997,6 @@
       </p:sp>
       <p:sp>
         <p:nvSpPr>
-          <p:cNvPr id="3" name="Picture Placeholder 2">
-            <a:extLst>
-              <a:ext uri="{FF2B5EF4-FFF2-40B4-BE49-F238E27FC236}">
-                <a16:creationId xmlns:a16="http://schemas.microsoft.com/office/drawing/2014/main" id="{22B443F7-658F-4120-9647-6E66A0CB1443}"/>
-              </a:ext>
-            </a:extLst>
-          </p:cNvPr>
-          <p:cNvSpPr>
-            <a:spLocks noGrp="1"/>
-          </p:cNvSpPr>
-          <p:nvPr>
-            <p:ph type="pic" idx="1"/>
-          </p:nvPr>
-        </p:nvSpPr>
-        <p:spPr/>
-      </p:sp>
-      <p:sp>
-        <p:nvSpPr>
           <p:cNvPr id="4" name="Text Placeholder 3">
             <a:extLst>
               <a:ext uri="{FF2B5EF4-FFF2-40B4-BE49-F238E27FC236}">
@@ -22069,52 +22016,16 @@
           <a:bodyPr/>
           <a:lstStyle/>
           <a:p>
-            <a:r>
-              <a:rPr lang="en-US" dirty="0"/>
-              <a:t>Amt/Amt or Amt?</a:t>
-            </a:r>
-          </a:p>
-          <a:p>
-            <a:r>
-              <a:rPr lang="en-US" dirty="0"/>
-              <a:t>Boxes or Circle?</a:t>
-            </a:r>
-          </a:p>
-          <a:p>
-            <a:r>
-              <a:rPr lang="en-US" dirty="0"/>
-              <a:t>Any more info wanted?</a:t>
-            </a:r>
-            <a:endParaRPr lang="fr-CA" dirty="0"/>
-          </a:p>
-          <a:p>
-            <a:r>
-              <a:rPr lang="en-US" dirty="0"/>
-              <a:t>Spacing?</a:t>
-            </a:r>
-          </a:p>
-          <a:p>
-            <a:r>
-              <a:rPr lang="en-US" dirty="0"/>
-              <a:t>Not enough SN per Orders?</a:t>
-            </a:r>
-            <a:br>
-              <a:rPr lang="fr-CA" dirty="0"/>
-            </a:br>
-            <a:r>
-              <a:rPr lang="fr-CA" dirty="0"/>
-              <a:t>-alt for reprint?</a:t>
-            </a:r>
             <a:endParaRPr lang="en-US" dirty="0"/>
           </a:p>
         </p:txBody>
       </p:sp>
       <p:pic>
         <p:nvPicPr>
-          <p:cNvPr id="14" name="Picture 13">
+          <p:cNvPr id="6" name="Picture 5">
             <a:extLst>
               <a:ext uri="{FF2B5EF4-FFF2-40B4-BE49-F238E27FC236}">
-                <a16:creationId xmlns:a16="http://schemas.microsoft.com/office/drawing/2014/main" id="{FD2B8DA0-C985-4141-B0CE-A938BF2501D9}"/>
+                <a16:creationId xmlns:a16="http://schemas.microsoft.com/office/drawing/2014/main" id="{09A34C31-15A7-4BA0-9017-675B745473DC}"/>
               </a:ext>
             </a:extLst>
           </p:cNvPr>
@@ -22131,8 +22042,8 @@
         </p:blipFill>
         <p:spPr>
           <a:xfrm>
-            <a:off x="3570644" y="759630"/>
-            <a:ext cx="8115230" cy="5365880"/>
+            <a:off x="4236441" y="757045"/>
+            <a:ext cx="6997367" cy="5343910"/>
           </a:xfrm>
           <a:prstGeom prst="rect">
             <a:avLst/>
@@ -22370,25 +22281,13 @@
             </a:r>
             <a:r>
               <a:rPr lang="en-US" dirty="0"/>
-              <a:t> will search for Ctrl+F9 to start the program</a:t>
+              <a:t> will search for F9 to start the program</a:t>
             </a:r>
           </a:p>
           <a:p>
             <a:r>
               <a:rPr lang="en-US" dirty="0"/>
-              <a:t>Scanners will automatically press F9, user must hold Ctrl</a:t>
-            </a:r>
-          </a:p>
-          <a:p>
-            <a:r>
-              <a:rPr lang="en-US" dirty="0"/>
-              <a:t>Scan twice to input the barcode</a:t>
-            </a:r>
-          </a:p>
-          <a:p>
-            <a:r>
-              <a:rPr lang="en-US" dirty="0"/>
-              <a:t>Enter the print amount *</a:t>
+              <a:t>Enter the print amount</a:t>
             </a:r>
           </a:p>
         </p:txBody>

</xml_diff>

<commit_message>
printLabelsv2 changed added the printer names, and fixed some small errors Modularized and added comments
</commit_message>
<xml_diff>
--- a/LabelSerialNumberChangeProposal.pptx
+++ b/LabelSerialNumberChangeProposal.pptx
@@ -16,13 +16,14 @@
     <p:sldId id="272" r:id="rId10"/>
     <p:sldId id="273" r:id="rId11"/>
     <p:sldId id="274" r:id="rId12"/>
-    <p:sldId id="271" r:id="rId13"/>
-    <p:sldId id="259" r:id="rId14"/>
-    <p:sldId id="260" r:id="rId15"/>
-    <p:sldId id="261" r:id="rId16"/>
-    <p:sldId id="264" r:id="rId17"/>
-    <p:sldId id="263" r:id="rId18"/>
-    <p:sldId id="262" r:id="rId19"/>
+    <p:sldId id="276" r:id="rId13"/>
+    <p:sldId id="271" r:id="rId14"/>
+    <p:sldId id="259" r:id="rId15"/>
+    <p:sldId id="260" r:id="rId16"/>
+    <p:sldId id="261" r:id="rId17"/>
+    <p:sldId id="264" r:id="rId18"/>
+    <p:sldId id="263" r:id="rId19"/>
+    <p:sldId id="262" r:id="rId20"/>
   </p:sldIdLst>
   <p:sldSz cx="12192000" cy="6858000"/>
   <p:notesSz cx="6858000" cy="9144000"/>
@@ -3961,14 +3962,14 @@
         <a:p>
           <a:r>
             <a:rPr lang="en-US" dirty="0"/>
-            <a:t>printLabels.bat</a:t>
+            <a:t>printLabelsv2.bat</a:t>
           </a:r>
           <a:br>
             <a:rPr lang="en-US" dirty="0"/>
           </a:br>
           <a:r>
             <a:rPr lang="en-US" dirty="0"/>
-            <a:t>+3 .</a:t>
+            <a:t>+X .</a:t>
           </a:r>
           <a:r>
             <a:rPr lang="en-US" dirty="0" err="1"/>
@@ -4163,6 +4164,54 @@
         </a:p>
       </dgm:t>
     </dgm:pt>
+    <dgm:pt modelId="{F5DB1430-E849-4A67-BCD3-028245B3E3AF}">
+      <dgm:prSet/>
+      <dgm:spPr/>
+      <dgm:t>
+        <a:bodyPr/>
+        <a:lstStyle/>
+        <a:p>
+          <a:r>
+            <a:rPr lang="en-US" dirty="0"/>
+            <a:t>printQA.bat</a:t>
+          </a:r>
+          <a:br>
+            <a:rPr lang="en-US" dirty="0"/>
+          </a:br>
+          <a:r>
+            <a:rPr lang="en-US" dirty="0"/>
+            <a:t>+1 .</a:t>
+          </a:r>
+          <a:r>
+            <a:rPr lang="en-US" dirty="0" err="1"/>
+            <a:t>rpt</a:t>
+          </a:r>
+          <a:endParaRPr lang="fr-CA" dirty="0"/>
+        </a:p>
+      </dgm:t>
+    </dgm:pt>
+    <dgm:pt modelId="{81654E97-7E1A-468A-A4BE-C1A2E807DAF9}" type="parTrans" cxnId="{24BCCF1F-FFF9-4C1B-B9E2-4C62A543ED60}">
+      <dgm:prSet/>
+      <dgm:spPr/>
+      <dgm:t>
+        <a:bodyPr/>
+        <a:lstStyle/>
+        <a:p>
+          <a:endParaRPr lang="fr-CA"/>
+        </a:p>
+      </dgm:t>
+    </dgm:pt>
+    <dgm:pt modelId="{A6D5F59C-E942-459D-80CB-B31DCD4E71B4}" type="sibTrans" cxnId="{24BCCF1F-FFF9-4C1B-B9E2-4C62A543ED60}">
+      <dgm:prSet/>
+      <dgm:spPr/>
+      <dgm:t>
+        <a:bodyPr/>
+        <a:lstStyle/>
+        <a:p>
+          <a:endParaRPr lang="fr-CA"/>
+        </a:p>
+      </dgm:t>
+    </dgm:pt>
     <dgm:pt modelId="{1FB3CEF6-77BB-4E6C-A2DD-4A3F7EC690C5}" type="pres">
       <dgm:prSet presAssocID="{EC376E4E-E648-41DA-86DB-8DA8BA5FAEC7}" presName="hierChild1" presStyleCnt="0">
         <dgm:presLayoutVars>
@@ -4236,8 +4285,44 @@
       <dgm:prSet presAssocID="{B11103E8-CD81-40BE-B579-4FCAB035D7D0}" presName="hierChild4" presStyleCnt="0"/>
       <dgm:spPr/>
     </dgm:pt>
+    <dgm:pt modelId="{7AA25F1C-51B2-49BF-8201-0652CE559B21}" type="pres">
+      <dgm:prSet presAssocID="{81654E97-7E1A-468A-A4BE-C1A2E807DAF9}" presName="Name37" presStyleLbl="parChTrans1D3" presStyleIdx="0" presStyleCnt="5"/>
+      <dgm:spPr/>
+    </dgm:pt>
+    <dgm:pt modelId="{894F9E9B-7055-4E66-AF59-07013E419A5C}" type="pres">
+      <dgm:prSet presAssocID="{F5DB1430-E849-4A67-BCD3-028245B3E3AF}" presName="hierRoot2" presStyleCnt="0">
+        <dgm:presLayoutVars>
+          <dgm:hierBranch val="init"/>
+        </dgm:presLayoutVars>
+      </dgm:prSet>
+      <dgm:spPr/>
+    </dgm:pt>
+    <dgm:pt modelId="{64A91C8C-0772-45D6-AD00-72AAAD91D341}" type="pres">
+      <dgm:prSet presAssocID="{F5DB1430-E849-4A67-BCD3-028245B3E3AF}" presName="rootComposite" presStyleCnt="0"/>
+      <dgm:spPr/>
+    </dgm:pt>
+    <dgm:pt modelId="{D9BAE0A2-1877-42BD-82CF-B647EA24D564}" type="pres">
+      <dgm:prSet presAssocID="{F5DB1430-E849-4A67-BCD3-028245B3E3AF}" presName="rootText" presStyleLbl="node3" presStyleIdx="0" presStyleCnt="4">
+        <dgm:presLayoutVars>
+          <dgm:chPref val="3"/>
+        </dgm:presLayoutVars>
+      </dgm:prSet>
+      <dgm:spPr/>
+    </dgm:pt>
+    <dgm:pt modelId="{9C9D2984-BB26-459C-A377-46B76EC7C1DE}" type="pres">
+      <dgm:prSet presAssocID="{F5DB1430-E849-4A67-BCD3-028245B3E3AF}" presName="rootConnector" presStyleLbl="node3" presStyleIdx="0" presStyleCnt="4"/>
+      <dgm:spPr/>
+    </dgm:pt>
+    <dgm:pt modelId="{4F0C3D8D-71C6-41BD-B747-4B9907999B97}" type="pres">
+      <dgm:prSet presAssocID="{F5DB1430-E849-4A67-BCD3-028245B3E3AF}" presName="hierChild4" presStyleCnt="0"/>
+      <dgm:spPr/>
+    </dgm:pt>
+    <dgm:pt modelId="{D22ADF25-2909-4CC0-991A-22958AA2A3E1}" type="pres">
+      <dgm:prSet presAssocID="{F5DB1430-E849-4A67-BCD3-028245B3E3AF}" presName="hierChild5" presStyleCnt="0"/>
+      <dgm:spPr/>
+    </dgm:pt>
     <dgm:pt modelId="{CA698B96-2FDD-477F-82FD-3398AEE00C53}" type="pres">
-      <dgm:prSet presAssocID="{E91B2509-2172-40BF-92BF-95C71C842B9D}" presName="Name37" presStyleLbl="parChTrans1D3" presStyleIdx="0" presStyleCnt="4"/>
+      <dgm:prSet presAssocID="{E91B2509-2172-40BF-92BF-95C71C842B9D}" presName="Name37" presStyleLbl="parChTrans1D3" presStyleIdx="1" presStyleCnt="5"/>
       <dgm:spPr/>
     </dgm:pt>
     <dgm:pt modelId="{473DEF0C-42E2-4A50-856D-1F839CCF32C4}" type="pres">
@@ -4253,7 +4338,7 @@
       <dgm:spPr/>
     </dgm:pt>
     <dgm:pt modelId="{CB2F9E2B-60EC-401F-A7AE-483C76BC0EC4}" type="pres">
-      <dgm:prSet presAssocID="{C1DA3676-0503-49EC-84DF-0840E579CFEF}" presName="rootText" presStyleLbl="node3" presStyleIdx="0" presStyleCnt="3">
+      <dgm:prSet presAssocID="{C1DA3676-0503-49EC-84DF-0840E579CFEF}" presName="rootText" presStyleLbl="node3" presStyleIdx="1" presStyleCnt="4">
         <dgm:presLayoutVars>
           <dgm:chPref val="3"/>
         </dgm:presLayoutVars>
@@ -4261,7 +4346,7 @@
       <dgm:spPr/>
     </dgm:pt>
     <dgm:pt modelId="{87894099-6401-42BD-9593-FCCC7AE42C49}" type="pres">
-      <dgm:prSet presAssocID="{C1DA3676-0503-49EC-84DF-0840E579CFEF}" presName="rootConnector" presStyleLbl="node3" presStyleIdx="0" presStyleCnt="3"/>
+      <dgm:prSet presAssocID="{C1DA3676-0503-49EC-84DF-0840E579CFEF}" presName="rootConnector" presStyleLbl="node3" presStyleIdx="1" presStyleCnt="4"/>
       <dgm:spPr/>
     </dgm:pt>
     <dgm:pt modelId="{5AB908CA-153D-4CCC-9357-A7CB91FB315D}" type="pres">
@@ -4273,7 +4358,7 @@
       <dgm:spPr/>
     </dgm:pt>
     <dgm:pt modelId="{28A959D3-8E8F-4C33-8E58-743CD226A445}" type="pres">
-      <dgm:prSet presAssocID="{8F3C6AC4-A53B-4B83-A481-13534CEBBE7D}" presName="Name37" presStyleLbl="parChTrans1D3" presStyleIdx="1" presStyleCnt="4"/>
+      <dgm:prSet presAssocID="{8F3C6AC4-A53B-4B83-A481-13534CEBBE7D}" presName="Name37" presStyleLbl="parChTrans1D3" presStyleIdx="2" presStyleCnt="5"/>
       <dgm:spPr/>
     </dgm:pt>
     <dgm:pt modelId="{9942EE3E-75B3-40C5-9515-14C899144BE6}" type="pres">
@@ -4289,7 +4374,7 @@
       <dgm:spPr/>
     </dgm:pt>
     <dgm:pt modelId="{227A2695-8EBE-4628-A9EE-801697A0D3C2}" type="pres">
-      <dgm:prSet presAssocID="{4DE9C598-B23B-4383-915B-55E3A905EC09}" presName="rootText" presStyleLbl="node3" presStyleIdx="1" presStyleCnt="3">
+      <dgm:prSet presAssocID="{4DE9C598-B23B-4383-915B-55E3A905EC09}" presName="rootText" presStyleLbl="node3" presStyleIdx="2" presStyleCnt="4">
         <dgm:presLayoutVars>
           <dgm:chPref val="3"/>
         </dgm:presLayoutVars>
@@ -4297,7 +4382,7 @@
       <dgm:spPr/>
     </dgm:pt>
     <dgm:pt modelId="{EAF98DA0-A25D-4689-9A35-0FB204C4D414}" type="pres">
-      <dgm:prSet presAssocID="{4DE9C598-B23B-4383-915B-55E3A905EC09}" presName="rootConnector" presStyleLbl="node3" presStyleIdx="1" presStyleCnt="3"/>
+      <dgm:prSet presAssocID="{4DE9C598-B23B-4383-915B-55E3A905EC09}" presName="rootConnector" presStyleLbl="node3" presStyleIdx="2" presStyleCnt="4"/>
       <dgm:spPr/>
     </dgm:pt>
     <dgm:pt modelId="{B1130AF9-6FE0-4F08-9475-22188116C08D}" type="pres">
@@ -4345,7 +4430,7 @@
       <dgm:spPr/>
     </dgm:pt>
     <dgm:pt modelId="{36F9C691-4B50-4159-9F42-B35EF32A6B44}" type="pres">
-      <dgm:prSet presAssocID="{F92BA4C8-D8E7-4F76-9AE8-619682ED5A87}" presName="Name37" presStyleLbl="parChTrans1D3" presStyleIdx="2" presStyleCnt="4"/>
+      <dgm:prSet presAssocID="{F92BA4C8-D8E7-4F76-9AE8-619682ED5A87}" presName="Name37" presStyleLbl="parChTrans1D3" presStyleIdx="3" presStyleCnt="5"/>
       <dgm:spPr/>
     </dgm:pt>
     <dgm:pt modelId="{312C63B7-2356-4591-A8D8-CB4355394DE3}" type="pres">
@@ -4361,7 +4446,7 @@
       <dgm:spPr/>
     </dgm:pt>
     <dgm:pt modelId="{B7B9E35F-3141-4501-8C8E-ECDBA7C3D699}" type="pres">
-      <dgm:prSet presAssocID="{4A4E3E50-38C2-4C3C-AE96-953BA26A11C9}" presName="rootText" presStyleLbl="node3" presStyleIdx="2" presStyleCnt="3">
+      <dgm:prSet presAssocID="{4A4E3E50-38C2-4C3C-AE96-953BA26A11C9}" presName="rootText" presStyleLbl="node3" presStyleIdx="3" presStyleCnt="4">
         <dgm:presLayoutVars>
           <dgm:chPref val="3"/>
         </dgm:presLayoutVars>
@@ -4369,7 +4454,7 @@
       <dgm:spPr/>
     </dgm:pt>
     <dgm:pt modelId="{7914E8B1-80D5-4A71-9775-0A174E4B78BC}" type="pres">
-      <dgm:prSet presAssocID="{4A4E3E50-38C2-4C3C-AE96-953BA26A11C9}" presName="rootConnector" presStyleLbl="node3" presStyleIdx="2" presStyleCnt="3"/>
+      <dgm:prSet presAssocID="{4A4E3E50-38C2-4C3C-AE96-953BA26A11C9}" presName="rootConnector" presStyleLbl="node3" presStyleIdx="3" presStyleCnt="4"/>
       <dgm:spPr/>
     </dgm:pt>
     <dgm:pt modelId="{9A41BE5B-11A2-49DE-9691-74C1D4BA987E}" type="pres">
@@ -4385,7 +4470,7 @@
       <dgm:spPr/>
     </dgm:pt>
     <dgm:pt modelId="{FC040049-51F5-41BD-8A19-8EF975D2FEC2}" type="pres">
-      <dgm:prSet presAssocID="{F5961BDC-783E-4C07-BC92-9011F5BBD285}" presName="Name111" presStyleLbl="parChTrans1D3" presStyleIdx="3" presStyleCnt="4"/>
+      <dgm:prSet presAssocID="{F5961BDC-783E-4C07-BC92-9011F5BBD285}" presName="Name111" presStyleLbl="parChTrans1D3" presStyleIdx="4" presStyleCnt="5"/>
       <dgm:spPr/>
     </dgm:pt>
     <dgm:pt modelId="{E0DB40E2-3599-401C-9680-5F546B644036}" type="pres">
@@ -4429,27 +4514,31 @@
     <dgm:cxn modelId="{EC288514-5953-4371-B614-67E2587A0632}" type="presOf" srcId="{8F3C6AC4-A53B-4B83-A481-13534CEBBE7D}" destId="{28A959D3-8E8F-4C33-8E58-743CD226A445}" srcOrd="0" destOrd="0" presId="urn:microsoft.com/office/officeart/2005/8/layout/orgChart1"/>
     <dgm:cxn modelId="{E6F4F318-A20C-4F11-A512-B27325BAF16D}" type="presOf" srcId="{1763EED3-26D7-4B0E-B022-1B72A013A70C}" destId="{CDB323ED-45A3-4822-B212-E9401A6C85A9}" srcOrd="1" destOrd="0" presId="urn:microsoft.com/office/officeart/2005/8/layout/orgChart1"/>
     <dgm:cxn modelId="{824EB01B-7989-4B5E-B04F-F041A0FBE0D9}" type="presOf" srcId="{12B359AD-F8D0-452E-9FE6-4E1434D70F15}" destId="{62E9EE9C-9C61-429A-9C9D-4DB0E88E4329}" srcOrd="1" destOrd="0" presId="urn:microsoft.com/office/officeart/2005/8/layout/orgChart1"/>
+    <dgm:cxn modelId="{24BCCF1F-FFF9-4C1B-B9E2-4C62A543ED60}" srcId="{B11103E8-CD81-40BE-B579-4FCAB035D7D0}" destId="{F5DB1430-E849-4A67-BCD3-028245B3E3AF}" srcOrd="0" destOrd="0" parTransId="{81654E97-7E1A-468A-A4BE-C1A2E807DAF9}" sibTransId="{A6D5F59C-E942-459D-80CB-B31DCD4E71B4}"/>
+    <dgm:cxn modelId="{0DCC2624-50E3-4C52-80D0-315ACC848C55}" type="presOf" srcId="{F5DB1430-E849-4A67-BCD3-028245B3E3AF}" destId="{D9BAE0A2-1877-42BD-82CF-B647EA24D564}" srcOrd="0" destOrd="0" presId="urn:microsoft.com/office/officeart/2005/8/layout/orgChart1"/>
     <dgm:cxn modelId="{D4789563-D13B-4B08-BDCA-385B520F591F}" type="presOf" srcId="{A7BDC5C7-F208-4337-83DA-CEAB2AF8A6E8}" destId="{CA2AF3D0-A783-4F4A-AF16-39637F115AA6}" srcOrd="0" destOrd="0" presId="urn:microsoft.com/office/officeart/2005/8/layout/orgChart1"/>
     <dgm:cxn modelId="{B22BB143-FF24-4728-B175-EA1552D06D94}" type="presOf" srcId="{B11103E8-CD81-40BE-B579-4FCAB035D7D0}" destId="{4E2D0EDB-C4D6-450E-83EA-96CF439066D6}" srcOrd="1" destOrd="0" presId="urn:microsoft.com/office/officeart/2005/8/layout/orgChart1"/>
     <dgm:cxn modelId="{175ED643-4624-4279-9AC0-71B49AB06463}" type="presOf" srcId="{12B359AD-F8D0-452E-9FE6-4E1434D70F15}" destId="{92DD8E95-5792-4CAF-BBE2-B190055FFE9B}" srcOrd="0" destOrd="0" presId="urn:microsoft.com/office/officeart/2005/8/layout/orgChart1"/>
     <dgm:cxn modelId="{19586B45-307A-4F82-965B-3618C233D3C3}" type="presOf" srcId="{C1DA3676-0503-49EC-84DF-0840E579CFEF}" destId="{87894099-6401-42BD-9593-FCCC7AE42C49}" srcOrd="1" destOrd="0" presId="urn:microsoft.com/office/officeart/2005/8/layout/orgChart1"/>
     <dgm:cxn modelId="{198BD745-2D9F-4E83-921B-DBA00E038AA2}" type="presOf" srcId="{1763EED3-26D7-4B0E-B022-1B72A013A70C}" destId="{B7666E4B-FE3C-4B7F-ADE2-C772AB73DAAC}" srcOrd="0" destOrd="0" presId="urn:microsoft.com/office/officeart/2005/8/layout/orgChart1"/>
-    <dgm:cxn modelId="{56DEE571-1D10-4A28-9146-2F3255577C1A}" srcId="{B11103E8-CD81-40BE-B579-4FCAB035D7D0}" destId="{C1DA3676-0503-49EC-84DF-0840E579CFEF}" srcOrd="0" destOrd="0" parTransId="{E91B2509-2172-40BF-92BF-95C71C842B9D}" sibTransId="{249178E8-CF68-4256-8FB4-C392210D1F0F}"/>
+    <dgm:cxn modelId="{56DEE571-1D10-4A28-9146-2F3255577C1A}" srcId="{B11103E8-CD81-40BE-B579-4FCAB035D7D0}" destId="{C1DA3676-0503-49EC-84DF-0840E579CFEF}" srcOrd="1" destOrd="0" parTransId="{E91B2509-2172-40BF-92BF-95C71C842B9D}" sibTransId="{249178E8-CF68-4256-8FB4-C392210D1F0F}"/>
+    <dgm:cxn modelId="{D5E8E472-60FB-435C-B4CD-89210B28C73E}" type="presOf" srcId="{F5DB1430-E849-4A67-BCD3-028245B3E3AF}" destId="{9C9D2984-BB26-459C-A377-46B76EC7C1DE}" srcOrd="1" destOrd="0" presId="urn:microsoft.com/office/officeart/2005/8/layout/orgChart1"/>
     <dgm:cxn modelId="{1DE58273-423C-4229-8419-B58F7186758D}" type="presOf" srcId="{F92BA4C8-D8E7-4F76-9AE8-619682ED5A87}" destId="{36F9C691-4B50-4159-9F42-B35EF32A6B44}" srcOrd="0" destOrd="0" presId="urn:microsoft.com/office/officeart/2005/8/layout/orgChart1"/>
     <dgm:cxn modelId="{A0CB5C58-44FD-4B28-8DA0-AC4381DFBDCD}" type="presOf" srcId="{4A4E3E50-38C2-4C3C-AE96-953BA26A11C9}" destId="{B7B9E35F-3141-4501-8C8E-ECDBA7C3D699}" srcOrd="0" destOrd="0" presId="urn:microsoft.com/office/officeart/2005/8/layout/orgChart1"/>
     <dgm:cxn modelId="{67EF6583-DA13-4DCD-B2C7-E01EC5ABDE4A}" srcId="{EC376E4E-E648-41DA-86DB-8DA8BA5FAEC7}" destId="{12B359AD-F8D0-452E-9FE6-4E1434D70F15}" srcOrd="0" destOrd="0" parTransId="{F38279A6-DA67-4CAC-9D98-9FD4DBAA81BE}" sibTransId="{718721CD-C249-4EFA-880F-8D85A96569A0}"/>
     <dgm:cxn modelId="{B6C0118D-A2B4-48B2-9D92-51426B77C601}" type="presOf" srcId="{F5961BDC-783E-4C07-BC92-9011F5BBD285}" destId="{FC040049-51F5-41BD-8A19-8EF975D2FEC2}" srcOrd="0" destOrd="0" presId="urn:microsoft.com/office/officeart/2005/8/layout/orgChart1"/>
-    <dgm:cxn modelId="{909F9790-969F-4EBC-B8F3-0D35ACBC0D5C}" srcId="{B11103E8-CD81-40BE-B579-4FCAB035D7D0}" destId="{4DE9C598-B23B-4383-915B-55E3A905EC09}" srcOrd="1" destOrd="0" parTransId="{8F3C6AC4-A53B-4B83-A481-13534CEBBE7D}" sibTransId="{F02FEB7E-1FF2-4F4C-AAA3-981FB56FC271}"/>
+    <dgm:cxn modelId="{909F9790-969F-4EBC-B8F3-0D35ACBC0D5C}" srcId="{B11103E8-CD81-40BE-B579-4FCAB035D7D0}" destId="{4DE9C598-B23B-4383-915B-55E3A905EC09}" srcOrd="2" destOrd="0" parTransId="{8F3C6AC4-A53B-4B83-A481-13534CEBBE7D}" sibTransId="{F02FEB7E-1FF2-4F4C-AAA3-981FB56FC271}"/>
     <dgm:cxn modelId="{907E7297-C1DA-4B69-BFF9-98329E5D3995}" type="presOf" srcId="{C1DA3676-0503-49EC-84DF-0840E579CFEF}" destId="{CB2F9E2B-60EC-401F-A7AE-483C76BC0EC4}" srcOrd="0" destOrd="0" presId="urn:microsoft.com/office/officeart/2005/8/layout/orgChart1"/>
     <dgm:cxn modelId="{E964689A-B3A3-4628-A308-30C81D211922}" type="presOf" srcId="{EC376E4E-E648-41DA-86DB-8DA8BA5FAEC7}" destId="{1FB3CEF6-77BB-4E6C-A2DD-4A3F7EC690C5}" srcOrd="0" destOrd="0" presId="urn:microsoft.com/office/officeart/2005/8/layout/orgChart1"/>
     <dgm:cxn modelId="{E02A83A2-B2E9-46F4-AF77-D471A4A0459A}" type="presOf" srcId="{4DE9C598-B23B-4383-915B-55E3A905EC09}" destId="{EAF98DA0-A25D-4689-9A35-0FB204C4D414}" srcOrd="1" destOrd="0" presId="urn:microsoft.com/office/officeart/2005/8/layout/orgChart1"/>
     <dgm:cxn modelId="{169577A9-2FA2-4D9B-B2B3-3293E28A18B5}" srcId="{12B359AD-F8D0-452E-9FE6-4E1434D70F15}" destId="{B11103E8-CD81-40BE-B579-4FCAB035D7D0}" srcOrd="0" destOrd="0" parTransId="{8EAAB40C-C46B-4763-9B19-143C18560BB8}" sibTransId="{066CED9E-DDC2-4B20-81DF-84AEF02375EA}"/>
-    <dgm:cxn modelId="{DB621BB4-1721-46CA-9C90-60643B419F26}" srcId="{B11103E8-CD81-40BE-B579-4FCAB035D7D0}" destId="{1763EED3-26D7-4B0E-B022-1B72A013A70C}" srcOrd="3" destOrd="0" parTransId="{F5961BDC-783E-4C07-BC92-9011F5BBD285}" sibTransId="{8B6F1219-C0C9-42EE-A202-422710B569C5}"/>
+    <dgm:cxn modelId="{DB621BB4-1721-46CA-9C90-60643B419F26}" srcId="{B11103E8-CD81-40BE-B579-4FCAB035D7D0}" destId="{1763EED3-26D7-4B0E-B022-1B72A013A70C}" srcOrd="4" destOrd="0" parTransId="{F5961BDC-783E-4C07-BC92-9011F5BBD285}" sibTransId="{8B6F1219-C0C9-42EE-A202-422710B569C5}"/>
+    <dgm:cxn modelId="{E0389BBD-FCE5-4819-9866-02E43026D3E1}" type="presOf" srcId="{81654E97-7E1A-468A-A4BE-C1A2E807DAF9}" destId="{7AA25F1C-51B2-49BF-8201-0652CE559B21}" srcOrd="0" destOrd="0" presId="urn:microsoft.com/office/officeart/2005/8/layout/orgChart1"/>
     <dgm:cxn modelId="{8A53A4C3-6031-4734-B3C1-7BBE70A6195C}" type="presOf" srcId="{A7E99E54-94B2-4D9C-82A3-E8D7CBB0FC6A}" destId="{54DB9B34-E7B2-41DC-B13D-F457F995CDFC}" srcOrd="0" destOrd="0" presId="urn:microsoft.com/office/officeart/2005/8/layout/orgChart1"/>
     <dgm:cxn modelId="{2D5715C6-4B16-4AF8-A0C8-2697B477409C}" type="presOf" srcId="{4A4E3E50-38C2-4C3C-AE96-953BA26A11C9}" destId="{7914E8B1-80D5-4A71-9775-0A174E4B78BC}" srcOrd="1" destOrd="0" presId="urn:microsoft.com/office/officeart/2005/8/layout/orgChart1"/>
     <dgm:cxn modelId="{756917CD-3304-41C1-83A7-9955CB260BC6}" type="presOf" srcId="{8EAAB40C-C46B-4763-9B19-143C18560BB8}" destId="{4F485F08-228B-4F23-9920-ED58748DD612}" srcOrd="0" destOrd="0" presId="urn:microsoft.com/office/officeart/2005/8/layout/orgChart1"/>
     <dgm:cxn modelId="{931F97D1-3692-4A52-A385-70D3E0FA82DE}" type="presOf" srcId="{E91B2509-2172-40BF-92BF-95C71C842B9D}" destId="{CA698B96-2FDD-477F-82FD-3398AEE00C53}" srcOrd="0" destOrd="0" presId="urn:microsoft.com/office/officeart/2005/8/layout/orgChart1"/>
-    <dgm:cxn modelId="{F1DC65E4-3406-49EF-8BD7-3B43D972B953}" srcId="{B11103E8-CD81-40BE-B579-4FCAB035D7D0}" destId="{4A4E3E50-38C2-4C3C-AE96-953BA26A11C9}" srcOrd="2" destOrd="0" parTransId="{F92BA4C8-D8E7-4F76-9AE8-619682ED5A87}" sibTransId="{F4856804-261D-4CA9-AEA7-CB9CCF3B24D3}"/>
+    <dgm:cxn modelId="{F1DC65E4-3406-49EF-8BD7-3B43D972B953}" srcId="{B11103E8-CD81-40BE-B579-4FCAB035D7D0}" destId="{4A4E3E50-38C2-4C3C-AE96-953BA26A11C9}" srcOrd="3" destOrd="0" parTransId="{F92BA4C8-D8E7-4F76-9AE8-619682ED5A87}" sibTransId="{F4856804-261D-4CA9-AEA7-CB9CCF3B24D3}"/>
     <dgm:cxn modelId="{9C4E09F7-60C7-4A17-883C-565801E26701}" srcId="{4DE9C598-B23B-4383-915B-55E3A905EC09}" destId="{A7E99E54-94B2-4D9C-82A3-E8D7CBB0FC6A}" srcOrd="0" destOrd="0" parTransId="{A7BDC5C7-F208-4337-83DA-CEAB2AF8A6E8}" sibTransId="{E5ADC721-8733-4901-A13E-0A3C1A6D9EA5}"/>
     <dgm:cxn modelId="{ECEF2BFB-C19C-4668-B0B2-A06335D9AE4F}" type="presOf" srcId="{B11103E8-CD81-40BE-B579-4FCAB035D7D0}" destId="{F58A63D3-C78F-4550-80E7-D69343F847C2}" srcOrd="0" destOrd="0" presId="urn:microsoft.com/office/officeart/2005/8/layout/orgChart1"/>
     <dgm:cxn modelId="{AE87FEFC-59F2-4DF6-8D52-F70F37326785}" type="presOf" srcId="{A7E99E54-94B2-4D9C-82A3-E8D7CBB0FC6A}" destId="{89957609-8B97-47C3-AEE9-6DD7393B124C}" srcOrd="1" destOrd="0" presId="urn:microsoft.com/office/officeart/2005/8/layout/orgChart1"/>
@@ -4465,15 +4554,22 @@
     <dgm:cxn modelId="{3C433F5B-9E7D-4335-8F8B-A2C85A305CB9}" type="presParOf" srcId="{9C640B7D-D67D-4B8E-A8C5-471568107335}" destId="{F58A63D3-C78F-4550-80E7-D69343F847C2}" srcOrd="0" destOrd="0" presId="urn:microsoft.com/office/officeart/2005/8/layout/orgChart1"/>
     <dgm:cxn modelId="{15575AAB-B9B1-477F-8E61-DAD43D9A106E}" type="presParOf" srcId="{9C640B7D-D67D-4B8E-A8C5-471568107335}" destId="{4E2D0EDB-C4D6-450E-83EA-96CF439066D6}" srcOrd="1" destOrd="0" presId="urn:microsoft.com/office/officeart/2005/8/layout/orgChart1"/>
     <dgm:cxn modelId="{7CEA1FA0-74E2-4F02-B0BC-131CCB9A333B}" type="presParOf" srcId="{57E17CB4-9CE1-4EFF-9213-9E6AA8A73D8C}" destId="{DF366C04-0EC9-45EA-9E59-CA10E9616C42}" srcOrd="1" destOrd="0" presId="urn:microsoft.com/office/officeart/2005/8/layout/orgChart1"/>
-    <dgm:cxn modelId="{47795B8E-899B-4008-AFF6-5AB37A7C4623}" type="presParOf" srcId="{DF366C04-0EC9-45EA-9E59-CA10E9616C42}" destId="{CA698B96-2FDD-477F-82FD-3398AEE00C53}" srcOrd="0" destOrd="0" presId="urn:microsoft.com/office/officeart/2005/8/layout/orgChart1"/>
-    <dgm:cxn modelId="{38A4F6E3-6062-49FF-8CE3-A36E981CB9B6}" type="presParOf" srcId="{DF366C04-0EC9-45EA-9E59-CA10E9616C42}" destId="{473DEF0C-42E2-4A50-856D-1F839CCF32C4}" srcOrd="1" destOrd="0" presId="urn:microsoft.com/office/officeart/2005/8/layout/orgChart1"/>
+    <dgm:cxn modelId="{D6E8D670-259B-42A4-BCE6-53578731C465}" type="presParOf" srcId="{DF366C04-0EC9-45EA-9E59-CA10E9616C42}" destId="{7AA25F1C-51B2-49BF-8201-0652CE559B21}" srcOrd="0" destOrd="0" presId="urn:microsoft.com/office/officeart/2005/8/layout/orgChart1"/>
+    <dgm:cxn modelId="{0A28B2D8-121D-43A5-BCED-02D1126D8ECD}" type="presParOf" srcId="{DF366C04-0EC9-45EA-9E59-CA10E9616C42}" destId="{894F9E9B-7055-4E66-AF59-07013E419A5C}" srcOrd="1" destOrd="0" presId="urn:microsoft.com/office/officeart/2005/8/layout/orgChart1"/>
+    <dgm:cxn modelId="{0EFC4EE9-B180-45BA-9C6D-520C4FDA94BD}" type="presParOf" srcId="{894F9E9B-7055-4E66-AF59-07013E419A5C}" destId="{64A91C8C-0772-45D6-AD00-72AAAD91D341}" srcOrd="0" destOrd="0" presId="urn:microsoft.com/office/officeart/2005/8/layout/orgChart1"/>
+    <dgm:cxn modelId="{36C12D48-0F64-40C4-ACFE-4CAC2A20BCE4}" type="presParOf" srcId="{64A91C8C-0772-45D6-AD00-72AAAD91D341}" destId="{D9BAE0A2-1877-42BD-82CF-B647EA24D564}" srcOrd="0" destOrd="0" presId="urn:microsoft.com/office/officeart/2005/8/layout/orgChart1"/>
+    <dgm:cxn modelId="{8CF7389B-F0D8-4D38-AC82-EB15337FFAE6}" type="presParOf" srcId="{64A91C8C-0772-45D6-AD00-72AAAD91D341}" destId="{9C9D2984-BB26-459C-A377-46B76EC7C1DE}" srcOrd="1" destOrd="0" presId="urn:microsoft.com/office/officeart/2005/8/layout/orgChart1"/>
+    <dgm:cxn modelId="{9329315E-7D0F-412B-AA0D-E37B06E9D363}" type="presParOf" srcId="{894F9E9B-7055-4E66-AF59-07013E419A5C}" destId="{4F0C3D8D-71C6-41BD-B747-4B9907999B97}" srcOrd="1" destOrd="0" presId="urn:microsoft.com/office/officeart/2005/8/layout/orgChart1"/>
+    <dgm:cxn modelId="{D06D888F-344F-4421-B56E-23D74ED2E484}" type="presParOf" srcId="{894F9E9B-7055-4E66-AF59-07013E419A5C}" destId="{D22ADF25-2909-4CC0-991A-22958AA2A3E1}" srcOrd="2" destOrd="0" presId="urn:microsoft.com/office/officeart/2005/8/layout/orgChart1"/>
+    <dgm:cxn modelId="{47795B8E-899B-4008-AFF6-5AB37A7C4623}" type="presParOf" srcId="{DF366C04-0EC9-45EA-9E59-CA10E9616C42}" destId="{CA698B96-2FDD-477F-82FD-3398AEE00C53}" srcOrd="2" destOrd="0" presId="urn:microsoft.com/office/officeart/2005/8/layout/orgChart1"/>
+    <dgm:cxn modelId="{38A4F6E3-6062-49FF-8CE3-A36E981CB9B6}" type="presParOf" srcId="{DF366C04-0EC9-45EA-9E59-CA10E9616C42}" destId="{473DEF0C-42E2-4A50-856D-1F839CCF32C4}" srcOrd="3" destOrd="0" presId="urn:microsoft.com/office/officeart/2005/8/layout/orgChart1"/>
     <dgm:cxn modelId="{B0AAA5BD-323E-40F8-88D6-04DCC54A5DBF}" type="presParOf" srcId="{473DEF0C-42E2-4A50-856D-1F839CCF32C4}" destId="{4624B90A-4132-4200-8AA0-82A7A6868243}" srcOrd="0" destOrd="0" presId="urn:microsoft.com/office/officeart/2005/8/layout/orgChart1"/>
     <dgm:cxn modelId="{F8361AC3-010C-4552-88A4-09040E8F894E}" type="presParOf" srcId="{4624B90A-4132-4200-8AA0-82A7A6868243}" destId="{CB2F9E2B-60EC-401F-A7AE-483C76BC0EC4}" srcOrd="0" destOrd="0" presId="urn:microsoft.com/office/officeart/2005/8/layout/orgChart1"/>
     <dgm:cxn modelId="{86B63F77-1C87-4122-ADEE-F18936B8014A}" type="presParOf" srcId="{4624B90A-4132-4200-8AA0-82A7A6868243}" destId="{87894099-6401-42BD-9593-FCCC7AE42C49}" srcOrd="1" destOrd="0" presId="urn:microsoft.com/office/officeart/2005/8/layout/orgChart1"/>
     <dgm:cxn modelId="{34DA4E50-A3AA-4591-8293-F703820B1B36}" type="presParOf" srcId="{473DEF0C-42E2-4A50-856D-1F839CCF32C4}" destId="{5AB908CA-153D-4CCC-9357-A7CB91FB315D}" srcOrd="1" destOrd="0" presId="urn:microsoft.com/office/officeart/2005/8/layout/orgChart1"/>
     <dgm:cxn modelId="{07B5A45B-F1F0-4663-B634-6597C7788CF8}" type="presParOf" srcId="{473DEF0C-42E2-4A50-856D-1F839CCF32C4}" destId="{887CC9D3-38FE-45D6-B05D-3A8EDEAEB30E}" srcOrd="2" destOrd="0" presId="urn:microsoft.com/office/officeart/2005/8/layout/orgChart1"/>
-    <dgm:cxn modelId="{5F703066-DCE7-4FCC-9C32-45990E4C7284}" type="presParOf" srcId="{DF366C04-0EC9-45EA-9E59-CA10E9616C42}" destId="{28A959D3-8E8F-4C33-8E58-743CD226A445}" srcOrd="2" destOrd="0" presId="urn:microsoft.com/office/officeart/2005/8/layout/orgChart1"/>
-    <dgm:cxn modelId="{ADFEA9A2-0CD0-4DF8-9AF5-3CC0055F91EE}" type="presParOf" srcId="{DF366C04-0EC9-45EA-9E59-CA10E9616C42}" destId="{9942EE3E-75B3-40C5-9515-14C899144BE6}" srcOrd="3" destOrd="0" presId="urn:microsoft.com/office/officeart/2005/8/layout/orgChart1"/>
+    <dgm:cxn modelId="{5F703066-DCE7-4FCC-9C32-45990E4C7284}" type="presParOf" srcId="{DF366C04-0EC9-45EA-9E59-CA10E9616C42}" destId="{28A959D3-8E8F-4C33-8E58-743CD226A445}" srcOrd="4" destOrd="0" presId="urn:microsoft.com/office/officeart/2005/8/layout/orgChart1"/>
+    <dgm:cxn modelId="{ADFEA9A2-0CD0-4DF8-9AF5-3CC0055F91EE}" type="presParOf" srcId="{DF366C04-0EC9-45EA-9E59-CA10E9616C42}" destId="{9942EE3E-75B3-40C5-9515-14C899144BE6}" srcOrd="5" destOrd="0" presId="urn:microsoft.com/office/officeart/2005/8/layout/orgChart1"/>
     <dgm:cxn modelId="{A0AEDCB5-EF81-47B6-9DD6-DCFB8C3BA833}" type="presParOf" srcId="{9942EE3E-75B3-40C5-9515-14C899144BE6}" destId="{95254029-3A83-4A07-BCC7-CAD6C2DADFEC}" srcOrd="0" destOrd="0" presId="urn:microsoft.com/office/officeart/2005/8/layout/orgChart1"/>
     <dgm:cxn modelId="{463CEBDF-5752-4235-8F56-BDF69DE02976}" type="presParOf" srcId="{95254029-3A83-4A07-BCC7-CAD6C2DADFEC}" destId="{227A2695-8EBE-4628-A9EE-801697A0D3C2}" srcOrd="0" destOrd="0" presId="urn:microsoft.com/office/officeart/2005/8/layout/orgChart1"/>
     <dgm:cxn modelId="{01F9196F-E620-4D41-8079-413E3E478A4F}" type="presParOf" srcId="{95254029-3A83-4A07-BCC7-CAD6C2DADFEC}" destId="{EAF98DA0-A25D-4689-9A35-0FB204C4D414}" srcOrd="1" destOrd="0" presId="urn:microsoft.com/office/officeart/2005/8/layout/orgChart1"/>
@@ -4486,8 +4582,8 @@
     <dgm:cxn modelId="{95772096-7DBA-4E8C-91C6-4F8A0A64416C}" type="presParOf" srcId="{1ED732C6-4FB8-4A1E-BC80-51448E89ECFB}" destId="{89957609-8B97-47C3-AEE9-6DD7393B124C}" srcOrd="1" destOrd="0" presId="urn:microsoft.com/office/officeart/2005/8/layout/orgChart1"/>
     <dgm:cxn modelId="{2739B281-BD78-4410-BADC-C96574C56CCB}" type="presParOf" srcId="{1A754903-320B-4D58-8D1D-B1046E7A0C09}" destId="{98A76313-0002-4F08-8C2A-2C9E7CF86A01}" srcOrd="1" destOrd="0" presId="urn:microsoft.com/office/officeart/2005/8/layout/orgChart1"/>
     <dgm:cxn modelId="{1040F5D0-2127-428D-B706-9E5757FFC25A}" type="presParOf" srcId="{1A754903-320B-4D58-8D1D-B1046E7A0C09}" destId="{B66ED59C-56CC-4674-9E98-64456A927D23}" srcOrd="2" destOrd="0" presId="urn:microsoft.com/office/officeart/2005/8/layout/orgChart1"/>
-    <dgm:cxn modelId="{9198E430-4E3B-4BE6-B09D-89FA0286C30C}" type="presParOf" srcId="{DF366C04-0EC9-45EA-9E59-CA10E9616C42}" destId="{36F9C691-4B50-4159-9F42-B35EF32A6B44}" srcOrd="4" destOrd="0" presId="urn:microsoft.com/office/officeart/2005/8/layout/orgChart1"/>
-    <dgm:cxn modelId="{2B36E909-34B6-4C95-8761-53C7FC7080B9}" type="presParOf" srcId="{DF366C04-0EC9-45EA-9E59-CA10E9616C42}" destId="{312C63B7-2356-4591-A8D8-CB4355394DE3}" srcOrd="5" destOrd="0" presId="urn:microsoft.com/office/officeart/2005/8/layout/orgChart1"/>
+    <dgm:cxn modelId="{9198E430-4E3B-4BE6-B09D-89FA0286C30C}" type="presParOf" srcId="{DF366C04-0EC9-45EA-9E59-CA10E9616C42}" destId="{36F9C691-4B50-4159-9F42-B35EF32A6B44}" srcOrd="6" destOrd="0" presId="urn:microsoft.com/office/officeart/2005/8/layout/orgChart1"/>
+    <dgm:cxn modelId="{2B36E909-34B6-4C95-8761-53C7FC7080B9}" type="presParOf" srcId="{DF366C04-0EC9-45EA-9E59-CA10E9616C42}" destId="{312C63B7-2356-4591-A8D8-CB4355394DE3}" srcOrd="7" destOrd="0" presId="urn:microsoft.com/office/officeart/2005/8/layout/orgChart1"/>
     <dgm:cxn modelId="{72D56477-E19B-4C56-8DCA-ABF4A3C334B7}" type="presParOf" srcId="{312C63B7-2356-4591-A8D8-CB4355394DE3}" destId="{980CD6A4-C2BD-46F1-9817-29D82D14EAD8}" srcOrd="0" destOrd="0" presId="urn:microsoft.com/office/officeart/2005/8/layout/orgChart1"/>
     <dgm:cxn modelId="{A760D4C3-30AD-46E6-BE5F-1C179C8D0BE2}" type="presParOf" srcId="{980CD6A4-C2BD-46F1-9817-29D82D14EAD8}" destId="{B7B9E35F-3141-4501-8C8E-ECDBA7C3D699}" srcOrd="0" destOrd="0" presId="urn:microsoft.com/office/officeart/2005/8/layout/orgChart1"/>
     <dgm:cxn modelId="{0B1DAF5E-956D-45F9-ABE7-38276EE83E97}" type="presParOf" srcId="{980CD6A4-C2BD-46F1-9817-29D82D14EAD8}" destId="{7914E8B1-80D5-4A71-9775-0A174E4B78BC}" srcOrd="1" destOrd="0" presId="urn:microsoft.com/office/officeart/2005/8/layout/orgChart1"/>
@@ -4786,6 +4882,43 @@
         </a:p>
       </dgm:t>
     </dgm:pt>
+    <dgm:pt modelId="{B57B53FC-BA80-43F5-8BFD-BFDA766C6A11}">
+      <dgm:prSet/>
+      <dgm:spPr/>
+      <dgm:t>
+        <a:bodyPr/>
+        <a:lstStyle/>
+        <a:p>
+          <a:r>
+            <a:rPr lang="en-US" dirty="0"/>
+            <a:t>batch</a:t>
+          </a:r>
+          <a:endParaRPr lang="fr-CA" dirty="0"/>
+        </a:p>
+      </dgm:t>
+    </dgm:pt>
+    <dgm:pt modelId="{748A62F1-9E1F-4E59-9C99-6F74DF7342F2}" type="parTrans" cxnId="{F9290C9F-4651-40A6-81AD-559983C15917}">
+      <dgm:prSet/>
+      <dgm:spPr/>
+      <dgm:t>
+        <a:bodyPr/>
+        <a:lstStyle/>
+        <a:p>
+          <a:endParaRPr lang="fr-CA"/>
+        </a:p>
+      </dgm:t>
+    </dgm:pt>
+    <dgm:pt modelId="{35AE9356-62C2-4EC8-8CC1-A8FEBFEA810C}" type="sibTrans" cxnId="{F9290C9F-4651-40A6-81AD-559983C15917}">
+      <dgm:prSet/>
+      <dgm:spPr/>
+      <dgm:t>
+        <a:bodyPr/>
+        <a:lstStyle/>
+        <a:p>
+          <a:endParaRPr lang="fr-CA"/>
+        </a:p>
+      </dgm:t>
+    </dgm:pt>
     <dgm:pt modelId="{1FB3CEF6-77BB-4E6C-A2DD-4A3F7EC690C5}" type="pres">
       <dgm:prSet presAssocID="{EC376E4E-E648-41DA-86DB-8DA8BA5FAEC7}" presName="hierChild1" presStyleCnt="0">
         <dgm:presLayoutVars>
@@ -4859,8 +4992,44 @@
       <dgm:prSet presAssocID="{B11103E8-CD81-40BE-B579-4FCAB035D7D0}" presName="hierChild4" presStyleCnt="0"/>
       <dgm:spPr/>
     </dgm:pt>
+    <dgm:pt modelId="{0005035F-079F-4B75-ABD6-B002A5196E47}" type="pres">
+      <dgm:prSet presAssocID="{748A62F1-9E1F-4E59-9C99-6F74DF7342F2}" presName="Name37" presStyleLbl="parChTrans1D3" presStyleIdx="0" presStyleCnt="5"/>
+      <dgm:spPr/>
+    </dgm:pt>
+    <dgm:pt modelId="{55AB1897-0390-4635-936C-27B14BC5B00B}" type="pres">
+      <dgm:prSet presAssocID="{B57B53FC-BA80-43F5-8BFD-BFDA766C6A11}" presName="hierRoot2" presStyleCnt="0">
+        <dgm:presLayoutVars>
+          <dgm:hierBranch val="init"/>
+        </dgm:presLayoutVars>
+      </dgm:prSet>
+      <dgm:spPr/>
+    </dgm:pt>
+    <dgm:pt modelId="{8420F2E2-BE5B-447D-9336-1030D00BA86A}" type="pres">
+      <dgm:prSet presAssocID="{B57B53FC-BA80-43F5-8BFD-BFDA766C6A11}" presName="rootComposite" presStyleCnt="0"/>
+      <dgm:spPr/>
+    </dgm:pt>
+    <dgm:pt modelId="{274844C8-7C70-4042-B00B-72F04A850BBB}" type="pres">
+      <dgm:prSet presAssocID="{B57B53FC-BA80-43F5-8BFD-BFDA766C6A11}" presName="rootText" presStyleLbl="node3" presStyleIdx="0" presStyleCnt="4">
+        <dgm:presLayoutVars>
+          <dgm:chPref val="3"/>
+        </dgm:presLayoutVars>
+      </dgm:prSet>
+      <dgm:spPr/>
+    </dgm:pt>
+    <dgm:pt modelId="{C6295594-85CF-4A7C-A987-898CD9118F8F}" type="pres">
+      <dgm:prSet presAssocID="{B57B53FC-BA80-43F5-8BFD-BFDA766C6A11}" presName="rootConnector" presStyleLbl="node3" presStyleIdx="0" presStyleCnt="4"/>
+      <dgm:spPr/>
+    </dgm:pt>
+    <dgm:pt modelId="{41BCDDF8-A21E-4677-B9B6-40659F8F9DA5}" type="pres">
+      <dgm:prSet presAssocID="{B57B53FC-BA80-43F5-8BFD-BFDA766C6A11}" presName="hierChild4" presStyleCnt="0"/>
+      <dgm:spPr/>
+    </dgm:pt>
+    <dgm:pt modelId="{553F3CBA-41EA-4D55-87A1-A861E50F3AD8}" type="pres">
+      <dgm:prSet presAssocID="{B57B53FC-BA80-43F5-8BFD-BFDA766C6A11}" presName="hierChild5" presStyleCnt="0"/>
+      <dgm:spPr/>
+    </dgm:pt>
     <dgm:pt modelId="{CA698B96-2FDD-477F-82FD-3398AEE00C53}" type="pres">
-      <dgm:prSet presAssocID="{E91B2509-2172-40BF-92BF-95C71C842B9D}" presName="Name37" presStyleLbl="parChTrans1D3" presStyleIdx="0" presStyleCnt="4"/>
+      <dgm:prSet presAssocID="{E91B2509-2172-40BF-92BF-95C71C842B9D}" presName="Name37" presStyleLbl="parChTrans1D3" presStyleIdx="1" presStyleCnt="5"/>
       <dgm:spPr/>
     </dgm:pt>
     <dgm:pt modelId="{473DEF0C-42E2-4A50-856D-1F839CCF32C4}" type="pres">
@@ -4876,7 +5045,7 @@
       <dgm:spPr/>
     </dgm:pt>
     <dgm:pt modelId="{CB2F9E2B-60EC-401F-A7AE-483C76BC0EC4}" type="pres">
-      <dgm:prSet presAssocID="{C1DA3676-0503-49EC-84DF-0840E579CFEF}" presName="rootText" presStyleLbl="node3" presStyleIdx="0" presStyleCnt="3">
+      <dgm:prSet presAssocID="{C1DA3676-0503-49EC-84DF-0840E579CFEF}" presName="rootText" presStyleLbl="node3" presStyleIdx="1" presStyleCnt="4">
         <dgm:presLayoutVars>
           <dgm:chPref val="3"/>
         </dgm:presLayoutVars>
@@ -4884,7 +5053,7 @@
       <dgm:spPr/>
     </dgm:pt>
     <dgm:pt modelId="{87894099-6401-42BD-9593-FCCC7AE42C49}" type="pres">
-      <dgm:prSet presAssocID="{C1DA3676-0503-49EC-84DF-0840E579CFEF}" presName="rootConnector" presStyleLbl="node3" presStyleIdx="0" presStyleCnt="3"/>
+      <dgm:prSet presAssocID="{C1DA3676-0503-49EC-84DF-0840E579CFEF}" presName="rootConnector" presStyleLbl="node3" presStyleIdx="1" presStyleCnt="4"/>
       <dgm:spPr/>
     </dgm:pt>
     <dgm:pt modelId="{5AB908CA-153D-4CCC-9357-A7CB91FB315D}" type="pres">
@@ -4896,7 +5065,7 @@
       <dgm:spPr/>
     </dgm:pt>
     <dgm:pt modelId="{28A959D3-8E8F-4C33-8E58-743CD226A445}" type="pres">
-      <dgm:prSet presAssocID="{8F3C6AC4-A53B-4B83-A481-13534CEBBE7D}" presName="Name37" presStyleLbl="parChTrans1D3" presStyleIdx="1" presStyleCnt="4"/>
+      <dgm:prSet presAssocID="{8F3C6AC4-A53B-4B83-A481-13534CEBBE7D}" presName="Name37" presStyleLbl="parChTrans1D3" presStyleIdx="2" presStyleCnt="5"/>
       <dgm:spPr/>
     </dgm:pt>
     <dgm:pt modelId="{9942EE3E-75B3-40C5-9515-14C899144BE6}" type="pres">
@@ -4912,7 +5081,7 @@
       <dgm:spPr/>
     </dgm:pt>
     <dgm:pt modelId="{227A2695-8EBE-4628-A9EE-801697A0D3C2}" type="pres">
-      <dgm:prSet presAssocID="{4DE9C598-B23B-4383-915B-55E3A905EC09}" presName="rootText" presStyleLbl="node3" presStyleIdx="1" presStyleCnt="3">
+      <dgm:prSet presAssocID="{4DE9C598-B23B-4383-915B-55E3A905EC09}" presName="rootText" presStyleLbl="node3" presStyleIdx="2" presStyleCnt="4">
         <dgm:presLayoutVars>
           <dgm:chPref val="3"/>
         </dgm:presLayoutVars>
@@ -4920,7 +5089,7 @@
       <dgm:spPr/>
     </dgm:pt>
     <dgm:pt modelId="{EAF98DA0-A25D-4689-9A35-0FB204C4D414}" type="pres">
-      <dgm:prSet presAssocID="{4DE9C598-B23B-4383-915B-55E3A905EC09}" presName="rootConnector" presStyleLbl="node3" presStyleIdx="1" presStyleCnt="3"/>
+      <dgm:prSet presAssocID="{4DE9C598-B23B-4383-915B-55E3A905EC09}" presName="rootConnector" presStyleLbl="node3" presStyleIdx="2" presStyleCnt="4"/>
       <dgm:spPr/>
     </dgm:pt>
     <dgm:pt modelId="{B1130AF9-6FE0-4F08-9475-22188116C08D}" type="pres">
@@ -4968,7 +5137,7 @@
       <dgm:spPr/>
     </dgm:pt>
     <dgm:pt modelId="{36F9C691-4B50-4159-9F42-B35EF32A6B44}" type="pres">
-      <dgm:prSet presAssocID="{F92BA4C8-D8E7-4F76-9AE8-619682ED5A87}" presName="Name37" presStyleLbl="parChTrans1D3" presStyleIdx="2" presStyleCnt="4"/>
+      <dgm:prSet presAssocID="{F92BA4C8-D8E7-4F76-9AE8-619682ED5A87}" presName="Name37" presStyleLbl="parChTrans1D3" presStyleIdx="3" presStyleCnt="5"/>
       <dgm:spPr/>
     </dgm:pt>
     <dgm:pt modelId="{312C63B7-2356-4591-A8D8-CB4355394DE3}" type="pres">
@@ -4984,7 +5153,7 @@
       <dgm:spPr/>
     </dgm:pt>
     <dgm:pt modelId="{B7B9E35F-3141-4501-8C8E-ECDBA7C3D699}" type="pres">
-      <dgm:prSet presAssocID="{4A4E3E50-38C2-4C3C-AE96-953BA26A11C9}" presName="rootText" presStyleLbl="node3" presStyleIdx="2" presStyleCnt="3">
+      <dgm:prSet presAssocID="{4A4E3E50-38C2-4C3C-AE96-953BA26A11C9}" presName="rootText" presStyleLbl="node3" presStyleIdx="3" presStyleCnt="4">
         <dgm:presLayoutVars>
           <dgm:chPref val="3"/>
         </dgm:presLayoutVars>
@@ -4992,7 +5161,7 @@
       <dgm:spPr/>
     </dgm:pt>
     <dgm:pt modelId="{7914E8B1-80D5-4A71-9775-0A174E4B78BC}" type="pres">
-      <dgm:prSet presAssocID="{4A4E3E50-38C2-4C3C-AE96-953BA26A11C9}" presName="rootConnector" presStyleLbl="node3" presStyleIdx="2" presStyleCnt="3"/>
+      <dgm:prSet presAssocID="{4A4E3E50-38C2-4C3C-AE96-953BA26A11C9}" presName="rootConnector" presStyleLbl="node3" presStyleIdx="3" presStyleCnt="4"/>
       <dgm:spPr/>
     </dgm:pt>
     <dgm:pt modelId="{9A41BE5B-11A2-49DE-9691-74C1D4BA987E}" type="pres">
@@ -5008,7 +5177,7 @@
       <dgm:spPr/>
     </dgm:pt>
     <dgm:pt modelId="{FC040049-51F5-41BD-8A19-8EF975D2FEC2}" type="pres">
-      <dgm:prSet presAssocID="{F5961BDC-783E-4C07-BC92-9011F5BBD285}" presName="Name111" presStyleLbl="parChTrans1D3" presStyleIdx="3" presStyleCnt="4"/>
+      <dgm:prSet presAssocID="{F5961BDC-783E-4C07-BC92-9011F5BBD285}" presName="Name111" presStyleLbl="parChTrans1D3" presStyleIdx="4" presStyleCnt="5"/>
       <dgm:spPr/>
     </dgm:pt>
     <dgm:pt modelId="{E0DB40E2-3599-401C-9680-5F546B644036}" type="pres">
@@ -5052,27 +5221,31 @@
     <dgm:cxn modelId="{EC288514-5953-4371-B614-67E2587A0632}" type="presOf" srcId="{8F3C6AC4-A53B-4B83-A481-13534CEBBE7D}" destId="{28A959D3-8E8F-4C33-8E58-743CD226A445}" srcOrd="0" destOrd="0" presId="urn:microsoft.com/office/officeart/2005/8/layout/orgChart1"/>
     <dgm:cxn modelId="{E6F4F318-A20C-4F11-A512-B27325BAF16D}" type="presOf" srcId="{1763EED3-26D7-4B0E-B022-1B72A013A70C}" destId="{CDB323ED-45A3-4822-B212-E9401A6C85A9}" srcOrd="1" destOrd="0" presId="urn:microsoft.com/office/officeart/2005/8/layout/orgChart1"/>
     <dgm:cxn modelId="{824EB01B-7989-4B5E-B04F-F041A0FBE0D9}" type="presOf" srcId="{12B359AD-F8D0-452E-9FE6-4E1434D70F15}" destId="{62E9EE9C-9C61-429A-9C9D-4DB0E88E4329}" srcOrd="1" destOrd="0" presId="urn:microsoft.com/office/officeart/2005/8/layout/orgChart1"/>
+    <dgm:cxn modelId="{07C4C81D-047D-49F7-A9C2-B8D6AD011FF5}" type="presOf" srcId="{B57B53FC-BA80-43F5-8BFD-BFDA766C6A11}" destId="{C6295594-85CF-4A7C-A987-898CD9118F8F}" srcOrd="1" destOrd="0" presId="urn:microsoft.com/office/officeart/2005/8/layout/orgChart1"/>
     <dgm:cxn modelId="{D4789563-D13B-4B08-BDCA-385B520F591F}" type="presOf" srcId="{A7BDC5C7-F208-4337-83DA-CEAB2AF8A6E8}" destId="{CA2AF3D0-A783-4F4A-AF16-39637F115AA6}" srcOrd="0" destOrd="0" presId="urn:microsoft.com/office/officeart/2005/8/layout/orgChart1"/>
     <dgm:cxn modelId="{B22BB143-FF24-4728-B175-EA1552D06D94}" type="presOf" srcId="{B11103E8-CD81-40BE-B579-4FCAB035D7D0}" destId="{4E2D0EDB-C4D6-450E-83EA-96CF439066D6}" srcOrd="1" destOrd="0" presId="urn:microsoft.com/office/officeart/2005/8/layout/orgChart1"/>
     <dgm:cxn modelId="{175ED643-4624-4279-9AC0-71B49AB06463}" type="presOf" srcId="{12B359AD-F8D0-452E-9FE6-4E1434D70F15}" destId="{92DD8E95-5792-4CAF-BBE2-B190055FFE9B}" srcOrd="0" destOrd="0" presId="urn:microsoft.com/office/officeart/2005/8/layout/orgChart1"/>
     <dgm:cxn modelId="{19586B45-307A-4F82-965B-3618C233D3C3}" type="presOf" srcId="{C1DA3676-0503-49EC-84DF-0840E579CFEF}" destId="{87894099-6401-42BD-9593-FCCC7AE42C49}" srcOrd="1" destOrd="0" presId="urn:microsoft.com/office/officeart/2005/8/layout/orgChart1"/>
     <dgm:cxn modelId="{198BD745-2D9F-4E83-921B-DBA00E038AA2}" type="presOf" srcId="{1763EED3-26D7-4B0E-B022-1B72A013A70C}" destId="{B7666E4B-FE3C-4B7F-ADE2-C772AB73DAAC}" srcOrd="0" destOrd="0" presId="urn:microsoft.com/office/officeart/2005/8/layout/orgChart1"/>
-    <dgm:cxn modelId="{56DEE571-1D10-4A28-9146-2F3255577C1A}" srcId="{B11103E8-CD81-40BE-B579-4FCAB035D7D0}" destId="{C1DA3676-0503-49EC-84DF-0840E579CFEF}" srcOrd="0" destOrd="0" parTransId="{E91B2509-2172-40BF-92BF-95C71C842B9D}" sibTransId="{249178E8-CF68-4256-8FB4-C392210D1F0F}"/>
+    <dgm:cxn modelId="{B3B7C34C-665A-4C62-9284-D4043D11C43C}" type="presOf" srcId="{B57B53FC-BA80-43F5-8BFD-BFDA766C6A11}" destId="{274844C8-7C70-4042-B00B-72F04A850BBB}" srcOrd="0" destOrd="0" presId="urn:microsoft.com/office/officeart/2005/8/layout/orgChart1"/>
+    <dgm:cxn modelId="{56DEE571-1D10-4A28-9146-2F3255577C1A}" srcId="{B11103E8-CD81-40BE-B579-4FCAB035D7D0}" destId="{C1DA3676-0503-49EC-84DF-0840E579CFEF}" srcOrd="1" destOrd="0" parTransId="{E91B2509-2172-40BF-92BF-95C71C842B9D}" sibTransId="{249178E8-CF68-4256-8FB4-C392210D1F0F}"/>
     <dgm:cxn modelId="{1DE58273-423C-4229-8419-B58F7186758D}" type="presOf" srcId="{F92BA4C8-D8E7-4F76-9AE8-619682ED5A87}" destId="{36F9C691-4B50-4159-9F42-B35EF32A6B44}" srcOrd="0" destOrd="0" presId="urn:microsoft.com/office/officeart/2005/8/layout/orgChart1"/>
     <dgm:cxn modelId="{A0CB5C58-44FD-4B28-8DA0-AC4381DFBDCD}" type="presOf" srcId="{4A4E3E50-38C2-4C3C-AE96-953BA26A11C9}" destId="{B7B9E35F-3141-4501-8C8E-ECDBA7C3D699}" srcOrd="0" destOrd="0" presId="urn:microsoft.com/office/officeart/2005/8/layout/orgChart1"/>
     <dgm:cxn modelId="{67EF6583-DA13-4DCD-B2C7-E01EC5ABDE4A}" srcId="{EC376E4E-E648-41DA-86DB-8DA8BA5FAEC7}" destId="{12B359AD-F8D0-452E-9FE6-4E1434D70F15}" srcOrd="0" destOrd="0" parTransId="{F38279A6-DA67-4CAC-9D98-9FD4DBAA81BE}" sibTransId="{718721CD-C249-4EFA-880F-8D85A96569A0}"/>
     <dgm:cxn modelId="{B6C0118D-A2B4-48B2-9D92-51426B77C601}" type="presOf" srcId="{F5961BDC-783E-4C07-BC92-9011F5BBD285}" destId="{FC040049-51F5-41BD-8A19-8EF975D2FEC2}" srcOrd="0" destOrd="0" presId="urn:microsoft.com/office/officeart/2005/8/layout/orgChart1"/>
-    <dgm:cxn modelId="{909F9790-969F-4EBC-B8F3-0D35ACBC0D5C}" srcId="{B11103E8-CD81-40BE-B579-4FCAB035D7D0}" destId="{4DE9C598-B23B-4383-915B-55E3A905EC09}" srcOrd="1" destOrd="0" parTransId="{8F3C6AC4-A53B-4B83-A481-13534CEBBE7D}" sibTransId="{F02FEB7E-1FF2-4F4C-AAA3-981FB56FC271}"/>
+    <dgm:cxn modelId="{909F9790-969F-4EBC-B8F3-0D35ACBC0D5C}" srcId="{B11103E8-CD81-40BE-B579-4FCAB035D7D0}" destId="{4DE9C598-B23B-4383-915B-55E3A905EC09}" srcOrd="2" destOrd="0" parTransId="{8F3C6AC4-A53B-4B83-A481-13534CEBBE7D}" sibTransId="{F02FEB7E-1FF2-4F4C-AAA3-981FB56FC271}"/>
     <dgm:cxn modelId="{907E7297-C1DA-4B69-BFF9-98329E5D3995}" type="presOf" srcId="{C1DA3676-0503-49EC-84DF-0840E579CFEF}" destId="{CB2F9E2B-60EC-401F-A7AE-483C76BC0EC4}" srcOrd="0" destOrd="0" presId="urn:microsoft.com/office/officeart/2005/8/layout/orgChart1"/>
     <dgm:cxn modelId="{E964689A-B3A3-4628-A308-30C81D211922}" type="presOf" srcId="{EC376E4E-E648-41DA-86DB-8DA8BA5FAEC7}" destId="{1FB3CEF6-77BB-4E6C-A2DD-4A3F7EC690C5}" srcOrd="0" destOrd="0" presId="urn:microsoft.com/office/officeart/2005/8/layout/orgChart1"/>
+    <dgm:cxn modelId="{9AB7DF9B-E530-4833-82D0-B8CABF142619}" type="presOf" srcId="{748A62F1-9E1F-4E59-9C99-6F74DF7342F2}" destId="{0005035F-079F-4B75-ABD6-B002A5196E47}" srcOrd="0" destOrd="0" presId="urn:microsoft.com/office/officeart/2005/8/layout/orgChart1"/>
+    <dgm:cxn modelId="{F9290C9F-4651-40A6-81AD-559983C15917}" srcId="{B11103E8-CD81-40BE-B579-4FCAB035D7D0}" destId="{B57B53FC-BA80-43F5-8BFD-BFDA766C6A11}" srcOrd="0" destOrd="0" parTransId="{748A62F1-9E1F-4E59-9C99-6F74DF7342F2}" sibTransId="{35AE9356-62C2-4EC8-8CC1-A8FEBFEA810C}"/>
     <dgm:cxn modelId="{E02A83A2-B2E9-46F4-AF77-D471A4A0459A}" type="presOf" srcId="{4DE9C598-B23B-4383-915B-55E3A905EC09}" destId="{EAF98DA0-A25D-4689-9A35-0FB204C4D414}" srcOrd="1" destOrd="0" presId="urn:microsoft.com/office/officeart/2005/8/layout/orgChart1"/>
     <dgm:cxn modelId="{169577A9-2FA2-4D9B-B2B3-3293E28A18B5}" srcId="{12B359AD-F8D0-452E-9FE6-4E1434D70F15}" destId="{B11103E8-CD81-40BE-B579-4FCAB035D7D0}" srcOrd="0" destOrd="0" parTransId="{8EAAB40C-C46B-4763-9B19-143C18560BB8}" sibTransId="{066CED9E-DDC2-4B20-81DF-84AEF02375EA}"/>
-    <dgm:cxn modelId="{DB621BB4-1721-46CA-9C90-60643B419F26}" srcId="{B11103E8-CD81-40BE-B579-4FCAB035D7D0}" destId="{1763EED3-26D7-4B0E-B022-1B72A013A70C}" srcOrd="3" destOrd="0" parTransId="{F5961BDC-783E-4C07-BC92-9011F5BBD285}" sibTransId="{8B6F1219-C0C9-42EE-A202-422710B569C5}"/>
+    <dgm:cxn modelId="{DB621BB4-1721-46CA-9C90-60643B419F26}" srcId="{B11103E8-CD81-40BE-B579-4FCAB035D7D0}" destId="{1763EED3-26D7-4B0E-B022-1B72A013A70C}" srcOrd="4" destOrd="0" parTransId="{F5961BDC-783E-4C07-BC92-9011F5BBD285}" sibTransId="{8B6F1219-C0C9-42EE-A202-422710B569C5}"/>
     <dgm:cxn modelId="{8A53A4C3-6031-4734-B3C1-7BBE70A6195C}" type="presOf" srcId="{A7E99E54-94B2-4D9C-82A3-E8D7CBB0FC6A}" destId="{54DB9B34-E7B2-41DC-B13D-F457F995CDFC}" srcOrd="0" destOrd="0" presId="urn:microsoft.com/office/officeart/2005/8/layout/orgChart1"/>
     <dgm:cxn modelId="{2D5715C6-4B16-4AF8-A0C8-2697B477409C}" type="presOf" srcId="{4A4E3E50-38C2-4C3C-AE96-953BA26A11C9}" destId="{7914E8B1-80D5-4A71-9775-0A174E4B78BC}" srcOrd="1" destOrd="0" presId="urn:microsoft.com/office/officeart/2005/8/layout/orgChart1"/>
     <dgm:cxn modelId="{756917CD-3304-41C1-83A7-9955CB260BC6}" type="presOf" srcId="{8EAAB40C-C46B-4763-9B19-143C18560BB8}" destId="{4F485F08-228B-4F23-9920-ED58748DD612}" srcOrd="0" destOrd="0" presId="urn:microsoft.com/office/officeart/2005/8/layout/orgChart1"/>
     <dgm:cxn modelId="{931F97D1-3692-4A52-A385-70D3E0FA82DE}" type="presOf" srcId="{E91B2509-2172-40BF-92BF-95C71C842B9D}" destId="{CA698B96-2FDD-477F-82FD-3398AEE00C53}" srcOrd="0" destOrd="0" presId="urn:microsoft.com/office/officeart/2005/8/layout/orgChart1"/>
-    <dgm:cxn modelId="{F1DC65E4-3406-49EF-8BD7-3B43D972B953}" srcId="{B11103E8-CD81-40BE-B579-4FCAB035D7D0}" destId="{4A4E3E50-38C2-4C3C-AE96-953BA26A11C9}" srcOrd="2" destOrd="0" parTransId="{F92BA4C8-D8E7-4F76-9AE8-619682ED5A87}" sibTransId="{F4856804-261D-4CA9-AEA7-CB9CCF3B24D3}"/>
+    <dgm:cxn modelId="{F1DC65E4-3406-49EF-8BD7-3B43D972B953}" srcId="{B11103E8-CD81-40BE-B579-4FCAB035D7D0}" destId="{4A4E3E50-38C2-4C3C-AE96-953BA26A11C9}" srcOrd="3" destOrd="0" parTransId="{F92BA4C8-D8E7-4F76-9AE8-619682ED5A87}" sibTransId="{F4856804-261D-4CA9-AEA7-CB9CCF3B24D3}"/>
     <dgm:cxn modelId="{9C4E09F7-60C7-4A17-883C-565801E26701}" srcId="{4DE9C598-B23B-4383-915B-55E3A905EC09}" destId="{A7E99E54-94B2-4D9C-82A3-E8D7CBB0FC6A}" srcOrd="0" destOrd="0" parTransId="{A7BDC5C7-F208-4337-83DA-CEAB2AF8A6E8}" sibTransId="{E5ADC721-8733-4901-A13E-0A3C1A6D9EA5}"/>
     <dgm:cxn modelId="{ECEF2BFB-C19C-4668-B0B2-A06335D9AE4F}" type="presOf" srcId="{B11103E8-CD81-40BE-B579-4FCAB035D7D0}" destId="{F58A63D3-C78F-4550-80E7-D69343F847C2}" srcOrd="0" destOrd="0" presId="urn:microsoft.com/office/officeart/2005/8/layout/orgChart1"/>
     <dgm:cxn modelId="{AE87FEFC-59F2-4DF6-8D52-F70F37326785}" type="presOf" srcId="{A7E99E54-94B2-4D9C-82A3-E8D7CBB0FC6A}" destId="{89957609-8B97-47C3-AEE9-6DD7393B124C}" srcOrd="1" destOrd="0" presId="urn:microsoft.com/office/officeart/2005/8/layout/orgChart1"/>
@@ -5088,15 +5261,22 @@
     <dgm:cxn modelId="{3C433F5B-9E7D-4335-8F8B-A2C85A305CB9}" type="presParOf" srcId="{9C640B7D-D67D-4B8E-A8C5-471568107335}" destId="{F58A63D3-C78F-4550-80E7-D69343F847C2}" srcOrd="0" destOrd="0" presId="urn:microsoft.com/office/officeart/2005/8/layout/orgChart1"/>
     <dgm:cxn modelId="{15575AAB-B9B1-477F-8E61-DAD43D9A106E}" type="presParOf" srcId="{9C640B7D-D67D-4B8E-A8C5-471568107335}" destId="{4E2D0EDB-C4D6-450E-83EA-96CF439066D6}" srcOrd="1" destOrd="0" presId="urn:microsoft.com/office/officeart/2005/8/layout/orgChart1"/>
     <dgm:cxn modelId="{7CEA1FA0-74E2-4F02-B0BC-131CCB9A333B}" type="presParOf" srcId="{57E17CB4-9CE1-4EFF-9213-9E6AA8A73D8C}" destId="{DF366C04-0EC9-45EA-9E59-CA10E9616C42}" srcOrd="1" destOrd="0" presId="urn:microsoft.com/office/officeart/2005/8/layout/orgChart1"/>
-    <dgm:cxn modelId="{47795B8E-899B-4008-AFF6-5AB37A7C4623}" type="presParOf" srcId="{DF366C04-0EC9-45EA-9E59-CA10E9616C42}" destId="{CA698B96-2FDD-477F-82FD-3398AEE00C53}" srcOrd="0" destOrd="0" presId="urn:microsoft.com/office/officeart/2005/8/layout/orgChart1"/>
-    <dgm:cxn modelId="{38A4F6E3-6062-49FF-8CE3-A36E981CB9B6}" type="presParOf" srcId="{DF366C04-0EC9-45EA-9E59-CA10E9616C42}" destId="{473DEF0C-42E2-4A50-856D-1F839CCF32C4}" srcOrd="1" destOrd="0" presId="urn:microsoft.com/office/officeart/2005/8/layout/orgChart1"/>
+    <dgm:cxn modelId="{55335E89-7589-4204-9326-98F4167FFF65}" type="presParOf" srcId="{DF366C04-0EC9-45EA-9E59-CA10E9616C42}" destId="{0005035F-079F-4B75-ABD6-B002A5196E47}" srcOrd="0" destOrd="0" presId="urn:microsoft.com/office/officeart/2005/8/layout/orgChart1"/>
+    <dgm:cxn modelId="{D1E6969B-FC86-4EB6-8375-5659200CD2C1}" type="presParOf" srcId="{DF366C04-0EC9-45EA-9E59-CA10E9616C42}" destId="{55AB1897-0390-4635-936C-27B14BC5B00B}" srcOrd="1" destOrd="0" presId="urn:microsoft.com/office/officeart/2005/8/layout/orgChart1"/>
+    <dgm:cxn modelId="{A2A53E50-9F06-437E-8868-E47D482B038D}" type="presParOf" srcId="{55AB1897-0390-4635-936C-27B14BC5B00B}" destId="{8420F2E2-BE5B-447D-9336-1030D00BA86A}" srcOrd="0" destOrd="0" presId="urn:microsoft.com/office/officeart/2005/8/layout/orgChart1"/>
+    <dgm:cxn modelId="{D0A63B9A-B39D-4F41-924B-E2BA627FB6DD}" type="presParOf" srcId="{8420F2E2-BE5B-447D-9336-1030D00BA86A}" destId="{274844C8-7C70-4042-B00B-72F04A850BBB}" srcOrd="0" destOrd="0" presId="urn:microsoft.com/office/officeart/2005/8/layout/orgChart1"/>
+    <dgm:cxn modelId="{388A0E14-3F13-4B10-8EED-31FE4F63DBCA}" type="presParOf" srcId="{8420F2E2-BE5B-447D-9336-1030D00BA86A}" destId="{C6295594-85CF-4A7C-A987-898CD9118F8F}" srcOrd="1" destOrd="0" presId="urn:microsoft.com/office/officeart/2005/8/layout/orgChart1"/>
+    <dgm:cxn modelId="{A1D52469-0CE5-445A-9188-EC4A6264F17D}" type="presParOf" srcId="{55AB1897-0390-4635-936C-27B14BC5B00B}" destId="{41BCDDF8-A21E-4677-B9B6-40659F8F9DA5}" srcOrd="1" destOrd="0" presId="urn:microsoft.com/office/officeart/2005/8/layout/orgChart1"/>
+    <dgm:cxn modelId="{60C029D6-EE14-4DCA-A015-15530E0B6E2A}" type="presParOf" srcId="{55AB1897-0390-4635-936C-27B14BC5B00B}" destId="{553F3CBA-41EA-4D55-87A1-A861E50F3AD8}" srcOrd="2" destOrd="0" presId="urn:microsoft.com/office/officeart/2005/8/layout/orgChart1"/>
+    <dgm:cxn modelId="{47795B8E-899B-4008-AFF6-5AB37A7C4623}" type="presParOf" srcId="{DF366C04-0EC9-45EA-9E59-CA10E9616C42}" destId="{CA698B96-2FDD-477F-82FD-3398AEE00C53}" srcOrd="2" destOrd="0" presId="urn:microsoft.com/office/officeart/2005/8/layout/orgChart1"/>
+    <dgm:cxn modelId="{38A4F6E3-6062-49FF-8CE3-A36E981CB9B6}" type="presParOf" srcId="{DF366C04-0EC9-45EA-9E59-CA10E9616C42}" destId="{473DEF0C-42E2-4A50-856D-1F839CCF32C4}" srcOrd="3" destOrd="0" presId="urn:microsoft.com/office/officeart/2005/8/layout/orgChart1"/>
     <dgm:cxn modelId="{B0AAA5BD-323E-40F8-88D6-04DCC54A5DBF}" type="presParOf" srcId="{473DEF0C-42E2-4A50-856D-1F839CCF32C4}" destId="{4624B90A-4132-4200-8AA0-82A7A6868243}" srcOrd="0" destOrd="0" presId="urn:microsoft.com/office/officeart/2005/8/layout/orgChart1"/>
     <dgm:cxn modelId="{F8361AC3-010C-4552-88A4-09040E8F894E}" type="presParOf" srcId="{4624B90A-4132-4200-8AA0-82A7A6868243}" destId="{CB2F9E2B-60EC-401F-A7AE-483C76BC0EC4}" srcOrd="0" destOrd="0" presId="urn:microsoft.com/office/officeart/2005/8/layout/orgChart1"/>
     <dgm:cxn modelId="{86B63F77-1C87-4122-ADEE-F18936B8014A}" type="presParOf" srcId="{4624B90A-4132-4200-8AA0-82A7A6868243}" destId="{87894099-6401-42BD-9593-FCCC7AE42C49}" srcOrd="1" destOrd="0" presId="urn:microsoft.com/office/officeart/2005/8/layout/orgChart1"/>
     <dgm:cxn modelId="{34DA4E50-A3AA-4591-8293-F703820B1B36}" type="presParOf" srcId="{473DEF0C-42E2-4A50-856D-1F839CCF32C4}" destId="{5AB908CA-153D-4CCC-9357-A7CB91FB315D}" srcOrd="1" destOrd="0" presId="urn:microsoft.com/office/officeart/2005/8/layout/orgChart1"/>
     <dgm:cxn modelId="{07B5A45B-F1F0-4663-B634-6597C7788CF8}" type="presParOf" srcId="{473DEF0C-42E2-4A50-856D-1F839CCF32C4}" destId="{887CC9D3-38FE-45D6-B05D-3A8EDEAEB30E}" srcOrd="2" destOrd="0" presId="urn:microsoft.com/office/officeart/2005/8/layout/orgChart1"/>
-    <dgm:cxn modelId="{5F703066-DCE7-4FCC-9C32-45990E4C7284}" type="presParOf" srcId="{DF366C04-0EC9-45EA-9E59-CA10E9616C42}" destId="{28A959D3-8E8F-4C33-8E58-743CD226A445}" srcOrd="2" destOrd="0" presId="urn:microsoft.com/office/officeart/2005/8/layout/orgChart1"/>
-    <dgm:cxn modelId="{ADFEA9A2-0CD0-4DF8-9AF5-3CC0055F91EE}" type="presParOf" srcId="{DF366C04-0EC9-45EA-9E59-CA10E9616C42}" destId="{9942EE3E-75B3-40C5-9515-14C899144BE6}" srcOrd="3" destOrd="0" presId="urn:microsoft.com/office/officeart/2005/8/layout/orgChart1"/>
+    <dgm:cxn modelId="{5F703066-DCE7-4FCC-9C32-45990E4C7284}" type="presParOf" srcId="{DF366C04-0EC9-45EA-9E59-CA10E9616C42}" destId="{28A959D3-8E8F-4C33-8E58-743CD226A445}" srcOrd="4" destOrd="0" presId="urn:microsoft.com/office/officeart/2005/8/layout/orgChart1"/>
+    <dgm:cxn modelId="{ADFEA9A2-0CD0-4DF8-9AF5-3CC0055F91EE}" type="presParOf" srcId="{DF366C04-0EC9-45EA-9E59-CA10E9616C42}" destId="{9942EE3E-75B3-40C5-9515-14C899144BE6}" srcOrd="5" destOrd="0" presId="urn:microsoft.com/office/officeart/2005/8/layout/orgChart1"/>
     <dgm:cxn modelId="{A0AEDCB5-EF81-47B6-9DD6-DCFB8C3BA833}" type="presParOf" srcId="{9942EE3E-75B3-40C5-9515-14C899144BE6}" destId="{95254029-3A83-4A07-BCC7-CAD6C2DADFEC}" srcOrd="0" destOrd="0" presId="urn:microsoft.com/office/officeart/2005/8/layout/orgChart1"/>
     <dgm:cxn modelId="{463CEBDF-5752-4235-8F56-BDF69DE02976}" type="presParOf" srcId="{95254029-3A83-4A07-BCC7-CAD6C2DADFEC}" destId="{227A2695-8EBE-4628-A9EE-801697A0D3C2}" srcOrd="0" destOrd="0" presId="urn:microsoft.com/office/officeart/2005/8/layout/orgChart1"/>
     <dgm:cxn modelId="{01F9196F-E620-4D41-8079-413E3E478A4F}" type="presParOf" srcId="{95254029-3A83-4A07-BCC7-CAD6C2DADFEC}" destId="{EAF98DA0-A25D-4689-9A35-0FB204C4D414}" srcOrd="1" destOrd="0" presId="urn:microsoft.com/office/officeart/2005/8/layout/orgChart1"/>
@@ -5109,8 +5289,8 @@
     <dgm:cxn modelId="{95772096-7DBA-4E8C-91C6-4F8A0A64416C}" type="presParOf" srcId="{1ED732C6-4FB8-4A1E-BC80-51448E89ECFB}" destId="{89957609-8B97-47C3-AEE9-6DD7393B124C}" srcOrd="1" destOrd="0" presId="urn:microsoft.com/office/officeart/2005/8/layout/orgChart1"/>
     <dgm:cxn modelId="{2739B281-BD78-4410-BADC-C96574C56CCB}" type="presParOf" srcId="{1A754903-320B-4D58-8D1D-B1046E7A0C09}" destId="{98A76313-0002-4F08-8C2A-2C9E7CF86A01}" srcOrd="1" destOrd="0" presId="urn:microsoft.com/office/officeart/2005/8/layout/orgChart1"/>
     <dgm:cxn modelId="{1040F5D0-2127-428D-B706-9E5757FFC25A}" type="presParOf" srcId="{1A754903-320B-4D58-8D1D-B1046E7A0C09}" destId="{B66ED59C-56CC-4674-9E98-64456A927D23}" srcOrd="2" destOrd="0" presId="urn:microsoft.com/office/officeart/2005/8/layout/orgChart1"/>
-    <dgm:cxn modelId="{9198E430-4E3B-4BE6-B09D-89FA0286C30C}" type="presParOf" srcId="{DF366C04-0EC9-45EA-9E59-CA10E9616C42}" destId="{36F9C691-4B50-4159-9F42-B35EF32A6B44}" srcOrd="4" destOrd="0" presId="urn:microsoft.com/office/officeart/2005/8/layout/orgChart1"/>
-    <dgm:cxn modelId="{2B36E909-34B6-4C95-8761-53C7FC7080B9}" type="presParOf" srcId="{DF366C04-0EC9-45EA-9E59-CA10E9616C42}" destId="{312C63B7-2356-4591-A8D8-CB4355394DE3}" srcOrd="5" destOrd="0" presId="urn:microsoft.com/office/officeart/2005/8/layout/orgChart1"/>
+    <dgm:cxn modelId="{9198E430-4E3B-4BE6-B09D-89FA0286C30C}" type="presParOf" srcId="{DF366C04-0EC9-45EA-9E59-CA10E9616C42}" destId="{36F9C691-4B50-4159-9F42-B35EF32A6B44}" srcOrd="6" destOrd="0" presId="urn:microsoft.com/office/officeart/2005/8/layout/orgChart1"/>
+    <dgm:cxn modelId="{2B36E909-34B6-4C95-8761-53C7FC7080B9}" type="presParOf" srcId="{DF366C04-0EC9-45EA-9E59-CA10E9616C42}" destId="{312C63B7-2356-4591-A8D8-CB4355394DE3}" srcOrd="7" destOrd="0" presId="urn:microsoft.com/office/officeart/2005/8/layout/orgChart1"/>
     <dgm:cxn modelId="{72D56477-E19B-4C56-8DCA-ABF4A3C334B7}" type="presParOf" srcId="{312C63B7-2356-4591-A8D8-CB4355394DE3}" destId="{980CD6A4-C2BD-46F1-9817-29D82D14EAD8}" srcOrd="0" destOrd="0" presId="urn:microsoft.com/office/officeart/2005/8/layout/orgChart1"/>
     <dgm:cxn modelId="{A760D4C3-30AD-46E6-BE5F-1C179C8D0BE2}" type="presParOf" srcId="{980CD6A4-C2BD-46F1-9817-29D82D14EAD8}" destId="{B7B9E35F-3141-4501-8C8E-ECDBA7C3D699}" srcOrd="0" destOrd="0" presId="urn:microsoft.com/office/officeart/2005/8/layout/orgChart1"/>
     <dgm:cxn modelId="{0B1DAF5E-956D-45F9-ABE7-38276EE83E97}" type="presParOf" srcId="{980CD6A4-C2BD-46F1-9817-29D82D14EAD8}" destId="{7914E8B1-80D5-4A71-9775-0A174E4B78BC}" srcOrd="1" destOrd="0" presId="urn:microsoft.com/office/officeart/2005/8/layout/orgChart1"/>
@@ -6235,7 +6415,7 @@
       <dsp:spPr>
         <a:xfrm>
           <a:off x="3657600" y="1856174"/>
-          <a:ext cx="1853044" cy="1408926"/>
+          <a:ext cx="2779566" cy="1408926"/>
         </a:xfrm>
         <a:custGeom>
           <a:avLst/>
@@ -6252,10 +6432,10 @@
                 <a:pt x="0" y="1248124"/>
               </a:lnTo>
               <a:lnTo>
-                <a:pt x="1853044" y="1248124"/>
+                <a:pt x="2779566" y="1248124"/>
               </a:lnTo>
               <a:lnTo>
-                <a:pt x="1853044" y="1408926"/>
+                <a:pt x="2779566" y="1408926"/>
               </a:lnTo>
             </a:path>
           </a:pathLst>
@@ -6295,7 +6475,7 @@
       </dsp:nvSpPr>
       <dsp:spPr>
         <a:xfrm>
-          <a:off x="3496798" y="4030821"/>
+          <a:off x="4423320" y="4030821"/>
           <a:ext cx="160801" cy="704463"/>
         </a:xfrm>
         <a:custGeom>
@@ -6353,8 +6533,8 @@
       </dsp:nvSpPr>
       <dsp:spPr>
         <a:xfrm>
-          <a:off x="3611880" y="1856174"/>
-          <a:ext cx="91440" cy="1408926"/>
+          <a:off x="3657600" y="1856174"/>
+          <a:ext cx="926522" cy="1408926"/>
         </a:xfrm>
         <a:custGeom>
           <a:avLst/>
@@ -6365,10 +6545,16 @@
           <a:pathLst>
             <a:path>
               <a:moveTo>
-                <a:pt x="45720" y="0"/>
+                <a:pt x="0" y="0"/>
               </a:moveTo>
               <a:lnTo>
-                <a:pt x="45720" y="1408926"/>
+                <a:pt x="0" y="1248124"/>
+              </a:lnTo>
+              <a:lnTo>
+                <a:pt x="926522" y="1248124"/>
+              </a:lnTo>
+              <a:lnTo>
+                <a:pt x="926522" y="1408926"/>
               </a:lnTo>
             </a:path>
           </a:pathLst>
@@ -6408,8 +6594,8 @@
       </dsp:nvSpPr>
       <dsp:spPr>
         <a:xfrm>
-          <a:off x="1804555" y="1856174"/>
-          <a:ext cx="1853044" cy="1408926"/>
+          <a:off x="2731077" y="1856174"/>
+          <a:ext cx="926522" cy="1408926"/>
         </a:xfrm>
         <a:custGeom>
           <a:avLst/>
@@ -6420,10 +6606,71 @@
           <a:pathLst>
             <a:path>
               <a:moveTo>
-                <a:pt x="1853044" y="0"/>
+                <a:pt x="926522" y="0"/>
               </a:moveTo>
               <a:lnTo>
-                <a:pt x="1853044" y="1248124"/>
+                <a:pt x="926522" y="1248124"/>
+              </a:lnTo>
+              <a:lnTo>
+                <a:pt x="0" y="1248124"/>
+              </a:lnTo>
+              <a:lnTo>
+                <a:pt x="0" y="1408926"/>
+              </a:lnTo>
+            </a:path>
+          </a:pathLst>
+        </a:custGeom>
+        <a:noFill/>
+        <a:ln w="10795" cap="flat" cmpd="sng" algn="ctr">
+          <a:solidFill>
+            <a:schemeClr val="accent1">
+              <a:shade val="80000"/>
+              <a:hueOff val="0"/>
+              <a:satOff val="0"/>
+              <a:lumOff val="0"/>
+              <a:alphaOff val="0"/>
+            </a:schemeClr>
+          </a:solidFill>
+          <a:prstDash val="solid"/>
+        </a:ln>
+        <a:effectLst/>
+      </dsp:spPr>
+      <dsp:style>
+        <a:lnRef idx="2">
+          <a:scrgbClr r="0" g="0" b="0"/>
+        </a:lnRef>
+        <a:fillRef idx="0">
+          <a:scrgbClr r="0" g="0" b="0"/>
+        </a:fillRef>
+        <a:effectRef idx="0">
+          <a:scrgbClr r="0" g="0" b="0"/>
+        </a:effectRef>
+        <a:fontRef idx="minor"/>
+      </dsp:style>
+    </dsp:sp>
+    <dsp:sp modelId="{7AA25F1C-51B2-49BF-8201-0652CE559B21}">
+      <dsp:nvSpPr>
+        <dsp:cNvPr id="0" name=""/>
+        <dsp:cNvSpPr/>
+      </dsp:nvSpPr>
+      <dsp:spPr>
+        <a:xfrm>
+          <a:off x="878033" y="1856174"/>
+          <a:ext cx="2779566" cy="1408926"/>
+        </a:xfrm>
+        <a:custGeom>
+          <a:avLst/>
+          <a:gdLst/>
+          <a:ahLst/>
+          <a:cxnLst/>
+          <a:rect l="0" t="0" r="0" b="0"/>
+          <a:pathLst>
+            <a:path>
+              <a:moveTo>
+                <a:pt x="2779566" y="0"/>
+              </a:moveTo>
+              <a:lnTo>
+                <a:pt x="2779566" y="1248124"/>
               </a:lnTo>
               <a:lnTo>
                 <a:pt x="0" y="1248124"/>
@@ -6566,12 +6813,12 @@
         </a:fontRef>
       </dsp:style>
       <dsp:txBody>
-        <a:bodyPr spcFirstLastPara="0" vert="horz" wrap="square" lIns="10795" tIns="10795" rIns="10795" bIns="10795" numCol="1" spcCol="1270" anchor="ctr" anchorCtr="0">
+        <a:bodyPr spcFirstLastPara="0" vert="horz" wrap="square" lIns="10160" tIns="10160" rIns="10160" bIns="10160" numCol="1" spcCol="1270" anchor="ctr" anchorCtr="0">
           <a:noAutofit/>
         </a:bodyPr>
         <a:lstStyle/>
         <a:p>
-          <a:pPr marL="0" lvl="0" indent="0" algn="ctr" defTabSz="755650">
+          <a:pPr marL="0" lvl="0" indent="0" algn="ctr" defTabSz="711200">
             <a:lnSpc>
               <a:spcPct val="90000"/>
             </a:lnSpc>
@@ -6584,10 +6831,10 @@
             <a:buNone/>
           </a:pPr>
           <a:r>
-            <a:rPr lang="en-US" sz="1700" kern="1200" dirty="0"/>
+            <a:rPr lang="en-US" sz="1600" kern="1200" dirty="0"/>
             <a:t>initScan.exe</a:t>
           </a:r>
-          <a:endParaRPr lang="fr-CA" sz="1700" kern="1200" dirty="0"/>
+          <a:endParaRPr lang="fr-CA" sz="1600" kern="1200" dirty="0"/>
         </a:p>
       </dsp:txBody>
       <dsp:txXfrm>
@@ -6644,12 +6891,12 @@
         </a:fontRef>
       </dsp:style>
       <dsp:txBody>
-        <a:bodyPr spcFirstLastPara="0" vert="horz" wrap="square" lIns="10795" tIns="10795" rIns="10795" bIns="10795" numCol="1" spcCol="1270" anchor="ctr" anchorCtr="0">
+        <a:bodyPr spcFirstLastPara="0" vert="horz" wrap="square" lIns="10160" tIns="10160" rIns="10160" bIns="10160" numCol="1" spcCol="1270" anchor="ctr" anchorCtr="0">
           <a:noAutofit/>
         </a:bodyPr>
         <a:lstStyle/>
         <a:p>
-          <a:pPr marL="0" lvl="0" indent="0" algn="ctr" defTabSz="755650">
+          <a:pPr marL="0" lvl="0" indent="0" algn="ctr" defTabSz="711200">
             <a:lnSpc>
               <a:spcPct val="90000"/>
             </a:lnSpc>
@@ -6662,10 +6909,10 @@
             <a:buNone/>
           </a:pPr>
           <a:r>
-            <a:rPr lang="en-US" sz="1700" kern="1200" dirty="0"/>
+            <a:rPr lang="en-US" sz="1600" kern="1200" dirty="0"/>
             <a:t>logCheck.exe</a:t>
           </a:r>
-          <a:endParaRPr lang="fr-CA" sz="1700" kern="1200" dirty="0"/>
+          <a:endParaRPr lang="fr-CA" sz="1600" kern="1200" dirty="0"/>
         </a:p>
       </dsp:txBody>
       <dsp:txXfrm>
@@ -6673,14 +6920,14 @@
         <a:ext cx="1531441" cy="765720"/>
       </dsp:txXfrm>
     </dsp:sp>
-    <dsp:sp modelId="{CB2F9E2B-60EC-401F-A7AE-483C76BC0EC4}">
+    <dsp:sp modelId="{D9BAE0A2-1877-42BD-82CF-B647EA24D564}">
       <dsp:nvSpPr>
         <dsp:cNvPr id="0" name=""/>
         <dsp:cNvSpPr/>
       </dsp:nvSpPr>
       <dsp:spPr>
         <a:xfrm>
-          <a:off x="1038835" y="3265100"/>
+          <a:off x="112313" y="3265100"/>
           <a:ext cx="1531441" cy="765720"/>
         </a:xfrm>
         <a:prstGeom prst="rect">
@@ -6722,12 +6969,12 @@
         </a:fontRef>
       </dsp:style>
       <dsp:txBody>
-        <a:bodyPr spcFirstLastPara="0" vert="horz" wrap="square" lIns="10795" tIns="10795" rIns="10795" bIns="10795" numCol="1" spcCol="1270" anchor="ctr" anchorCtr="0">
+        <a:bodyPr spcFirstLastPara="0" vert="horz" wrap="square" lIns="10160" tIns="10160" rIns="10160" bIns="10160" numCol="1" spcCol="1270" anchor="ctr" anchorCtr="0">
           <a:noAutofit/>
         </a:bodyPr>
         <a:lstStyle/>
         <a:p>
-          <a:pPr marL="0" lvl="0" indent="0" algn="ctr" defTabSz="755650">
+          <a:pPr marL="0" lvl="0" indent="0" algn="ctr" defTabSz="711200">
             <a:lnSpc>
               <a:spcPct val="90000"/>
             </a:lnSpc>
@@ -6740,36 +6987,36 @@
             <a:buNone/>
           </a:pPr>
           <a:r>
-            <a:rPr lang="en-US" sz="1700" kern="1200" dirty="0"/>
-            <a:t>printLabels.bat</a:t>
+            <a:rPr lang="en-US" sz="1600" kern="1200" dirty="0"/>
+            <a:t>printQA.bat</a:t>
           </a:r>
           <a:br>
-            <a:rPr lang="en-US" sz="1700" kern="1200" dirty="0"/>
+            <a:rPr lang="en-US" sz="1600" kern="1200" dirty="0"/>
           </a:br>
           <a:r>
-            <a:rPr lang="en-US" sz="1700" kern="1200" dirty="0"/>
-            <a:t>+3 .</a:t>
+            <a:rPr lang="en-US" sz="1600" kern="1200" dirty="0"/>
+            <a:t>+1 .</a:t>
           </a:r>
           <a:r>
-            <a:rPr lang="en-US" sz="1700" kern="1200" dirty="0" err="1"/>
+            <a:rPr lang="en-US" sz="1600" kern="1200" dirty="0" err="1"/>
             <a:t>rpt</a:t>
           </a:r>
-          <a:endParaRPr lang="fr-CA" sz="1700" kern="1200" dirty="0"/>
+          <a:endParaRPr lang="fr-CA" sz="1600" kern="1200" dirty="0"/>
         </a:p>
       </dsp:txBody>
       <dsp:txXfrm>
-        <a:off x="1038835" y="3265100"/>
+        <a:off x="112313" y="3265100"/>
         <a:ext cx="1531441" cy="765720"/>
       </dsp:txXfrm>
     </dsp:sp>
-    <dsp:sp modelId="{227A2695-8EBE-4628-A9EE-801697A0D3C2}">
+    <dsp:sp modelId="{CB2F9E2B-60EC-401F-A7AE-483C76BC0EC4}">
       <dsp:nvSpPr>
         <dsp:cNvPr id="0" name=""/>
         <dsp:cNvSpPr/>
       </dsp:nvSpPr>
       <dsp:spPr>
         <a:xfrm>
-          <a:off x="2891879" y="3265100"/>
+          <a:off x="1965357" y="3265100"/>
           <a:ext cx="1531441" cy="765720"/>
         </a:xfrm>
         <a:prstGeom prst="rect">
@@ -6811,12 +7058,12 @@
         </a:fontRef>
       </dsp:style>
       <dsp:txBody>
-        <a:bodyPr spcFirstLastPara="0" vert="horz" wrap="square" lIns="10795" tIns="10795" rIns="10795" bIns="10795" numCol="1" spcCol="1270" anchor="ctr" anchorCtr="0">
+        <a:bodyPr spcFirstLastPara="0" vert="horz" wrap="square" lIns="10160" tIns="10160" rIns="10160" bIns="10160" numCol="1" spcCol="1270" anchor="ctr" anchorCtr="0">
           <a:noAutofit/>
         </a:bodyPr>
         <a:lstStyle/>
         <a:p>
-          <a:pPr marL="0" lvl="0" indent="0" algn="ctr" defTabSz="755650">
+          <a:pPr marL="0" lvl="0" indent="0" algn="ctr" defTabSz="711200">
             <a:lnSpc>
               <a:spcPct val="90000"/>
             </a:lnSpc>
@@ -6829,25 +7076,36 @@
             <a:buNone/>
           </a:pPr>
           <a:r>
-            <a:rPr lang="en-US" sz="1700" kern="1200" dirty="0"/>
-            <a:t>SNCountUp.bat</a:t>
+            <a:rPr lang="en-US" sz="1600" kern="1200" dirty="0"/>
+            <a:t>printLabelsv2.bat</a:t>
           </a:r>
-          <a:endParaRPr lang="fr-CA" sz="1700" kern="1200" dirty="0"/>
+          <a:br>
+            <a:rPr lang="en-US" sz="1600" kern="1200" dirty="0"/>
+          </a:br>
+          <a:r>
+            <a:rPr lang="en-US" sz="1600" kern="1200" dirty="0"/>
+            <a:t>+X .</a:t>
+          </a:r>
+          <a:r>
+            <a:rPr lang="en-US" sz="1600" kern="1200" dirty="0" err="1"/>
+            <a:t>rpt</a:t>
+          </a:r>
+          <a:endParaRPr lang="fr-CA" sz="1600" kern="1200" dirty="0"/>
         </a:p>
       </dsp:txBody>
       <dsp:txXfrm>
-        <a:off x="2891879" y="3265100"/>
+        <a:off x="1965357" y="3265100"/>
         <a:ext cx="1531441" cy="765720"/>
       </dsp:txXfrm>
     </dsp:sp>
-    <dsp:sp modelId="{54DB9B34-E7B2-41DC-B13D-F457F995CDFC}">
+    <dsp:sp modelId="{227A2695-8EBE-4628-A9EE-801697A0D3C2}">
       <dsp:nvSpPr>
         <dsp:cNvPr id="0" name=""/>
         <dsp:cNvSpPr/>
       </dsp:nvSpPr>
       <dsp:spPr>
         <a:xfrm>
-          <a:off x="1965357" y="4352423"/>
+          <a:off x="3818401" y="3265100"/>
           <a:ext cx="1531441" cy="765720"/>
         </a:xfrm>
         <a:prstGeom prst="rect">
@@ -6889,12 +7147,12 @@
         </a:fontRef>
       </dsp:style>
       <dsp:txBody>
-        <a:bodyPr spcFirstLastPara="0" vert="horz" wrap="square" lIns="10795" tIns="10795" rIns="10795" bIns="10795" numCol="1" spcCol="1270" anchor="ctr" anchorCtr="0">
+        <a:bodyPr spcFirstLastPara="0" vert="horz" wrap="square" lIns="10160" tIns="10160" rIns="10160" bIns="10160" numCol="1" spcCol="1270" anchor="ctr" anchorCtr="0">
           <a:noAutofit/>
         </a:bodyPr>
         <a:lstStyle/>
         <a:p>
-          <a:pPr marL="0" lvl="0" indent="0" algn="ctr" defTabSz="755650">
+          <a:pPr marL="0" lvl="0" indent="0" algn="ctr" defTabSz="711200">
             <a:lnSpc>
               <a:spcPct val="90000"/>
             </a:lnSpc>
@@ -6907,25 +7165,25 @@
             <a:buNone/>
           </a:pPr>
           <a:r>
-            <a:rPr lang="en-US" sz="1700" kern="1200" dirty="0"/>
-            <a:t>SNCount.txt</a:t>
+            <a:rPr lang="en-US" sz="1600" kern="1200" dirty="0"/>
+            <a:t>SNCountUp.bat</a:t>
           </a:r>
-          <a:endParaRPr lang="fr-CA" sz="1700" kern="1200" dirty="0"/>
+          <a:endParaRPr lang="fr-CA" sz="1600" kern="1200" dirty="0"/>
         </a:p>
       </dsp:txBody>
       <dsp:txXfrm>
-        <a:off x="1965357" y="4352423"/>
+        <a:off x="3818401" y="3265100"/>
         <a:ext cx="1531441" cy="765720"/>
       </dsp:txXfrm>
     </dsp:sp>
-    <dsp:sp modelId="{B7B9E35F-3141-4501-8C8E-ECDBA7C3D699}">
+    <dsp:sp modelId="{54DB9B34-E7B2-41DC-B13D-F457F995CDFC}">
       <dsp:nvSpPr>
         <dsp:cNvPr id="0" name=""/>
         <dsp:cNvSpPr/>
       </dsp:nvSpPr>
       <dsp:spPr>
         <a:xfrm>
-          <a:off x="4744923" y="3265100"/>
+          <a:off x="2891879" y="4352423"/>
           <a:ext cx="1531441" cy="765720"/>
         </a:xfrm>
         <a:prstGeom prst="rect">
@@ -6967,12 +7225,12 @@
         </a:fontRef>
       </dsp:style>
       <dsp:txBody>
-        <a:bodyPr spcFirstLastPara="0" vert="horz" wrap="square" lIns="10795" tIns="10795" rIns="10795" bIns="10795" numCol="1" spcCol="1270" anchor="ctr" anchorCtr="0">
+        <a:bodyPr spcFirstLastPara="0" vert="horz" wrap="square" lIns="10160" tIns="10160" rIns="10160" bIns="10160" numCol="1" spcCol="1270" anchor="ctr" anchorCtr="0">
           <a:noAutofit/>
         </a:bodyPr>
         <a:lstStyle/>
         <a:p>
-          <a:pPr marL="0" lvl="0" indent="0" algn="ctr" defTabSz="755650">
+          <a:pPr marL="0" lvl="0" indent="0" algn="ctr" defTabSz="711200">
             <a:lnSpc>
               <a:spcPct val="90000"/>
             </a:lnSpc>
@@ -6985,29 +7243,107 @@
             <a:buNone/>
           </a:pPr>
           <a:r>
-            <a:rPr lang="en-US" sz="1700" kern="1200" dirty="0"/>
+            <a:rPr lang="en-US" sz="1600" kern="1200" dirty="0"/>
+            <a:t>SNCount.txt</a:t>
+          </a:r>
+          <a:endParaRPr lang="fr-CA" sz="1600" kern="1200" dirty="0"/>
+        </a:p>
+      </dsp:txBody>
+      <dsp:txXfrm>
+        <a:off x="2891879" y="4352423"/>
+        <a:ext cx="1531441" cy="765720"/>
+      </dsp:txXfrm>
+    </dsp:sp>
+    <dsp:sp modelId="{B7B9E35F-3141-4501-8C8E-ECDBA7C3D699}">
+      <dsp:nvSpPr>
+        <dsp:cNvPr id="0" name=""/>
+        <dsp:cNvSpPr/>
+      </dsp:nvSpPr>
+      <dsp:spPr>
+        <a:xfrm>
+          <a:off x="5671445" y="3265100"/>
+          <a:ext cx="1531441" cy="765720"/>
+        </a:xfrm>
+        <a:prstGeom prst="rect">
+          <a:avLst/>
+        </a:prstGeom>
+        <a:solidFill>
+          <a:schemeClr val="accent1">
+            <a:hueOff val="0"/>
+            <a:satOff val="0"/>
+            <a:lumOff val="0"/>
+            <a:alphaOff val="0"/>
+          </a:schemeClr>
+        </a:solidFill>
+        <a:ln w="10795" cap="flat" cmpd="sng" algn="ctr">
+          <a:solidFill>
+            <a:schemeClr val="lt1">
+              <a:hueOff val="0"/>
+              <a:satOff val="0"/>
+              <a:lumOff val="0"/>
+              <a:alphaOff val="0"/>
+            </a:schemeClr>
+          </a:solidFill>
+          <a:prstDash val="solid"/>
+        </a:ln>
+        <a:effectLst/>
+      </dsp:spPr>
+      <dsp:style>
+        <a:lnRef idx="2">
+          <a:scrgbClr r="0" g="0" b="0"/>
+        </a:lnRef>
+        <a:fillRef idx="1">
+          <a:scrgbClr r="0" g="0" b="0"/>
+        </a:fillRef>
+        <a:effectRef idx="0">
+          <a:scrgbClr r="0" g="0" b="0"/>
+        </a:effectRef>
+        <a:fontRef idx="minor">
+          <a:schemeClr val="lt1"/>
+        </a:fontRef>
+      </dsp:style>
+      <dsp:txBody>
+        <a:bodyPr spcFirstLastPara="0" vert="horz" wrap="square" lIns="10160" tIns="10160" rIns="10160" bIns="10160" numCol="1" spcCol="1270" anchor="ctr" anchorCtr="0">
+          <a:noAutofit/>
+        </a:bodyPr>
+        <a:lstStyle/>
+        <a:p>
+          <a:pPr marL="0" lvl="0" indent="0" algn="ctr" defTabSz="711200">
+            <a:lnSpc>
+              <a:spcPct val="90000"/>
+            </a:lnSpc>
+            <a:spcBef>
+              <a:spcPct val="0"/>
+            </a:spcBef>
+            <a:spcAft>
+              <a:spcPct val="35000"/>
+            </a:spcAft>
+            <a:buNone/>
+          </a:pPr>
+          <a:r>
+            <a:rPr lang="en-US" sz="1600" kern="1200" dirty="0"/>
             <a:t>printWIP.bat</a:t>
           </a:r>
           <a:br>
-            <a:rPr lang="en-US" sz="1700" kern="1200" dirty="0"/>
+            <a:rPr lang="en-US" sz="1600" kern="1200" dirty="0"/>
           </a:br>
           <a:r>
-            <a:rPr lang="en-US" sz="1700" kern="1200" dirty="0"/>
+            <a:rPr lang="en-US" sz="1600" kern="1200" dirty="0"/>
             <a:t>+2 .</a:t>
           </a:r>
           <a:r>
-            <a:rPr lang="en-US" sz="1700" kern="1200" dirty="0" err="1"/>
+            <a:rPr lang="en-US" sz="1600" kern="1200" dirty="0" err="1"/>
             <a:t>rpt</a:t>
           </a:r>
           <a:r>
-            <a:rPr lang="en-US" sz="1700" kern="1200" dirty="0"/>
+            <a:rPr lang="en-US" sz="1600" kern="1200" dirty="0"/>
             <a:t> +.docx</a:t>
           </a:r>
-          <a:endParaRPr lang="fr-CA" sz="1700" kern="1200" dirty="0"/>
+          <a:endParaRPr lang="fr-CA" sz="1600" kern="1200" dirty="0"/>
         </a:p>
       </dsp:txBody>
       <dsp:txXfrm>
-        <a:off x="4744923" y="3265100"/>
+        <a:off x="5671445" y="3265100"/>
         <a:ext cx="1531441" cy="765720"/>
       </dsp:txXfrm>
     </dsp:sp>
@@ -7060,12 +7396,12 @@
         </a:fontRef>
       </dsp:style>
       <dsp:txBody>
-        <a:bodyPr spcFirstLastPara="0" vert="horz" wrap="square" lIns="10795" tIns="10795" rIns="10795" bIns="10795" numCol="1" spcCol="1270" anchor="ctr" anchorCtr="0">
+        <a:bodyPr spcFirstLastPara="0" vert="horz" wrap="square" lIns="10160" tIns="10160" rIns="10160" bIns="10160" numCol="1" spcCol="1270" anchor="ctr" anchorCtr="0">
           <a:noAutofit/>
         </a:bodyPr>
         <a:lstStyle/>
         <a:p>
-          <a:pPr marL="0" lvl="0" indent="0" algn="ctr" defTabSz="755650">
+          <a:pPr marL="0" lvl="0" indent="0" algn="ctr" defTabSz="711200">
             <a:lnSpc>
               <a:spcPct val="90000"/>
             </a:lnSpc>
@@ -7078,10 +7414,10 @@
             <a:buNone/>
           </a:pPr>
           <a:r>
-            <a:rPr lang="en-US" sz="1700" kern="1200" dirty="0"/>
+            <a:rPr lang="en-US" sz="1600" kern="1200" dirty="0"/>
             <a:t>bLog.txt</a:t>
           </a:r>
-          <a:endParaRPr lang="fr-CA" sz="1700" kern="1200" dirty="0"/>
+          <a:endParaRPr lang="fr-CA" sz="1600" kern="1200" dirty="0"/>
         </a:p>
       </dsp:txBody>
       <dsp:txXfrm>
@@ -7167,7 +7503,7 @@
       <dsp:spPr>
         <a:xfrm>
           <a:off x="3657600" y="1856174"/>
-          <a:ext cx="1853044" cy="1408926"/>
+          <a:ext cx="2779566" cy="1408926"/>
         </a:xfrm>
         <a:custGeom>
           <a:avLst/>
@@ -7184,10 +7520,10 @@
                 <a:pt x="0" y="1248124"/>
               </a:lnTo>
               <a:lnTo>
-                <a:pt x="1853044" y="1248124"/>
+                <a:pt x="2779566" y="1248124"/>
               </a:lnTo>
               <a:lnTo>
-                <a:pt x="1853044" y="1408926"/>
+                <a:pt x="2779566" y="1408926"/>
               </a:lnTo>
             </a:path>
           </a:pathLst>
@@ -7227,7 +7563,7 @@
       </dsp:nvSpPr>
       <dsp:spPr>
         <a:xfrm>
-          <a:off x="3496798" y="4030821"/>
+          <a:off x="4423320" y="4030821"/>
           <a:ext cx="160801" cy="704463"/>
         </a:xfrm>
         <a:custGeom>
@@ -7285,8 +7621,8 @@
       </dsp:nvSpPr>
       <dsp:spPr>
         <a:xfrm>
-          <a:off x="3611880" y="1856174"/>
-          <a:ext cx="91440" cy="1408926"/>
+          <a:off x="3657600" y="1856174"/>
+          <a:ext cx="926522" cy="1408926"/>
         </a:xfrm>
         <a:custGeom>
           <a:avLst/>
@@ -7297,10 +7633,16 @@
           <a:pathLst>
             <a:path>
               <a:moveTo>
-                <a:pt x="45720" y="0"/>
+                <a:pt x="0" y="0"/>
               </a:moveTo>
               <a:lnTo>
-                <a:pt x="45720" y="1408926"/>
+                <a:pt x="0" y="1248124"/>
+              </a:lnTo>
+              <a:lnTo>
+                <a:pt x="926522" y="1248124"/>
+              </a:lnTo>
+              <a:lnTo>
+                <a:pt x="926522" y="1408926"/>
               </a:lnTo>
             </a:path>
           </a:pathLst>
@@ -7340,8 +7682,8 @@
       </dsp:nvSpPr>
       <dsp:spPr>
         <a:xfrm>
-          <a:off x="1804555" y="1856174"/>
-          <a:ext cx="1853044" cy="1408926"/>
+          <a:off x="2731077" y="1856174"/>
+          <a:ext cx="926522" cy="1408926"/>
         </a:xfrm>
         <a:custGeom>
           <a:avLst/>
@@ -7352,10 +7694,71 @@
           <a:pathLst>
             <a:path>
               <a:moveTo>
-                <a:pt x="1853044" y="0"/>
+                <a:pt x="926522" y="0"/>
               </a:moveTo>
               <a:lnTo>
-                <a:pt x="1853044" y="1248124"/>
+                <a:pt x="926522" y="1248124"/>
+              </a:lnTo>
+              <a:lnTo>
+                <a:pt x="0" y="1248124"/>
+              </a:lnTo>
+              <a:lnTo>
+                <a:pt x="0" y="1408926"/>
+              </a:lnTo>
+            </a:path>
+          </a:pathLst>
+        </a:custGeom>
+        <a:noFill/>
+        <a:ln w="10795" cap="flat" cmpd="sng" algn="ctr">
+          <a:solidFill>
+            <a:schemeClr val="accent1">
+              <a:shade val="80000"/>
+              <a:hueOff val="0"/>
+              <a:satOff val="0"/>
+              <a:lumOff val="0"/>
+              <a:alphaOff val="0"/>
+            </a:schemeClr>
+          </a:solidFill>
+          <a:prstDash val="solid"/>
+        </a:ln>
+        <a:effectLst/>
+      </dsp:spPr>
+      <dsp:style>
+        <a:lnRef idx="2">
+          <a:scrgbClr r="0" g="0" b="0"/>
+        </a:lnRef>
+        <a:fillRef idx="0">
+          <a:scrgbClr r="0" g="0" b="0"/>
+        </a:fillRef>
+        <a:effectRef idx="0">
+          <a:scrgbClr r="0" g="0" b="0"/>
+        </a:effectRef>
+        <a:fontRef idx="minor"/>
+      </dsp:style>
+    </dsp:sp>
+    <dsp:sp modelId="{0005035F-079F-4B75-ABD6-B002A5196E47}">
+      <dsp:nvSpPr>
+        <dsp:cNvPr id="0" name=""/>
+        <dsp:cNvSpPr/>
+      </dsp:nvSpPr>
+      <dsp:spPr>
+        <a:xfrm>
+          <a:off x="878033" y="1856174"/>
+          <a:ext cx="2779566" cy="1408926"/>
+        </a:xfrm>
+        <a:custGeom>
+          <a:avLst/>
+          <a:gdLst/>
+          <a:ahLst/>
+          <a:cxnLst/>
+          <a:rect l="0" t="0" r="0" b="0"/>
+          <a:pathLst>
+            <a:path>
+              <a:moveTo>
+                <a:pt x="2779566" y="0"/>
+              </a:moveTo>
+              <a:lnTo>
+                <a:pt x="2779566" y="1248124"/>
               </a:lnTo>
               <a:lnTo>
                 <a:pt x="0" y="1248124"/>
@@ -7605,14 +8008,14 @@
         <a:ext cx="1531441" cy="765720"/>
       </dsp:txXfrm>
     </dsp:sp>
-    <dsp:sp modelId="{CB2F9E2B-60EC-401F-A7AE-483C76BC0EC4}">
+    <dsp:sp modelId="{274844C8-7C70-4042-B00B-72F04A850BBB}">
       <dsp:nvSpPr>
         <dsp:cNvPr id="0" name=""/>
         <dsp:cNvSpPr/>
       </dsp:nvSpPr>
       <dsp:spPr>
         <a:xfrm>
-          <a:off x="1038835" y="3265100"/>
+          <a:off x="112313" y="3265100"/>
           <a:ext cx="1531441" cy="765720"/>
         </a:xfrm>
         <a:prstGeom prst="rect">
@@ -7679,18 +8082,18 @@
         </a:p>
       </dsp:txBody>
       <dsp:txXfrm>
-        <a:off x="1038835" y="3265100"/>
+        <a:off x="112313" y="3265100"/>
         <a:ext cx="1531441" cy="765720"/>
       </dsp:txXfrm>
     </dsp:sp>
-    <dsp:sp modelId="{227A2695-8EBE-4628-A9EE-801697A0D3C2}">
+    <dsp:sp modelId="{CB2F9E2B-60EC-401F-A7AE-483C76BC0EC4}">
       <dsp:nvSpPr>
         <dsp:cNvPr id="0" name=""/>
         <dsp:cNvSpPr/>
       </dsp:nvSpPr>
       <dsp:spPr>
         <a:xfrm>
-          <a:off x="2891879" y="3265100"/>
+          <a:off x="1965357" y="3265100"/>
           <a:ext cx="1531441" cy="765720"/>
         </a:xfrm>
         <a:prstGeom prst="rect">
@@ -7757,7 +8160,85 @@
         </a:p>
       </dsp:txBody>
       <dsp:txXfrm>
-        <a:off x="2891879" y="3265100"/>
+        <a:off x="1965357" y="3265100"/>
+        <a:ext cx="1531441" cy="765720"/>
+      </dsp:txXfrm>
+    </dsp:sp>
+    <dsp:sp modelId="{227A2695-8EBE-4628-A9EE-801697A0D3C2}">
+      <dsp:nvSpPr>
+        <dsp:cNvPr id="0" name=""/>
+        <dsp:cNvSpPr/>
+      </dsp:nvSpPr>
+      <dsp:spPr>
+        <a:xfrm>
+          <a:off x="3818401" y="3265100"/>
+          <a:ext cx="1531441" cy="765720"/>
+        </a:xfrm>
+        <a:prstGeom prst="rect">
+          <a:avLst/>
+        </a:prstGeom>
+        <a:solidFill>
+          <a:schemeClr val="accent1">
+            <a:hueOff val="0"/>
+            <a:satOff val="0"/>
+            <a:lumOff val="0"/>
+            <a:alphaOff val="0"/>
+          </a:schemeClr>
+        </a:solidFill>
+        <a:ln w="10795" cap="flat" cmpd="sng" algn="ctr">
+          <a:solidFill>
+            <a:schemeClr val="lt1">
+              <a:hueOff val="0"/>
+              <a:satOff val="0"/>
+              <a:lumOff val="0"/>
+              <a:alphaOff val="0"/>
+            </a:schemeClr>
+          </a:solidFill>
+          <a:prstDash val="solid"/>
+        </a:ln>
+        <a:effectLst/>
+      </dsp:spPr>
+      <dsp:style>
+        <a:lnRef idx="2">
+          <a:scrgbClr r="0" g="0" b="0"/>
+        </a:lnRef>
+        <a:fillRef idx="1">
+          <a:scrgbClr r="0" g="0" b="0"/>
+        </a:fillRef>
+        <a:effectRef idx="0">
+          <a:scrgbClr r="0" g="0" b="0"/>
+        </a:effectRef>
+        <a:fontRef idx="minor">
+          <a:schemeClr val="lt1"/>
+        </a:fontRef>
+      </dsp:style>
+      <dsp:txBody>
+        <a:bodyPr spcFirstLastPara="0" vert="horz" wrap="square" lIns="14605" tIns="14605" rIns="14605" bIns="14605" numCol="1" spcCol="1270" anchor="ctr" anchorCtr="0">
+          <a:noAutofit/>
+        </a:bodyPr>
+        <a:lstStyle/>
+        <a:p>
+          <a:pPr marL="0" lvl="0" indent="0" algn="ctr" defTabSz="1022350">
+            <a:lnSpc>
+              <a:spcPct val="90000"/>
+            </a:lnSpc>
+            <a:spcBef>
+              <a:spcPct val="0"/>
+            </a:spcBef>
+            <a:spcAft>
+              <a:spcPct val="35000"/>
+            </a:spcAft>
+            <a:buNone/>
+          </a:pPr>
+          <a:r>
+            <a:rPr lang="en-US" sz="2300" kern="1200" dirty="0"/>
+            <a:t>batch</a:t>
+          </a:r>
+          <a:endParaRPr lang="fr-CA" sz="2300" kern="1200" dirty="0"/>
+        </a:p>
+      </dsp:txBody>
+      <dsp:txXfrm>
+        <a:off x="3818401" y="3265100"/>
         <a:ext cx="1531441" cy="765720"/>
       </dsp:txXfrm>
     </dsp:sp>
@@ -7768,7 +8249,7 @@
       </dsp:nvSpPr>
       <dsp:spPr>
         <a:xfrm>
-          <a:off x="1965357" y="4352423"/>
+          <a:off x="2891879" y="4352423"/>
           <a:ext cx="1531441" cy="765720"/>
         </a:xfrm>
         <a:prstGeom prst="rect">
@@ -7835,7 +8316,7 @@
         </a:p>
       </dsp:txBody>
       <dsp:txXfrm>
-        <a:off x="1965357" y="4352423"/>
+        <a:off x="2891879" y="4352423"/>
         <a:ext cx="1531441" cy="765720"/>
       </dsp:txXfrm>
     </dsp:sp>
@@ -7846,7 +8327,7 @@
       </dsp:nvSpPr>
       <dsp:spPr>
         <a:xfrm>
-          <a:off x="4744923" y="3265100"/>
+          <a:off x="5671445" y="3265100"/>
           <a:ext cx="1531441" cy="765720"/>
         </a:xfrm>
         <a:prstGeom prst="rect">
@@ -7913,7 +8394,7 @@
         </a:p>
       </dsp:txBody>
       <dsp:txXfrm>
-        <a:off x="4744923" y="3265100"/>
+        <a:off x="5671445" y="3265100"/>
         <a:ext cx="1531441" cy="765720"/>
       </dsp:txXfrm>
     </dsp:sp>
@@ -17457,7 +17938,7 @@
             <a:fld id="{5586B75A-687E-405C-8A0B-8D00578BA2C3}" type="datetimeFigureOut">
               <a:rPr lang="en-US" dirty="0"/>
               <a:pPr/>
-              <a:t>9/16/2021</a:t>
+              <a:t>9/20/2021</a:t>
             </a:fld>
             <a:endParaRPr lang="en-US" dirty="0"/>
           </a:p>
@@ -17624,7 +18105,7 @@
             <a:fld id="{5586B75A-687E-405C-8A0B-8D00578BA2C3}" type="datetimeFigureOut">
               <a:rPr lang="en-US" dirty="0"/>
               <a:pPr/>
-              <a:t>9/16/2021</a:t>
+              <a:t>9/20/2021</a:t>
             </a:fld>
             <a:endParaRPr lang="en-US" dirty="0"/>
           </a:p>
@@ -17801,7 +18282,7 @@
             <a:fld id="{5586B75A-687E-405C-8A0B-8D00578BA2C3}" type="datetimeFigureOut">
               <a:rPr lang="en-US" dirty="0"/>
               <a:pPr/>
-              <a:t>9/16/2021</a:t>
+              <a:t>9/20/2021</a:t>
             </a:fld>
             <a:endParaRPr lang="en-US" dirty="0"/>
           </a:p>
@@ -17968,7 +18449,7 @@
             <a:fld id="{5586B75A-687E-405C-8A0B-8D00578BA2C3}" type="datetimeFigureOut">
               <a:rPr lang="en-US" dirty="0"/>
               <a:pPr/>
-              <a:t>9/16/2021</a:t>
+              <a:t>9/20/2021</a:t>
             </a:fld>
             <a:endParaRPr lang="en-US" dirty="0"/>
           </a:p>
@@ -18223,7 +18704,7 @@
             <a:fld id="{5586B75A-687E-405C-8A0B-8D00578BA2C3}" type="datetimeFigureOut">
               <a:rPr lang="en-US" dirty="0"/>
               <a:pPr/>
-              <a:t>9/16/2021</a:t>
+              <a:t>9/20/2021</a:t>
             </a:fld>
             <a:endParaRPr lang="en-US" dirty="0"/>
           </a:p>
@@ -18508,7 +18989,7 @@
             <a:fld id="{5586B75A-687E-405C-8A0B-8D00578BA2C3}" type="datetimeFigureOut">
               <a:rPr lang="en-US" dirty="0"/>
               <a:pPr/>
-              <a:t>9/16/2021</a:t>
+              <a:t>9/20/2021</a:t>
             </a:fld>
             <a:endParaRPr lang="en-US" dirty="0"/>
           </a:p>
@@ -18947,7 +19428,7 @@
             <a:fld id="{5586B75A-687E-405C-8A0B-8D00578BA2C3}" type="datetimeFigureOut">
               <a:rPr lang="en-US" dirty="0"/>
               <a:pPr/>
-              <a:t>9/16/2021</a:t>
+              <a:t>9/20/2021</a:t>
             </a:fld>
             <a:endParaRPr lang="en-US" dirty="0"/>
           </a:p>
@@ -19062,7 +19543,7 @@
             <a:fld id="{5586B75A-687E-405C-8A0B-8D00578BA2C3}" type="datetimeFigureOut">
               <a:rPr lang="en-US" dirty="0"/>
               <a:pPr/>
-              <a:t>9/16/2021</a:t>
+              <a:t>9/20/2021</a:t>
             </a:fld>
             <a:endParaRPr lang="en-US" dirty="0"/>
           </a:p>
@@ -19154,7 +19635,7 @@
             <a:fld id="{5586B75A-687E-405C-8A0B-8D00578BA2C3}" type="datetimeFigureOut">
               <a:rPr lang="en-US" dirty="0"/>
               <a:pPr/>
-              <a:t>9/16/2021</a:t>
+              <a:t>9/20/2021</a:t>
             </a:fld>
             <a:endParaRPr lang="en-US" dirty="0"/>
           </a:p>
@@ -19439,7 +19920,7 @@
             <a:fld id="{5586B75A-687E-405C-8A0B-8D00578BA2C3}" type="datetimeFigureOut">
               <a:rPr lang="en-US" dirty="0"/>
               <a:pPr/>
-              <a:t>9/16/2021</a:t>
+              <a:t>9/20/2021</a:t>
             </a:fld>
             <a:endParaRPr lang="en-US" dirty="0"/>
           </a:p>
@@ -19709,7 +20190,7 @@
             <a:fld id="{5586B75A-687E-405C-8A0B-8D00578BA2C3}" type="datetimeFigureOut">
               <a:rPr lang="en-US" dirty="0"/>
               <a:pPr/>
-              <a:t>9/16/2021</a:t>
+              <a:t>9/20/2021</a:t>
             </a:fld>
             <a:endParaRPr lang="en-US" dirty="0"/>
           </a:p>
@@ -20003,7 +20484,7 @@
             <a:fld id="{5586B75A-687E-405C-8A0B-8D00578BA2C3}" type="datetimeFigureOut">
               <a:rPr lang="en-US" dirty="0"/>
               <a:pPr/>
-              <a:t>9/16/2021</a:t>
+              <a:t>9/20/2021</a:t>
             </a:fld>
             <a:endParaRPr lang="en-US" dirty="0"/>
           </a:p>
@@ -20841,6 +21322,120 @@
           <a:p>
             <a:r>
               <a:rPr lang="en-US" dirty="0"/>
+              <a:t>After Printing Amount</a:t>
+            </a:r>
+            <a:endParaRPr lang="fr-CA" dirty="0"/>
+          </a:p>
+        </p:txBody>
+      </p:sp>
+      <p:sp>
+        <p:nvSpPr>
+          <p:cNvPr id="4" name="Text Placeholder 3">
+            <a:extLst>
+              <a:ext uri="{FF2B5EF4-FFF2-40B4-BE49-F238E27FC236}">
+                <a16:creationId xmlns:a16="http://schemas.microsoft.com/office/drawing/2014/main" id="{6C4C9579-17E8-4B90-A0AC-8E6A0551F6C7}"/>
+              </a:ext>
+            </a:extLst>
+          </p:cNvPr>
+          <p:cNvSpPr>
+            <a:spLocks noGrp="1"/>
+          </p:cNvSpPr>
+          <p:nvPr>
+            <p:ph type="body" sz="half" idx="2"/>
+          </p:nvPr>
+        </p:nvSpPr>
+        <p:spPr/>
+        <p:txBody>
+          <a:bodyPr/>
+          <a:lstStyle/>
+          <a:p>
+            <a:endParaRPr lang="fr-CA" dirty="0"/>
+          </a:p>
+        </p:txBody>
+      </p:sp>
+      <p:pic>
+        <p:nvPicPr>
+          <p:cNvPr id="5" name="Picture 4">
+            <a:extLst>
+              <a:ext uri="{FF2B5EF4-FFF2-40B4-BE49-F238E27FC236}">
+                <a16:creationId xmlns:a16="http://schemas.microsoft.com/office/drawing/2014/main" id="{AF5379C7-7724-4691-87D4-B8E27E9C911A}"/>
+              </a:ext>
+            </a:extLst>
+          </p:cNvPr>
+          <p:cNvPicPr>
+            <a:picLocks noChangeAspect="1"/>
+          </p:cNvPicPr>
+          <p:nvPr/>
+        </p:nvPicPr>
+        <p:blipFill>
+          <a:blip r:embed="rId2"/>
+          <a:stretch>
+            <a:fillRect/>
+          </a:stretch>
+        </p:blipFill>
+        <p:spPr>
+          <a:xfrm>
+            <a:off x="3577414" y="1305236"/>
+            <a:ext cx="8136931" cy="4247528"/>
+          </a:xfrm>
+          <a:prstGeom prst="rect">
+            <a:avLst/>
+          </a:prstGeom>
+        </p:spPr>
+      </p:pic>
+    </p:spTree>
+    <p:extLst>
+      <p:ext uri="{BB962C8B-B14F-4D97-AF65-F5344CB8AC3E}">
+        <p14:creationId xmlns:p14="http://schemas.microsoft.com/office/powerpoint/2010/main" val="1969075457"/>
+      </p:ext>
+    </p:extLst>
+  </p:cSld>
+  <p:clrMapOvr>
+    <a:masterClrMapping/>
+  </p:clrMapOvr>
+</p:sld>
+</file>
+
+<file path=ppt/slides/slide13.xml><?xml version="1.0" encoding="utf-8"?>
+<p:sld xmlns:a="http://schemas.openxmlformats.org/drawingml/2006/main" xmlns:r="http://schemas.openxmlformats.org/officeDocument/2006/relationships" xmlns:p="http://schemas.openxmlformats.org/presentationml/2006/main">
+  <p:cSld>
+    <p:spTree>
+      <p:nvGrpSpPr>
+        <p:cNvPr id="1" name=""/>
+        <p:cNvGrpSpPr/>
+        <p:nvPr/>
+      </p:nvGrpSpPr>
+      <p:grpSpPr>
+        <a:xfrm>
+          <a:off x="0" y="0"/>
+          <a:ext cx="0" cy="0"/>
+          <a:chOff x="0" y="0"/>
+          <a:chExt cx="0" cy="0"/>
+        </a:xfrm>
+      </p:grpSpPr>
+      <p:sp>
+        <p:nvSpPr>
+          <p:cNvPr id="2" name="Title 1">
+            <a:extLst>
+              <a:ext uri="{FF2B5EF4-FFF2-40B4-BE49-F238E27FC236}">
+                <a16:creationId xmlns:a16="http://schemas.microsoft.com/office/drawing/2014/main" id="{61179D2D-801C-4EE8-A452-FEEBAB97827A}"/>
+              </a:ext>
+            </a:extLst>
+          </p:cNvPr>
+          <p:cNvSpPr>
+            <a:spLocks noGrp="1"/>
+          </p:cNvSpPr>
+          <p:nvPr>
+            <p:ph type="title"/>
+          </p:nvPr>
+        </p:nvSpPr>
+        <p:spPr/>
+        <p:txBody>
+          <a:bodyPr/>
+          <a:lstStyle/>
+          <a:p>
+            <a:r>
+              <a:rPr lang="en-US" dirty="0"/>
               <a:t>Post Printing</a:t>
             </a:r>
             <a:endParaRPr lang="fr-CA" dirty="0"/>
@@ -20874,10 +21469,10 @@
       </p:sp>
       <p:pic>
         <p:nvPicPr>
-          <p:cNvPr id="10" name="Picture 9">
+          <p:cNvPr id="7" name="Picture 6">
             <a:extLst>
               <a:ext uri="{FF2B5EF4-FFF2-40B4-BE49-F238E27FC236}">
-                <a16:creationId xmlns:a16="http://schemas.microsoft.com/office/drawing/2014/main" id="{7A7C9B36-7F1C-4532-A3D9-54A8700FC300}"/>
+                <a16:creationId xmlns:a16="http://schemas.microsoft.com/office/drawing/2014/main" id="{12065F72-E859-4CC5-B874-43111899779C}"/>
               </a:ext>
             </a:extLst>
           </p:cNvPr>
@@ -20894,8 +21489,8 @@
         </p:blipFill>
         <p:spPr>
           <a:xfrm>
-            <a:off x="3587420" y="1311445"/>
-            <a:ext cx="8115231" cy="4235110"/>
+            <a:off x="3579199" y="1316168"/>
+            <a:ext cx="8079931" cy="4225663"/>
           </a:xfrm>
           <a:prstGeom prst="rect">
             <a:avLst/>
@@ -20915,7 +21510,7 @@
 </p:sld>
 </file>
 
-<file path=ppt/slides/slide13.xml><?xml version="1.0" encoding="utf-8"?>
+<file path=ppt/slides/slide14.xml><?xml version="1.0" encoding="utf-8"?>
 <p:sld xmlns:a="http://schemas.openxmlformats.org/drawingml/2006/main" xmlns:r="http://schemas.openxmlformats.org/officeDocument/2006/relationships" xmlns:p="http://schemas.openxmlformats.org/presentationml/2006/main">
   <p:cSld>
     <p:spTree>
@@ -21034,7 +21629,7 @@
 </p:sld>
 </file>
 
-<file path=ppt/slides/slide14.xml><?xml version="1.0" encoding="utf-8"?>
+<file path=ppt/slides/slide15.xml><?xml version="1.0" encoding="utf-8"?>
 <p:sld xmlns:a="http://schemas.openxmlformats.org/drawingml/2006/main" xmlns:r="http://schemas.openxmlformats.org/officeDocument/2006/relationships" xmlns:p="http://schemas.openxmlformats.org/presentationml/2006/main">
   <p:cSld>
     <p:spTree>
@@ -21124,7 +21719,7 @@
 </p:sld>
 </file>
 
-<file path=ppt/slides/slide15.xml><?xml version="1.0" encoding="utf-8"?>
+<file path=ppt/slides/slide16.xml><?xml version="1.0" encoding="utf-8"?>
 <p:sld xmlns:a="http://schemas.openxmlformats.org/drawingml/2006/main" xmlns:r="http://schemas.openxmlformats.org/officeDocument/2006/relationships" xmlns:p="http://schemas.openxmlformats.org/presentationml/2006/main">
   <p:cSld>
     <p:spTree>
@@ -21282,7 +21877,7 @@
 </p:sld>
 </file>
 
-<file path=ppt/slides/slide16.xml><?xml version="1.0" encoding="utf-8"?>
+<file path=ppt/slides/slide17.xml><?xml version="1.0" encoding="utf-8"?>
 <p:sld xmlns:a="http://schemas.openxmlformats.org/drawingml/2006/main" xmlns:r="http://schemas.openxmlformats.org/officeDocument/2006/relationships" xmlns:p="http://schemas.openxmlformats.org/presentationml/2006/main">
   <p:cSld>
     <p:spTree>
@@ -21421,7 +22016,7 @@
 </p:sld>
 </file>
 
-<file path=ppt/slides/slide17.xml><?xml version="1.0" encoding="utf-8"?>
+<file path=ppt/slides/slide18.xml><?xml version="1.0" encoding="utf-8"?>
 <p:sld xmlns:a="http://schemas.openxmlformats.org/drawingml/2006/main" xmlns:r="http://schemas.openxmlformats.org/officeDocument/2006/relationships" xmlns:p="http://schemas.openxmlformats.org/presentationml/2006/main">
   <p:cSld>
     <p:spTree>
@@ -21513,7 +22108,7 @@
 </p:sld>
 </file>
 
-<file path=ppt/slides/slide18.xml><?xml version="1.0" encoding="utf-8"?>
+<file path=ppt/slides/slide19.xml><?xml version="1.0" encoding="utf-8"?>
 <p:sld xmlns:a="http://schemas.openxmlformats.org/drawingml/2006/main" xmlns:r="http://schemas.openxmlformats.org/officeDocument/2006/relationships" xmlns:p="http://schemas.openxmlformats.org/presentationml/2006/main">
   <p:cSld>
     <p:spTree>
@@ -22239,7 +22834,7 @@
             <p:ph idx="1"/>
             <p:extLst>
               <p:ext uri="{D42A27DB-BD31-4B8C-83A1-F6EECF244321}">
-                <p14:modId xmlns:p14="http://schemas.microsoft.com/office/powerpoint/2010/main" val="3639353537"/>
+                <p14:modId xmlns:p14="http://schemas.microsoft.com/office/powerpoint/2010/main" val="2667982459"/>
               </p:ext>
             </p:extLst>
           </p:nvPr>
@@ -22367,7 +22962,7 @@
             <p:ph idx="1"/>
             <p:extLst>
               <p:ext uri="{D42A27DB-BD31-4B8C-83A1-F6EECF244321}">
-                <p14:modId xmlns:p14="http://schemas.microsoft.com/office/powerpoint/2010/main" val="893185750"/>
+                <p14:modId xmlns:p14="http://schemas.microsoft.com/office/powerpoint/2010/main" val="3024939618"/>
               </p:ext>
             </p:extLst>
           </p:nvPr>

</xml_diff>